<commit_message>
add some different types of PHP codes for work
</commit_message>
<xml_diff>
--- a/Android-PHP-from-mysql_Arc.pptx
+++ b/Android-PHP-from-mysql_Arc.pptx
@@ -13,6 +13,7 @@
     <p:sldId id="256" r:id="rId6"/>
     <p:sldId id="257" r:id="rId7"/>
     <p:sldId id="258" r:id="rId8"/>
+    <p:sldId id="259" r:id="rId9"/>
   </p:sldIdLst>
   <p:sldSz cx="9144000" cy="6858000"/>
   <p:notesSz cx="6858000" cy="9144000"/>
@@ -120,7 +121,7 @@
                 </a:uFill>
                 <a:latin typeface="Times New Roman"/>
               </a:rPr>
-              <a:t> </a:t>
+              <a:t>&lt;header&gt;</a:t>
             </a:r>
             <a:endParaRPr b="0" lang="en-US" sz="1400" spc="-1" strike="noStrike">
               <a:solidFill>
@@ -171,7 +172,7 @@
                 </a:uFill>
                 <a:latin typeface="Times New Roman"/>
               </a:rPr>
-              <a:t> </a:t>
+              <a:t>&lt;date/time&gt;</a:t>
             </a:r>
             <a:endParaRPr b="0" lang="en-US" sz="1400" spc="-1" strike="noStrike">
               <a:solidFill>
@@ -221,7 +222,7 @@
                 </a:uFill>
                 <a:latin typeface="Times New Roman"/>
               </a:rPr>
-              <a:t> </a:t>
+              <a:t>&lt;footer&gt;</a:t>
             </a:r>
             <a:endParaRPr b="0" lang="en-US" sz="1400" spc="-1" strike="noStrike">
               <a:solidFill>
@@ -260,7 +261,7 @@
           <a:bodyPr lIns="0" rIns="0" tIns="0" bIns="0" anchor="b"/>
           <a:p>
             <a:pPr algn="r"/>
-            <a:fld id="{84EEA865-F1D5-49BC-A3BD-B7C1B64CE99D}" type="slidenum">
+            <a:fld id="{BA896281-CF60-46E7-BF49-0994499590C9}" type="slidenum">
               <a:rPr b="0" lang="en-US" sz="1400" spc="-1" strike="noStrike">
                 <a:solidFill>
                   <a:srgbClr val="000000"/>
@@ -272,7 +273,7 @@
                 </a:uFill>
                 <a:latin typeface="Times New Roman"/>
               </a:rPr>
-              <a:t>1</a:t>
+              <a:t>&lt;number&gt;</a:t>
             </a:fld>
             <a:endParaRPr b="0" lang="en-US" sz="1400" spc="-1" strike="noStrike">
               <a:solidFill>
@@ -313,14 +314,14 @@
       </p:grpSpPr>
       <p:sp>
         <p:nvSpPr>
-          <p:cNvPr id="134" name="CustomShape 1"/>
+          <p:cNvPr id="136" name="CustomShape 1"/>
           <p:cNvSpPr/>
           <p:nvPr/>
         </p:nvSpPr>
         <p:spPr>
           <a:xfrm>
             <a:off x="3884760" y="8685360"/>
-            <a:ext cx="2970360" cy="455760"/>
+            <a:ext cx="2970000" cy="455400"/>
           </a:xfrm>
           <a:prstGeom prst="rect">
             <a:avLst/>
@@ -344,7 +345,7 @@
                 <a:spcPct val="100000"/>
               </a:lnSpc>
             </a:pPr>
-            <a:fld id="{208344A0-DCFC-4BF3-956C-145531C6E8D4}" type="slidenum">
+            <a:fld id="{80AFD615-12FA-4F1B-8252-A937B1F1F6F1}" type="slidenum">
               <a:rPr b="0" lang="en-US" sz="1200" spc="-1" strike="noStrike">
                 <a:solidFill>
                   <a:srgbClr val="000000"/>
@@ -357,7 +358,7 @@
                 <a:latin typeface="Arial"/>
                 <a:ea typeface="新細明體"/>
               </a:rPr>
-              <a:t>1</a:t>
+              <a:t>&lt;number&gt;</a:t>
             </a:fld>
             <a:endParaRPr b="0" lang="en-US" sz="1800" spc="-1" strike="noStrike">
               <a:solidFill>
@@ -375,7 +376,7 @@
       </p:sp>
       <p:sp>
         <p:nvSpPr>
-          <p:cNvPr id="135" name="PlaceHolder 2"/>
+          <p:cNvPr id="137" name="PlaceHolder 2"/>
           <p:cNvSpPr>
             <a:spLocks noGrp="1"/>
           </p:cNvSpPr>
@@ -386,7 +387,7 @@
         <p:spPr>
           <a:xfrm>
             <a:off x="685800" y="4343400"/>
-            <a:ext cx="5484960" cy="4113360"/>
+            <a:ext cx="5484600" cy="4113000"/>
           </a:xfrm>
           <a:prstGeom prst="rect">
             <a:avLst/>
@@ -414,7 +415,7 @@
 </p:notes>
 </file>
 
-<file path=ppt/notesSlides/notesSlide3.xml><?xml version="1.0" encoding="utf-8"?>
+<file path=ppt/notesSlides/notesSlide4.xml><?xml version="1.0" encoding="utf-8"?>
 <p:notes xmlns:a="http://schemas.openxmlformats.org/drawingml/2006/main" xmlns:p="http://schemas.openxmlformats.org/presentationml/2006/main" xmlns:r="http://schemas.openxmlformats.org/officeDocument/2006/relationships" xmlns:p14="http://schemas.microsoft.com/office/powerpoint/2010/main" xmlns:p15="http://schemas.microsoft.com/office/powerpoint/2012/main" xmlns:mc="http://schemas.openxmlformats.org/markup-compatibility/2006">
   <p:cSld>
     <p:spTree>
@@ -433,14 +434,14 @@
       </p:grpSpPr>
       <p:sp>
         <p:nvSpPr>
-          <p:cNvPr id="136" name="CustomShape 1"/>
+          <p:cNvPr id="138" name="CustomShape 1"/>
           <p:cNvSpPr/>
           <p:nvPr/>
         </p:nvSpPr>
         <p:spPr>
           <a:xfrm>
             <a:off x="3884760" y="8685360"/>
-            <a:ext cx="2970360" cy="455760"/>
+            <a:ext cx="2970000" cy="455400"/>
           </a:xfrm>
           <a:prstGeom prst="rect">
             <a:avLst/>
@@ -464,7 +465,7 @@
                 <a:spcPct val="100000"/>
               </a:lnSpc>
             </a:pPr>
-            <a:fld id="{E6D78405-3F67-4FE3-99D5-FCEEBA905840}" type="slidenum">
+            <a:fld id="{4EA71646-B612-4C0E-8297-F7F0FE6EC2B3}" type="slidenum">
               <a:rPr b="0" lang="en-US" sz="1200" spc="-1" strike="noStrike">
                 <a:solidFill>
                   <a:srgbClr val="000000"/>
@@ -495,14 +496,14 @@
       </p:sp>
       <p:sp>
         <p:nvSpPr>
-          <p:cNvPr id="137" name="CustomShape 2"/>
+          <p:cNvPr id="139" name="CustomShape 2"/>
           <p:cNvSpPr/>
           <p:nvPr/>
         </p:nvSpPr>
         <p:spPr>
           <a:xfrm>
             <a:off x="3884760" y="8685360"/>
-            <a:ext cx="2970360" cy="455760"/>
+            <a:ext cx="2970000" cy="455400"/>
           </a:xfrm>
           <a:prstGeom prst="rect">
             <a:avLst/>
@@ -526,7 +527,7 @@
                 <a:spcPct val="100000"/>
               </a:lnSpc>
             </a:pPr>
-            <a:fld id="{04FA3AB7-956D-43F5-ADC4-2434122090A0}" type="slidenum">
+            <a:fld id="{F0DC0796-3216-46FF-861B-761866CEB4FB}" type="slidenum">
               <a:rPr b="0" lang="en-US" sz="1200" spc="-1" strike="noStrike">
                 <a:solidFill>
                   <a:srgbClr val="000000"/>
@@ -557,14 +558,14 @@
       </p:sp>
       <p:sp>
         <p:nvSpPr>
-          <p:cNvPr id="138" name="CustomShape 3"/>
+          <p:cNvPr id="140" name="CustomShape 3"/>
           <p:cNvSpPr/>
           <p:nvPr/>
         </p:nvSpPr>
         <p:spPr>
           <a:xfrm>
             <a:off x="1143000" y="685800"/>
-            <a:ext cx="4570560" cy="3427560"/>
+            <a:ext cx="4570200" cy="3427200"/>
           </a:xfrm>
           <a:prstGeom prst="rect">
             <a:avLst/>
@@ -586,7 +587,7 @@
       </p:sp>
       <p:sp>
         <p:nvSpPr>
-          <p:cNvPr id="139" name="PlaceHolder 4"/>
+          <p:cNvPr id="141" name="PlaceHolder 4"/>
           <p:cNvSpPr>
             <a:spLocks noGrp="1"/>
           </p:cNvSpPr>
@@ -597,7 +598,7 @@
         <p:spPr>
           <a:xfrm>
             <a:off x="685800" y="4343400"/>
-            <a:ext cx="5484960" cy="4206960"/>
+            <a:ext cx="5484600" cy="4206600"/>
           </a:xfrm>
           <a:prstGeom prst="rect">
             <a:avLst/>
@@ -5084,7 +5085,7 @@
         <p:spPr>
           <a:xfrm>
             <a:off x="0" y="333360"/>
-            <a:ext cx="9142560" cy="6118200"/>
+            <a:ext cx="9142200" cy="6117840"/>
           </a:xfrm>
           <a:prstGeom prst="rect">
             <a:avLst/>
@@ -5103,7 +5104,7 @@
         <p:spPr>
           <a:xfrm>
             <a:off x="0" y="907920"/>
-            <a:ext cx="9142560" cy="5948640"/>
+            <a:ext cx="9142200" cy="5948280"/>
           </a:xfrm>
           <a:prstGeom prst="rect">
             <a:avLst/>
@@ -5138,7 +5139,7 @@
         <p:spPr>
           <a:xfrm>
             <a:off x="0" y="0"/>
-            <a:ext cx="9142560" cy="331920"/>
+            <a:ext cx="9142200" cy="331560"/>
           </a:xfrm>
           <a:prstGeom prst="rect">
             <a:avLst/>
@@ -5162,7 +5163,7 @@
         <p:spPr>
           <a:xfrm>
             <a:off x="0" y="6453360"/>
-            <a:ext cx="9142560" cy="430200"/>
+            <a:ext cx="9142200" cy="429840"/>
           </a:xfrm>
           <a:prstGeom prst="rect">
             <a:avLst/>
@@ -5185,7 +5186,7 @@
         <p:spPr>
           <a:xfrm>
             <a:off x="0" y="333360"/>
-            <a:ext cx="9142560" cy="6118200"/>
+            <a:ext cx="9142200" cy="6117840"/>
           </a:xfrm>
           <a:prstGeom prst="rect">
             <a:avLst/>
@@ -5209,7 +5210,7 @@
         <p:spPr>
           <a:xfrm>
             <a:off x="0" y="0"/>
-            <a:ext cx="9142560" cy="331920"/>
+            <a:ext cx="9142200" cy="331560"/>
           </a:xfrm>
           <a:prstGeom prst="rect">
             <a:avLst/>
@@ -5233,7 +5234,7 @@
         <p:spPr>
           <a:xfrm>
             <a:off x="0" y="6453360"/>
-            <a:ext cx="9142560" cy="430200"/>
+            <a:ext cx="9142200" cy="429840"/>
           </a:xfrm>
           <a:prstGeom prst="rect">
             <a:avLst/>
@@ -5619,7 +5620,7 @@
         <p:spPr>
           <a:xfrm>
             <a:off x="0" y="333360"/>
-            <a:ext cx="9142560" cy="6118200"/>
+            <a:ext cx="9142200" cy="6117840"/>
           </a:xfrm>
           <a:prstGeom prst="rect">
             <a:avLst/>
@@ -5638,7 +5639,7 @@
         <p:spPr>
           <a:xfrm>
             <a:off x="0" y="907920"/>
-            <a:ext cx="9142560" cy="5948640"/>
+            <a:ext cx="9142200" cy="5948280"/>
           </a:xfrm>
           <a:prstGeom prst="rect">
             <a:avLst/>
@@ -5673,7 +5674,7 @@
         <p:spPr>
           <a:xfrm>
             <a:off x="0" y="0"/>
-            <a:ext cx="9142560" cy="331920"/>
+            <a:ext cx="9142200" cy="331560"/>
           </a:xfrm>
           <a:prstGeom prst="rect">
             <a:avLst/>
@@ -5697,7 +5698,7 @@
         <p:spPr>
           <a:xfrm>
             <a:off x="0" y="6453360"/>
-            <a:ext cx="9142560" cy="430200"/>
+            <a:ext cx="9142200" cy="429840"/>
           </a:xfrm>
           <a:prstGeom prst="rect">
             <a:avLst/>
@@ -6083,7 +6084,7 @@
         <p:spPr>
           <a:xfrm>
             <a:off x="0" y="333360"/>
-            <a:ext cx="9142560" cy="6118200"/>
+            <a:ext cx="9142200" cy="6117840"/>
           </a:xfrm>
           <a:prstGeom prst="rect">
             <a:avLst/>
@@ -6102,7 +6103,7 @@
         <p:spPr>
           <a:xfrm>
             <a:off x="0" y="907920"/>
-            <a:ext cx="9142560" cy="5948640"/>
+            <a:ext cx="9142200" cy="5948280"/>
           </a:xfrm>
           <a:prstGeom prst="rect">
             <a:avLst/>
@@ -6137,7 +6138,7 @@
         <p:spPr>
           <a:xfrm>
             <a:off x="0" y="0"/>
-            <a:ext cx="9142560" cy="331920"/>
+            <a:ext cx="9142200" cy="331560"/>
           </a:xfrm>
           <a:prstGeom prst="rect">
             <a:avLst/>
@@ -6161,7 +6162,7 @@
         <p:spPr>
           <a:xfrm>
             <a:off x="0" y="6453360"/>
-            <a:ext cx="9142560" cy="430200"/>
+            <a:ext cx="9142200" cy="429840"/>
           </a:xfrm>
           <a:prstGeom prst="rect">
             <a:avLst/>
@@ -6536,7 +6537,7 @@
         <p:spPr>
           <a:xfrm>
             <a:off x="1116000" y="2349360"/>
-            <a:ext cx="7558200" cy="1468440"/>
+            <a:ext cx="7557840" cy="1468080"/>
           </a:xfrm>
           <a:prstGeom prst="rect">
             <a:avLst/>
@@ -6598,7 +6599,7 @@
         <p:spPr>
           <a:xfrm>
             <a:off x="7574040" y="5734080"/>
-            <a:ext cx="1193400" cy="576000"/>
+            <a:ext cx="1193040" cy="575640"/>
           </a:xfrm>
           <a:prstGeom prst="rect">
             <a:avLst/>
@@ -6745,7 +6746,7 @@
         <p:spPr>
           <a:xfrm>
             <a:off x="468360" y="346680"/>
-            <a:ext cx="8217000" cy="704880"/>
+            <a:ext cx="8216640" cy="704520"/>
           </a:xfrm>
           <a:prstGeom prst="rect">
             <a:avLst/>
@@ -6807,7 +6808,7 @@
         <p:spPr>
           <a:xfrm>
             <a:off x="971640" y="1144800"/>
-            <a:ext cx="7713720" cy="5072040"/>
+            <a:ext cx="7713360" cy="5071680"/>
           </a:xfrm>
           <a:prstGeom prst="rect">
             <a:avLst/>
@@ -6826,7 +6827,7 @@
         <p:txBody>
           <a:bodyPr lIns="90000" rIns="90000" tIns="45000" bIns="45000"/>
           <a:p>
-            <a:pPr marL="355680" indent="-354240">
+            <a:pPr marL="355680" indent="-353880">
               <a:lnSpc>
                 <a:spcPct val="100000"/>
               </a:lnSpc>
@@ -6864,7 +6865,7 @@
             </a:endParaRPr>
           </a:p>
           <a:p>
-            <a:pPr marL="355680" indent="-354240">
+            <a:pPr marL="355680" indent="-353880">
               <a:lnSpc>
                 <a:spcPct val="100000"/>
               </a:lnSpc>
@@ -6902,7 +6903,7 @@
             </a:endParaRPr>
           </a:p>
           <a:p>
-            <a:pPr marL="355680" indent="-354240">
+            <a:pPr marL="355680" indent="-353880">
               <a:lnSpc>
                 <a:spcPct val="100000"/>
               </a:lnSpc>
@@ -6925,7 +6926,277 @@
                 <a:latin typeface="Arial"/>
                 <a:ea typeface="標楷體"/>
               </a:rPr>
+              <a:t>Implement</a:t>
+            </a:r>
+            <a:endParaRPr b="0" lang="en-US" sz="1800" spc="-1" strike="noStrike">
+              <a:solidFill>
+                <a:srgbClr val="000000"/>
+              </a:solidFill>
+              <a:uFill>
+                <a:solidFill>
+                  <a:srgbClr val="ffffff"/>
+                </a:solidFill>
+              </a:uFill>
+              <a:latin typeface="Arial"/>
+            </a:endParaRPr>
+          </a:p>
+          <a:p>
+            <a:pPr lvl="1" marL="432000" indent="-216000">
+              <a:lnSpc>
+                <a:spcPct val="100000"/>
+              </a:lnSpc>
+              <a:buClr>
+                <a:srgbClr val="000000"/>
+              </a:buClr>
+              <a:buSzPct val="45000"/>
+              <a:buFont typeface="Wingdings" charset="2"/>
+              <a:buChar char=""/>
+            </a:pPr>
+            <a:r>
+              <a:rPr b="0" lang="en-US" sz="2000" spc="-1" strike="noStrike">
+                <a:solidFill>
+                  <a:srgbClr val="333333"/>
+                </a:solidFill>
+                <a:uFill>
+                  <a:solidFill>
+                    <a:srgbClr val="ffffff"/>
+                  </a:solidFill>
+                </a:uFill>
+                <a:latin typeface="Arial"/>
+                <a:ea typeface="標楷體"/>
+              </a:rPr>
+              <a:t>Select</a:t>
+            </a:r>
+            <a:endParaRPr b="0" lang="en-US" sz="1800" spc="-1" strike="noStrike">
+              <a:solidFill>
+                <a:srgbClr val="000000"/>
+              </a:solidFill>
+              <a:uFill>
+                <a:solidFill>
+                  <a:srgbClr val="ffffff"/>
+                </a:solidFill>
+              </a:uFill>
+              <a:latin typeface="Arial"/>
+            </a:endParaRPr>
+          </a:p>
+          <a:p>
+            <a:pPr lvl="1" marL="432000" indent="-216000">
+              <a:lnSpc>
+                <a:spcPct val="100000"/>
+              </a:lnSpc>
+              <a:buClr>
+                <a:srgbClr val="000000"/>
+              </a:buClr>
+              <a:buSzPct val="45000"/>
+              <a:buFont typeface="Wingdings" charset="2"/>
+              <a:buChar char=""/>
+            </a:pPr>
+            <a:r>
+              <a:rPr b="0" lang="en-US" sz="2000" spc="-1" strike="noStrike">
+                <a:solidFill>
+                  <a:srgbClr val="333333"/>
+                </a:solidFill>
+                <a:uFill>
+                  <a:solidFill>
+                    <a:srgbClr val="ffffff"/>
+                  </a:solidFill>
+                </a:uFill>
+                <a:latin typeface="Arial"/>
+                <a:ea typeface="標楷體"/>
+              </a:rPr>
+              <a:t>Insert</a:t>
+            </a:r>
+            <a:endParaRPr b="0" lang="en-US" sz="1800" spc="-1" strike="noStrike">
+              <a:solidFill>
+                <a:srgbClr val="000000"/>
+              </a:solidFill>
+              <a:uFill>
+                <a:solidFill>
+                  <a:srgbClr val="ffffff"/>
+                </a:solidFill>
+              </a:uFill>
+              <a:latin typeface="Arial"/>
+            </a:endParaRPr>
+          </a:p>
+          <a:p>
+            <a:pPr lvl="1" marL="432000" indent="-216000">
+              <a:lnSpc>
+                <a:spcPct val="100000"/>
+              </a:lnSpc>
+              <a:buClr>
+                <a:srgbClr val="000000"/>
+              </a:buClr>
+              <a:buSzPct val="45000"/>
+              <a:buFont typeface="Wingdings" charset="2"/>
+              <a:buChar char=""/>
+            </a:pPr>
+            <a:r>
+              <a:rPr b="0" lang="en-US" sz="2000" spc="-1" strike="noStrike">
+                <a:solidFill>
+                  <a:srgbClr val="333333"/>
+                </a:solidFill>
+                <a:uFill>
+                  <a:solidFill>
+                    <a:srgbClr val="ffffff"/>
+                  </a:solidFill>
+                </a:uFill>
+                <a:latin typeface="Arial"/>
+                <a:ea typeface="標楷體"/>
+              </a:rPr>
+              <a:t>Update</a:t>
+            </a:r>
+            <a:endParaRPr b="0" lang="en-US" sz="1800" spc="-1" strike="noStrike">
+              <a:solidFill>
+                <a:srgbClr val="000000"/>
+              </a:solidFill>
+              <a:uFill>
+                <a:solidFill>
+                  <a:srgbClr val="ffffff"/>
+                </a:solidFill>
+              </a:uFill>
+              <a:latin typeface="Arial"/>
+            </a:endParaRPr>
+          </a:p>
+          <a:p>
+            <a:pPr lvl="1" marL="432000" indent="-216000">
+              <a:lnSpc>
+                <a:spcPct val="100000"/>
+              </a:lnSpc>
+              <a:buClr>
+                <a:srgbClr val="000000"/>
+              </a:buClr>
+              <a:buSzPct val="45000"/>
+              <a:buFont typeface="Wingdings" charset="2"/>
+              <a:buChar char=""/>
+            </a:pPr>
+            <a:r>
+              <a:rPr b="0" lang="en-US" sz="2000" spc="-1" strike="noStrike">
+                <a:solidFill>
+                  <a:srgbClr val="333333"/>
+                </a:solidFill>
+                <a:uFill>
+                  <a:solidFill>
+                    <a:srgbClr val="ffffff"/>
+                  </a:solidFill>
+                </a:uFill>
+                <a:latin typeface="Arial"/>
+                <a:ea typeface="標楷體"/>
+              </a:rPr>
+              <a:t>Delete </a:t>
+            </a:r>
+            <a:endParaRPr b="0" lang="en-US" sz="1800" spc="-1" strike="noStrike">
+              <a:solidFill>
+                <a:srgbClr val="000000"/>
+              </a:solidFill>
+              <a:uFill>
+                <a:solidFill>
+                  <a:srgbClr val="ffffff"/>
+                </a:solidFill>
+              </a:uFill>
+              <a:latin typeface="Arial"/>
+            </a:endParaRPr>
+          </a:p>
+          <a:p>
+            <a:pPr marL="355680" indent="-353880">
+              <a:lnSpc>
+                <a:spcPct val="100000"/>
+              </a:lnSpc>
+              <a:buClr>
+                <a:srgbClr val="333333"/>
+              </a:buClr>
+              <a:buFont typeface="Wingdings" charset="2"/>
+              <a:buChar char=""/>
+            </a:pPr>
+            <a:r>
+              <a:rPr b="0" lang="en-US" sz="2000" spc="-1" strike="noStrike">
+                <a:solidFill>
+                  <a:srgbClr val="333333"/>
+                </a:solidFill>
+                <a:uFill>
+                  <a:solidFill>
+                    <a:srgbClr val="ffffff"/>
+                  </a:solidFill>
+                </a:uFill>
+                <a:latin typeface="Arial"/>
+                <a:ea typeface="標楷體"/>
+              </a:rPr>
               <a:t> </a:t>
+            </a:r>
+            <a:endParaRPr b="0" lang="en-US" sz="1800" spc="-1" strike="noStrike">
+              <a:solidFill>
+                <a:srgbClr val="000000"/>
+              </a:solidFill>
+              <a:uFill>
+                <a:solidFill>
+                  <a:srgbClr val="ffffff"/>
+                </a:solidFill>
+              </a:uFill>
+              <a:latin typeface="Arial"/>
+            </a:endParaRPr>
+          </a:p>
+          <a:p>
+            <a:pPr marL="355680" indent="-353880">
+              <a:lnSpc>
+                <a:spcPct val="100000"/>
+              </a:lnSpc>
+              <a:buClr>
+                <a:srgbClr val="333333"/>
+              </a:buClr>
+              <a:buFont typeface="Wingdings" charset="2"/>
+              <a:buChar char=""/>
+            </a:pPr>
+            <a:r>
+              <a:rPr b="0" lang="en-US" sz="2000" spc="-1" strike="noStrike">
+                <a:solidFill>
+                  <a:srgbClr val="333333"/>
+                </a:solidFill>
+                <a:uFill>
+                  <a:solidFill>
+                    <a:srgbClr val="ffffff"/>
+                  </a:solidFill>
+                </a:uFill>
+                <a:latin typeface="Arial"/>
+                <a:ea typeface="標楷體"/>
+              </a:rPr>
+              <a:t> </a:t>
+            </a:r>
+            <a:endParaRPr b="0" lang="en-US" sz="1800" spc="-1" strike="noStrike">
+              <a:solidFill>
+                <a:srgbClr val="000000"/>
+              </a:solidFill>
+              <a:uFill>
+                <a:solidFill>
+                  <a:srgbClr val="ffffff"/>
+                </a:solidFill>
+              </a:uFill>
+              <a:latin typeface="Arial"/>
+            </a:endParaRPr>
+          </a:p>
+          <a:p>
+            <a:pPr marL="355680" indent="-353880">
+              <a:lnSpc>
+                <a:spcPct val="100000"/>
+              </a:lnSpc>
+              <a:buClr>
+                <a:srgbClr val="333333"/>
+              </a:buClr>
+              <a:buFont typeface="Wingdings" charset="2"/>
+              <a:buChar char=""/>
+            </a:pPr>
+            <a:r>
+              <a:rPr b="0" lang="en-US" sz="2000" spc="-1" strike="noStrike">
+                <a:solidFill>
+                  <a:srgbClr val="333333"/>
+                </a:solidFill>
+                <a:uFill>
+                  <a:solidFill>
+                    <a:srgbClr val="ffffff"/>
+                  </a:solidFill>
+                </a:uFill>
+                <a:latin typeface="Arial"/>
+                <a:ea typeface="標楷體"/>
+              </a:rPr>
+              <a:t>Reference</a:t>
             </a:r>
             <a:endParaRPr b="0" lang="en-US" sz="1800" spc="-1" strike="noStrike">
               <a:solidFill>
@@ -6993,9 +7264,361 @@
           <a:chExt cx="0" cy="0"/>
         </a:xfrm>
       </p:grpSpPr>
+      <p:sp>
+        <p:nvSpPr>
+          <p:cNvPr id="132" name="CustomShape 1"/>
+          <p:cNvSpPr/>
+          <p:nvPr/>
+        </p:nvSpPr>
+        <p:spPr>
+          <a:xfrm>
+            <a:off x="468360" y="346680"/>
+            <a:ext cx="8216640" cy="704520"/>
+          </a:xfrm>
+          <a:prstGeom prst="rect">
+            <a:avLst/>
+          </a:prstGeom>
+          <a:noFill/>
+          <a:ln>
+            <a:noFill/>
+          </a:ln>
+        </p:spPr>
+        <p:style>
+          <a:lnRef idx="0"/>
+          <a:fillRef idx="0"/>
+          <a:effectRef idx="0"/>
+          <a:fontRef idx="minor"/>
+        </p:style>
+        <p:txBody>
+          <a:bodyPr lIns="90000" rIns="90000" tIns="45000" bIns="45000" anchor="ctr"/>
+          <a:p>
+            <a:pPr>
+              <a:lnSpc>
+                <a:spcPct val="100000"/>
+              </a:lnSpc>
+            </a:pPr>
+            <a:r>
+              <a:rPr b="1" lang="en-US" sz="3200" spc="-1" strike="noStrike">
+                <a:solidFill>
+                  <a:srgbClr val="333333"/>
+                </a:solidFill>
+                <a:uFill>
+                  <a:solidFill>
+                    <a:srgbClr val="ffffff"/>
+                  </a:solidFill>
+                </a:uFill>
+                <a:latin typeface="Arial"/>
+                <a:ea typeface="標楷體"/>
+              </a:rPr>
+              <a:t>Reference</a:t>
+            </a:r>
+            <a:endParaRPr b="0" lang="en-US" sz="1800" spc="-1" strike="noStrike">
+              <a:solidFill>
+                <a:srgbClr val="000000"/>
+              </a:solidFill>
+              <a:uFill>
+                <a:solidFill>
+                  <a:srgbClr val="ffffff"/>
+                </a:solidFill>
+              </a:uFill>
+              <a:latin typeface="Arial"/>
+            </a:endParaRPr>
+          </a:p>
+        </p:txBody>
+      </p:sp>
+      <p:sp>
+        <p:nvSpPr>
+          <p:cNvPr id="133" name="CustomShape 2"/>
+          <p:cNvSpPr/>
+          <p:nvPr/>
+        </p:nvSpPr>
+        <p:spPr>
+          <a:xfrm>
+            <a:off x="971640" y="1144800"/>
+            <a:ext cx="7713360" cy="5071680"/>
+          </a:xfrm>
+          <a:prstGeom prst="rect">
+            <a:avLst/>
+          </a:prstGeom>
+          <a:noFill/>
+          <a:ln>
+            <a:noFill/>
+          </a:ln>
+        </p:spPr>
+        <p:style>
+          <a:lnRef idx="0"/>
+          <a:fillRef idx="0"/>
+          <a:effectRef idx="0"/>
+          <a:fontRef idx="minor"/>
+        </p:style>
+        <p:txBody>
+          <a:bodyPr lIns="90000" rIns="90000" tIns="45000" bIns="45000"/>
+          <a:p>
+            <a:pPr marL="355680" indent="-353880">
+              <a:lnSpc>
+                <a:spcPct val="100000"/>
+              </a:lnSpc>
+              <a:buClr>
+                <a:srgbClr val="333333"/>
+              </a:buClr>
+              <a:buFont typeface="Wingdings" charset="2"/>
+              <a:buChar char=""/>
+            </a:pPr>
+            <a:r>
+              <a:rPr b="0" lang="en-US" sz="2000" spc="-1" strike="noStrike">
+                <a:solidFill>
+                  <a:srgbClr val="333333"/>
+                </a:solidFill>
+                <a:uFill>
+                  <a:solidFill>
+                    <a:srgbClr val="ffffff"/>
+                  </a:solidFill>
+                </a:uFill>
+                <a:latin typeface="Arial"/>
+                <a:ea typeface="標楷體"/>
+              </a:rPr>
+              <a:t> </a:t>
+            </a:r>
+            <a:endParaRPr b="0" lang="en-US" sz="1800" spc="-1" strike="noStrike">
+              <a:solidFill>
+                <a:srgbClr val="000000"/>
+              </a:solidFill>
+              <a:uFill>
+                <a:solidFill>
+                  <a:srgbClr val="ffffff"/>
+                </a:solidFill>
+              </a:uFill>
+              <a:latin typeface="Arial"/>
+            </a:endParaRPr>
+          </a:p>
+          <a:p>
+            <a:pPr marL="355680" indent="-353880">
+              <a:lnSpc>
+                <a:spcPct val="100000"/>
+              </a:lnSpc>
+              <a:buClr>
+                <a:srgbClr val="333333"/>
+              </a:buClr>
+              <a:buFont typeface="Wingdings" charset="2"/>
+              <a:buChar char=""/>
+            </a:pPr>
+            <a:r>
+              <a:rPr b="0" lang="en-US" sz="2000" spc="-1" strike="noStrike">
+                <a:solidFill>
+                  <a:srgbClr val="333333"/>
+                </a:solidFill>
+                <a:uFill>
+                  <a:solidFill>
+                    <a:srgbClr val="ffffff"/>
+                  </a:solidFill>
+                </a:uFill>
+                <a:latin typeface="Arial"/>
+                <a:ea typeface="標楷體"/>
+              </a:rPr>
+              <a:t> </a:t>
+            </a:r>
+            <a:endParaRPr b="0" lang="en-US" sz="1800" spc="-1" strike="noStrike">
+              <a:solidFill>
+                <a:srgbClr val="000000"/>
+              </a:solidFill>
+              <a:uFill>
+                <a:solidFill>
+                  <a:srgbClr val="ffffff"/>
+                </a:solidFill>
+              </a:uFill>
+              <a:latin typeface="Arial"/>
+            </a:endParaRPr>
+          </a:p>
+          <a:p>
+            <a:pPr marL="355680" indent="-353880">
+              <a:lnSpc>
+                <a:spcPct val="100000"/>
+              </a:lnSpc>
+              <a:buClr>
+                <a:srgbClr val="333333"/>
+              </a:buClr>
+              <a:buFont typeface="Wingdings" charset="2"/>
+              <a:buChar char=""/>
+            </a:pPr>
+            <a:r>
+              <a:rPr b="0" lang="en-US" sz="2000" spc="-1" strike="noStrike">
+                <a:solidFill>
+                  <a:srgbClr val="333333"/>
+                </a:solidFill>
+                <a:uFill>
+                  <a:solidFill>
+                    <a:srgbClr val="ffffff"/>
+                  </a:solidFill>
+                </a:uFill>
+                <a:latin typeface="Arial"/>
+                <a:ea typeface="標楷體"/>
+              </a:rPr>
+              <a:t>Image</a:t>
+            </a:r>
+            <a:endParaRPr b="0" lang="en-US" sz="1800" spc="-1" strike="noStrike">
+              <a:solidFill>
+                <a:srgbClr val="000000"/>
+              </a:solidFill>
+              <a:uFill>
+                <a:solidFill>
+                  <a:srgbClr val="ffffff"/>
+                </a:solidFill>
+              </a:uFill>
+              <a:latin typeface="Arial"/>
+            </a:endParaRPr>
+          </a:p>
+          <a:p>
+            <a:pPr lvl="1" marL="432000" indent="-216000">
+              <a:lnSpc>
+                <a:spcPct val="100000"/>
+              </a:lnSpc>
+              <a:buClr>
+                <a:srgbClr val="000000"/>
+              </a:buClr>
+              <a:buSzPct val="45000"/>
+              <a:buFont typeface="Wingdings" charset="2"/>
+              <a:buChar char=""/>
+            </a:pPr>
+            <a:r>
+              <a:rPr b="0" lang="en-US" sz="2000" spc="-1" strike="noStrike">
+                <a:solidFill>
+                  <a:srgbClr val="333333"/>
+                </a:solidFill>
+                <a:uFill>
+                  <a:solidFill>
+                    <a:srgbClr val="ffffff"/>
+                  </a:solidFill>
+                </a:uFill>
+                <a:latin typeface="Arial"/>
+                <a:ea typeface="標楷體"/>
+              </a:rPr>
+              <a:t>http://stackoverflow.com/questions/13562429/how-many-ways-to-convert-bitmap-to-string-and-vice-versa</a:t>
+            </a:r>
+            <a:endParaRPr b="0" lang="en-US" sz="1800" spc="-1" strike="noStrike">
+              <a:solidFill>
+                <a:srgbClr val="000000"/>
+              </a:solidFill>
+              <a:uFill>
+                <a:solidFill>
+                  <a:srgbClr val="ffffff"/>
+                </a:solidFill>
+              </a:uFill>
+              <a:latin typeface="Arial"/>
+            </a:endParaRPr>
+          </a:p>
+          <a:p>
+            <a:pPr marL="355680" indent="-353880">
+              <a:lnSpc>
+                <a:spcPct val="100000"/>
+              </a:lnSpc>
+              <a:buClr>
+                <a:srgbClr val="333333"/>
+              </a:buClr>
+              <a:buFont typeface="Wingdings" charset="2"/>
+              <a:buChar char=""/>
+            </a:pPr>
+            <a:r>
+              <a:rPr b="0" lang="en-US" sz="2000" spc="-1" strike="noStrike">
+                <a:solidFill>
+                  <a:srgbClr val="333333"/>
+                </a:solidFill>
+                <a:uFill>
+                  <a:solidFill>
+                    <a:srgbClr val="ffffff"/>
+                  </a:solidFill>
+                </a:uFill>
+                <a:latin typeface="Arial"/>
+                <a:ea typeface="標楷體"/>
+              </a:rPr>
+              <a:t> </a:t>
+            </a:r>
+            <a:endParaRPr b="0" lang="en-US" sz="1800" spc="-1" strike="noStrike">
+              <a:solidFill>
+                <a:srgbClr val="000000"/>
+              </a:solidFill>
+              <a:uFill>
+                <a:solidFill>
+                  <a:srgbClr val="ffffff"/>
+                </a:solidFill>
+              </a:uFill>
+              <a:latin typeface="Arial"/>
+            </a:endParaRPr>
+          </a:p>
+          <a:p>
+            <a:pPr>
+              <a:lnSpc>
+                <a:spcPct val="100000"/>
+              </a:lnSpc>
+            </a:pPr>
+            <a:endParaRPr b="0" lang="en-US" sz="1800" spc="-1" strike="noStrike">
+              <a:solidFill>
+                <a:srgbClr val="000000"/>
+              </a:solidFill>
+              <a:uFill>
+                <a:solidFill>
+                  <a:srgbClr val="ffffff"/>
+                </a:solidFill>
+              </a:uFill>
+              <a:latin typeface="Arial"/>
+            </a:endParaRPr>
+          </a:p>
+        </p:txBody>
+      </p:sp>
+    </p:spTree>
+  </p:cSld>
+  <p:transition spd="slow">
+    <p:fade/>
+  </p:transition>
+  <p:timing>
+    <p:tnLst>
+      <p:par>
+        <p:cTn id="5" dur="indefinite" restart="never" nodeType="tmRoot">
+          <p:childTnLst>
+            <p:seq>
+              <p:cTn id="6" nodeType="mainSeq"/>
+              <p:prevCondLst>
+                <p:cond delay="0" evt="onPrev">
+                  <p:tgtEl>
+                    <p:sldTgt/>
+                  </p:tgtEl>
+                </p:cond>
+              </p:prevCondLst>
+              <p:nextCondLst>
+                <p:cond delay="0" evt="onNext">
+                  <p:tgtEl>
+                    <p:sldTgt/>
+                  </p:tgtEl>
+                </p:cond>
+              </p:nextCondLst>
+            </p:seq>
+          </p:childTnLst>
+        </p:cTn>
+      </p:par>
+    </p:tnLst>
+  </p:timing>
+</p:sld>
+</file>
+
+<file path=ppt/slides/slide4.xml><?xml version="1.0" encoding="utf-8"?>
+<p:sld xmlns:a="http://schemas.openxmlformats.org/drawingml/2006/main" xmlns:p="http://schemas.openxmlformats.org/presentationml/2006/main" xmlns:r="http://schemas.openxmlformats.org/officeDocument/2006/relationships" xmlns:p14="http://schemas.microsoft.com/office/powerpoint/2010/main" xmlns:p15="http://schemas.microsoft.com/office/powerpoint/2012/main" xmlns:mc="http://schemas.openxmlformats.org/markup-compatibility/2006">
+  <p:cSld>
+    <p:spTree>
+      <p:nvGrpSpPr>
+        <p:cNvPr id="1" name=""/>
+        <p:cNvGrpSpPr/>
+        <p:nvPr/>
+      </p:nvGrpSpPr>
+      <p:grpSpPr>
+        <a:xfrm>
+          <a:off x="0" y="0"/>
+          <a:ext cx="0" cy="0"/>
+          <a:chOff x="0" y="0"/>
+          <a:chExt cx="0" cy="0"/>
+        </a:xfrm>
+      </p:grpSpPr>
       <p:pic>
         <p:nvPicPr>
-          <p:cNvPr id="132" name="Picture 2" descr=""/>
+          <p:cNvPr id="134" name="Picture 2" descr=""/>
           <p:cNvPicPr/>
           <p:nvPr/>
         </p:nvPicPr>
@@ -7007,7 +7630,7 @@
         <p:spPr>
           <a:xfrm>
             <a:off x="0" y="333360"/>
-            <a:ext cx="4570560" cy="6118200"/>
+            <a:ext cx="4570200" cy="6117840"/>
           </a:xfrm>
           <a:prstGeom prst="rect">
             <a:avLst/>
@@ -7019,14 +7642,14 @@
       </p:pic>
       <p:sp>
         <p:nvSpPr>
-          <p:cNvPr id="133" name="CustomShape 1"/>
+          <p:cNvPr id="135" name="CustomShape 1"/>
           <p:cNvSpPr/>
           <p:nvPr/>
         </p:nvSpPr>
         <p:spPr>
           <a:xfrm>
             <a:off x="5792760" y="3141720"/>
-            <a:ext cx="1779840" cy="641520"/>
+            <a:ext cx="1779480" cy="641160"/>
           </a:xfrm>
           <a:prstGeom prst="rect">
             <a:avLst/>
@@ -7087,38 +7710,38 @@
   <p:timing>
     <p:tnLst>
       <p:par>
-        <p:cTn id="5" dur="indefinite" restart="never" nodeType="tmRoot">
+        <p:cTn id="7" dur="indefinite" restart="never" nodeType="tmRoot">
           <p:childTnLst>
             <p:seq>
-              <p:cTn id="6" dur="indefinite" nodeType="mainSeq">
+              <p:cTn id="8" dur="indefinite" nodeType="mainSeq">
                 <p:childTnLst>
                   <p:par>
-                    <p:cTn id="7" nodeType="clickEffect" fill="hold">
+                    <p:cTn id="9" nodeType="clickEffect" fill="hold">
                       <p:stCondLst>
                         <p:cond delay="indefinite"/>
                       </p:stCondLst>
                       <p:childTnLst>
                         <p:par>
-                          <p:cTn id="8" nodeType="withEffect" fill="hold">
+                          <p:cTn id="10" nodeType="withEffect" fill="hold">
                             <p:stCondLst>
                               <p:cond delay="0"/>
                             </p:stCondLst>
                             <p:childTnLst>
                               <p:par>
-                                <p:cTn id="9" nodeType="clickEffect" fill="hold" presetClass="entr" presetID="10">
+                                <p:cTn id="11" nodeType="clickEffect" fill="hold" presetClass="entr" presetID="10">
                                   <p:stCondLst>
                                     <p:cond delay="0"/>
                                   </p:stCondLst>
                                   <p:childTnLst>
                                     <p:set>
                                       <p:cBhvr>
-                                        <p:cTn id="10" dur="1" fill="hold">
+                                        <p:cTn id="12" dur="1" fill="hold">
                                           <p:stCondLst>
                                             <p:cond delay="0"/>
                                           </p:stCondLst>
                                         </p:cTn>
                                         <p:tgtEl>
-                                          <p:spTgt spid="133"/>
+                                          <p:spTgt spid="135"/>
                                         </p:tgtEl>
                                         <p:attrNameLst>
                                           <p:attrName>style.visibility</p:attrName>
@@ -7130,9 +7753,9 @@
                                     </p:set>
                                     <p:animEffect filter="fade" transition="in">
                                       <p:cBhvr additive="repl">
-                                        <p:cTn id="11" dur="2000"/>
+                                        <p:cTn id="13" dur="2000"/>
                                         <p:tgtEl>
-                                          <p:spTgt spid="133"/>
+                                          <p:spTgt spid="135"/>
                                         </p:tgtEl>
                                       </p:cBhvr>
                                     </p:animEffect>

</xml_diff>

<commit_message>
update ppt and README.md
</commit_message>
<xml_diff>
--- a/Android-PHP-from-mysql_Arc.pptx
+++ b/Android-PHP-from-mysql_Arc.pptx
@@ -14,6 +14,9 @@
     <p:sldId id="257" r:id="rId7"/>
     <p:sldId id="258" r:id="rId8"/>
     <p:sldId id="259" r:id="rId9"/>
+    <p:sldId id="260" r:id="rId10"/>
+    <p:sldId id="261" r:id="rId11"/>
+    <p:sldId id="262" r:id="rId12"/>
   </p:sldIdLst>
   <p:sldSz cx="9144000" cy="6858000"/>
   <p:notesSz cx="6858000" cy="9144000"/>
@@ -261,7 +264,7 @@
           <a:bodyPr lIns="0" rIns="0" tIns="0" bIns="0" anchor="b"/>
           <a:p>
             <a:pPr algn="r"/>
-            <a:fld id="{BA896281-CF60-46E7-BF49-0994499590C9}" type="slidenum">
+            <a:fld id="{3F12AD8A-7F23-4540-BEB8-6F59F7788805}" type="slidenum">
               <a:rPr b="0" lang="en-US" sz="1400" spc="-1" strike="noStrike">
                 <a:solidFill>
                   <a:srgbClr val="000000"/>
@@ -314,14 +317,14 @@
       </p:grpSpPr>
       <p:sp>
         <p:nvSpPr>
-          <p:cNvPr id="136" name="CustomShape 1"/>
+          <p:cNvPr id="139" name="CustomShape 1"/>
           <p:cNvSpPr/>
           <p:nvPr/>
         </p:nvSpPr>
         <p:spPr>
           <a:xfrm>
             <a:off x="3884760" y="8685360"/>
-            <a:ext cx="2970000" cy="455400"/>
+            <a:ext cx="2969640" cy="455040"/>
           </a:xfrm>
           <a:prstGeom prst="rect">
             <a:avLst/>
@@ -345,7 +348,7 @@
                 <a:spcPct val="100000"/>
               </a:lnSpc>
             </a:pPr>
-            <a:fld id="{80AFD615-12FA-4F1B-8252-A937B1F1F6F1}" type="slidenum">
+            <a:fld id="{10D8E558-5702-4051-9853-521AA4B14503}" type="slidenum">
               <a:rPr b="0" lang="en-US" sz="1200" spc="-1" strike="noStrike">
                 <a:solidFill>
                   <a:srgbClr val="000000"/>
@@ -376,7 +379,7 @@
       </p:sp>
       <p:sp>
         <p:nvSpPr>
-          <p:cNvPr id="137" name="PlaceHolder 2"/>
+          <p:cNvPr id="140" name="PlaceHolder 2"/>
           <p:cNvSpPr>
             <a:spLocks noGrp="1"/>
           </p:cNvSpPr>
@@ -387,7 +390,7 @@
         <p:spPr>
           <a:xfrm>
             <a:off x="685800" y="4343400"/>
-            <a:ext cx="5484600" cy="4113000"/>
+            <a:ext cx="5484240" cy="4112640"/>
           </a:xfrm>
           <a:prstGeom prst="rect">
             <a:avLst/>
@@ -415,7 +418,7 @@
 </p:notes>
 </file>
 
-<file path=ppt/notesSlides/notesSlide4.xml><?xml version="1.0" encoding="utf-8"?>
+<file path=ppt/notesSlides/notesSlide7.xml><?xml version="1.0" encoding="utf-8"?>
 <p:notes xmlns:a="http://schemas.openxmlformats.org/drawingml/2006/main" xmlns:p="http://schemas.openxmlformats.org/presentationml/2006/main" xmlns:r="http://schemas.openxmlformats.org/officeDocument/2006/relationships" xmlns:p14="http://schemas.microsoft.com/office/powerpoint/2010/main" xmlns:p15="http://schemas.microsoft.com/office/powerpoint/2012/main" xmlns:mc="http://schemas.openxmlformats.org/markup-compatibility/2006">
   <p:cSld>
     <p:spTree>
@@ -434,14 +437,14 @@
       </p:grpSpPr>
       <p:sp>
         <p:nvSpPr>
-          <p:cNvPr id="138" name="CustomShape 1"/>
+          <p:cNvPr id="141" name="CustomShape 1"/>
           <p:cNvSpPr/>
           <p:nvPr/>
         </p:nvSpPr>
         <p:spPr>
           <a:xfrm>
             <a:off x="3884760" y="8685360"/>
-            <a:ext cx="2970000" cy="455400"/>
+            <a:ext cx="2969640" cy="455040"/>
           </a:xfrm>
           <a:prstGeom prst="rect">
             <a:avLst/>
@@ -465,7 +468,7 @@
                 <a:spcPct val="100000"/>
               </a:lnSpc>
             </a:pPr>
-            <a:fld id="{4EA71646-B612-4C0E-8297-F7F0FE6EC2B3}" type="slidenum">
+            <a:fld id="{B0886A33-C9BC-422A-B78D-73FED29548B7}" type="slidenum">
               <a:rPr b="0" lang="en-US" sz="1200" spc="-1" strike="noStrike">
                 <a:solidFill>
                   <a:srgbClr val="000000"/>
@@ -496,14 +499,14 @@
       </p:sp>
       <p:sp>
         <p:nvSpPr>
-          <p:cNvPr id="139" name="CustomShape 2"/>
+          <p:cNvPr id="142" name="CustomShape 2"/>
           <p:cNvSpPr/>
           <p:nvPr/>
         </p:nvSpPr>
         <p:spPr>
           <a:xfrm>
             <a:off x="3884760" y="8685360"/>
-            <a:ext cx="2970000" cy="455400"/>
+            <a:ext cx="2969640" cy="455040"/>
           </a:xfrm>
           <a:prstGeom prst="rect">
             <a:avLst/>
@@ -527,7 +530,7 @@
                 <a:spcPct val="100000"/>
               </a:lnSpc>
             </a:pPr>
-            <a:fld id="{F0DC0796-3216-46FF-861B-761866CEB4FB}" type="slidenum">
+            <a:fld id="{4A379712-47B9-418E-AB6D-23811613F239}" type="slidenum">
               <a:rPr b="0" lang="en-US" sz="1200" spc="-1" strike="noStrike">
                 <a:solidFill>
                   <a:srgbClr val="000000"/>
@@ -558,14 +561,14 @@
       </p:sp>
       <p:sp>
         <p:nvSpPr>
-          <p:cNvPr id="140" name="CustomShape 3"/>
+          <p:cNvPr id="143" name="CustomShape 3"/>
           <p:cNvSpPr/>
           <p:nvPr/>
         </p:nvSpPr>
         <p:spPr>
           <a:xfrm>
             <a:off x="1143000" y="685800"/>
-            <a:ext cx="4570200" cy="3427200"/>
+            <a:ext cx="4569840" cy="3426840"/>
           </a:xfrm>
           <a:prstGeom prst="rect">
             <a:avLst/>
@@ -587,7 +590,7 @@
       </p:sp>
       <p:sp>
         <p:nvSpPr>
-          <p:cNvPr id="141" name="PlaceHolder 4"/>
+          <p:cNvPr id="144" name="PlaceHolder 4"/>
           <p:cNvSpPr>
             <a:spLocks noGrp="1"/>
           </p:cNvSpPr>
@@ -598,7 +601,7 @@
         <p:spPr>
           <a:xfrm>
             <a:off x="685800" y="4343400"/>
-            <a:ext cx="5484600" cy="4206600"/>
+            <a:ext cx="5484240" cy="4206240"/>
           </a:xfrm>
           <a:prstGeom prst="rect">
             <a:avLst/>
@@ -5085,7 +5088,7 @@
         <p:spPr>
           <a:xfrm>
             <a:off x="0" y="333360"/>
-            <a:ext cx="9142200" cy="6117840"/>
+            <a:ext cx="9141840" cy="6117480"/>
           </a:xfrm>
           <a:prstGeom prst="rect">
             <a:avLst/>
@@ -5104,7 +5107,7 @@
         <p:spPr>
           <a:xfrm>
             <a:off x="0" y="907920"/>
-            <a:ext cx="9142200" cy="5948280"/>
+            <a:ext cx="9141840" cy="5947920"/>
           </a:xfrm>
           <a:prstGeom prst="rect">
             <a:avLst/>
@@ -5139,7 +5142,7 @@
         <p:spPr>
           <a:xfrm>
             <a:off x="0" y="0"/>
-            <a:ext cx="9142200" cy="331560"/>
+            <a:ext cx="9141840" cy="331200"/>
           </a:xfrm>
           <a:prstGeom prst="rect">
             <a:avLst/>
@@ -5163,7 +5166,7 @@
         <p:spPr>
           <a:xfrm>
             <a:off x="0" y="6453360"/>
-            <a:ext cx="9142200" cy="429840"/>
+            <a:ext cx="9141840" cy="429480"/>
           </a:xfrm>
           <a:prstGeom prst="rect">
             <a:avLst/>
@@ -5186,7 +5189,7 @@
         <p:spPr>
           <a:xfrm>
             <a:off x="0" y="333360"/>
-            <a:ext cx="9142200" cy="6117840"/>
+            <a:ext cx="9141840" cy="6117480"/>
           </a:xfrm>
           <a:prstGeom prst="rect">
             <a:avLst/>
@@ -5210,7 +5213,7 @@
         <p:spPr>
           <a:xfrm>
             <a:off x="0" y="0"/>
-            <a:ext cx="9142200" cy="331560"/>
+            <a:ext cx="9141840" cy="331200"/>
           </a:xfrm>
           <a:prstGeom prst="rect">
             <a:avLst/>
@@ -5234,7 +5237,7 @@
         <p:spPr>
           <a:xfrm>
             <a:off x="0" y="6453360"/>
-            <a:ext cx="9142200" cy="429840"/>
+            <a:ext cx="9141840" cy="429480"/>
           </a:xfrm>
           <a:prstGeom prst="rect">
             <a:avLst/>
@@ -5620,7 +5623,7 @@
         <p:spPr>
           <a:xfrm>
             <a:off x="0" y="333360"/>
-            <a:ext cx="9142200" cy="6117840"/>
+            <a:ext cx="9141840" cy="6117480"/>
           </a:xfrm>
           <a:prstGeom prst="rect">
             <a:avLst/>
@@ -5639,7 +5642,7 @@
         <p:spPr>
           <a:xfrm>
             <a:off x="0" y="907920"/>
-            <a:ext cx="9142200" cy="5948280"/>
+            <a:ext cx="9141840" cy="5947920"/>
           </a:xfrm>
           <a:prstGeom prst="rect">
             <a:avLst/>
@@ -5674,7 +5677,7 @@
         <p:spPr>
           <a:xfrm>
             <a:off x="0" y="0"/>
-            <a:ext cx="9142200" cy="331560"/>
+            <a:ext cx="9141840" cy="331200"/>
           </a:xfrm>
           <a:prstGeom prst="rect">
             <a:avLst/>
@@ -5698,7 +5701,7 @@
         <p:spPr>
           <a:xfrm>
             <a:off x="0" y="6453360"/>
-            <a:ext cx="9142200" cy="429840"/>
+            <a:ext cx="9141840" cy="429480"/>
           </a:xfrm>
           <a:prstGeom prst="rect">
             <a:avLst/>
@@ -6084,7 +6087,7 @@
         <p:spPr>
           <a:xfrm>
             <a:off x="0" y="333360"/>
-            <a:ext cx="9142200" cy="6117840"/>
+            <a:ext cx="9141840" cy="6117480"/>
           </a:xfrm>
           <a:prstGeom prst="rect">
             <a:avLst/>
@@ -6103,7 +6106,7 @@
         <p:spPr>
           <a:xfrm>
             <a:off x="0" y="907920"/>
-            <a:ext cx="9142200" cy="5948280"/>
+            <a:ext cx="9141840" cy="5947920"/>
           </a:xfrm>
           <a:prstGeom prst="rect">
             <a:avLst/>
@@ -6138,7 +6141,7 @@
         <p:spPr>
           <a:xfrm>
             <a:off x="0" y="0"/>
-            <a:ext cx="9142200" cy="331560"/>
+            <a:ext cx="9141840" cy="331200"/>
           </a:xfrm>
           <a:prstGeom prst="rect">
             <a:avLst/>
@@ -6162,7 +6165,7 @@
         <p:spPr>
           <a:xfrm>
             <a:off x="0" y="6453360"/>
-            <a:ext cx="9142200" cy="429840"/>
+            <a:ext cx="9141840" cy="429480"/>
           </a:xfrm>
           <a:prstGeom prst="rect">
             <a:avLst/>
@@ -6537,7 +6540,7 @@
         <p:spPr>
           <a:xfrm>
             <a:off x="1116000" y="2349360"/>
-            <a:ext cx="7557840" cy="1468080"/>
+            <a:ext cx="7557480" cy="1467720"/>
           </a:xfrm>
           <a:prstGeom prst="rect">
             <a:avLst/>
@@ -6599,7 +6602,7 @@
         <p:spPr>
           <a:xfrm>
             <a:off x="7574040" y="5734080"/>
-            <a:ext cx="1193040" cy="575640"/>
+            <a:ext cx="1192680" cy="575280"/>
           </a:xfrm>
           <a:prstGeom prst="rect">
             <a:avLst/>
@@ -6746,7 +6749,7 @@
         <p:spPr>
           <a:xfrm>
             <a:off x="468360" y="346680"/>
-            <a:ext cx="8216640" cy="704520"/>
+            <a:ext cx="8216280" cy="704160"/>
           </a:xfrm>
           <a:prstGeom prst="rect">
             <a:avLst/>
@@ -6808,7 +6811,7 @@
         <p:spPr>
           <a:xfrm>
             <a:off x="971640" y="1144800"/>
-            <a:ext cx="7713360" cy="5071680"/>
+            <a:ext cx="7713000" cy="5071320"/>
           </a:xfrm>
           <a:prstGeom prst="rect">
             <a:avLst/>
@@ -6827,7 +6830,7 @@
         <p:txBody>
           <a:bodyPr lIns="90000" rIns="90000" tIns="45000" bIns="45000"/>
           <a:p>
-            <a:pPr marL="355680" indent="-353880">
+            <a:pPr marL="355680" indent="-353520">
               <a:lnSpc>
                 <a:spcPct val="100000"/>
               </a:lnSpc>
@@ -6865,7 +6868,7 @@
             </a:endParaRPr>
           </a:p>
           <a:p>
-            <a:pPr marL="355680" indent="-353880">
+            <a:pPr marL="355680" indent="-353520">
               <a:lnSpc>
                 <a:spcPct val="100000"/>
               </a:lnSpc>
@@ -6903,7 +6906,7 @@
             </a:endParaRPr>
           </a:p>
           <a:p>
-            <a:pPr marL="355680" indent="-353880">
+            <a:pPr marL="355680" indent="-353520">
               <a:lnSpc>
                 <a:spcPct val="100000"/>
               </a:lnSpc>
@@ -6941,7 +6944,7 @@
             </a:endParaRPr>
           </a:p>
           <a:p>
-            <a:pPr lvl="1" marL="432000" indent="-216000">
+            <a:pPr lvl="1" marL="432000" indent="-215640">
               <a:lnSpc>
                 <a:spcPct val="100000"/>
               </a:lnSpc>
@@ -6980,7 +6983,7 @@
             </a:endParaRPr>
           </a:p>
           <a:p>
-            <a:pPr lvl="1" marL="432000" indent="-216000">
+            <a:pPr lvl="1" marL="432000" indent="-215640">
               <a:lnSpc>
                 <a:spcPct val="100000"/>
               </a:lnSpc>
@@ -7019,7 +7022,7 @@
             </a:endParaRPr>
           </a:p>
           <a:p>
-            <a:pPr lvl="1" marL="432000" indent="-216000">
+            <a:pPr lvl="1" marL="432000" indent="-215640">
               <a:lnSpc>
                 <a:spcPct val="100000"/>
               </a:lnSpc>
@@ -7058,7 +7061,7 @@
             </a:endParaRPr>
           </a:p>
           <a:p>
-            <a:pPr lvl="1" marL="432000" indent="-216000">
+            <a:pPr lvl="1" marL="432000" indent="-215640">
               <a:lnSpc>
                 <a:spcPct val="100000"/>
               </a:lnSpc>
@@ -7097,7 +7100,7 @@
             </a:endParaRPr>
           </a:p>
           <a:p>
-            <a:pPr marL="355680" indent="-353880">
+            <a:pPr marL="355680" indent="-353520">
               <a:lnSpc>
                 <a:spcPct val="100000"/>
               </a:lnSpc>
@@ -7135,7 +7138,7 @@
             </a:endParaRPr>
           </a:p>
           <a:p>
-            <a:pPr marL="355680" indent="-353880">
+            <a:pPr marL="355680" indent="-353520">
               <a:lnSpc>
                 <a:spcPct val="100000"/>
               </a:lnSpc>
@@ -7173,7 +7176,7 @@
             </a:endParaRPr>
           </a:p>
           <a:p>
-            <a:pPr marL="355680" indent="-353880">
+            <a:pPr marL="355680" indent="-353520">
               <a:lnSpc>
                 <a:spcPct val="100000"/>
               </a:lnSpc>
@@ -7264,6 +7267,31 @@
           <a:chExt cx="0" cy="0"/>
         </a:xfrm>
       </p:grpSpPr>
+    </p:spTree>
+  </p:cSld>
+  <p:transition spd="slow">
+    <p:fade/>
+  </p:transition>
+</p:sld>
+</file>
+
+<file path=ppt/slides/slide4.xml><?xml version="1.0" encoding="utf-8"?>
+<p:sld xmlns:a="http://schemas.openxmlformats.org/drawingml/2006/main" xmlns:p="http://schemas.openxmlformats.org/presentationml/2006/main" xmlns:r="http://schemas.openxmlformats.org/officeDocument/2006/relationships" xmlns:p14="http://schemas.microsoft.com/office/powerpoint/2010/main" xmlns:p15="http://schemas.microsoft.com/office/powerpoint/2012/main" xmlns:mc="http://schemas.openxmlformats.org/markup-compatibility/2006">
+  <p:cSld>
+    <p:spTree>
+      <p:nvGrpSpPr>
+        <p:cNvPr id="1" name=""/>
+        <p:cNvGrpSpPr/>
+        <p:nvPr/>
+      </p:nvGrpSpPr>
+      <p:grpSpPr>
+        <a:xfrm>
+          <a:off x="0" y="0"/>
+          <a:ext cx="0" cy="0"/>
+          <a:chOff x="0" y="0"/>
+          <a:chExt cx="0" cy="0"/>
+        </a:xfrm>
+      </p:grpSpPr>
       <p:sp>
         <p:nvSpPr>
           <p:cNvPr id="132" name="CustomShape 1"/>
@@ -7273,7 +7301,7 @@
         <p:spPr>
           <a:xfrm>
             <a:off x="468360" y="346680"/>
-            <a:ext cx="8216640" cy="704520"/>
+            <a:ext cx="8216280" cy="704160"/>
           </a:xfrm>
           <a:prstGeom prst="rect">
             <a:avLst/>
@@ -7310,7 +7338,7 @@
                 <a:latin typeface="Arial"/>
                 <a:ea typeface="標楷體"/>
               </a:rPr>
-              <a:t>Reference</a:t>
+              <a:t>Volley</a:t>
             </a:r>
             <a:endParaRPr b="0" lang="en-US" sz="1800" spc="-1" strike="noStrike">
               <a:solidFill>
@@ -7326,16 +7354,64 @@
           </a:p>
         </p:txBody>
       </p:sp>
-      <p:sp>
-        <p:nvSpPr>
-          <p:cNvPr id="133" name="CustomShape 2"/>
-          <p:cNvSpPr/>
+    </p:spTree>
+  </p:cSld>
+  <p:transition spd="slow">
+    <p:fade/>
+  </p:transition>
+</p:sld>
+</file>
+
+<file path=ppt/slides/slide5.xml><?xml version="1.0" encoding="utf-8"?>
+<p:sld xmlns:a="http://schemas.openxmlformats.org/drawingml/2006/main" xmlns:p="http://schemas.openxmlformats.org/presentationml/2006/main" xmlns:r="http://schemas.openxmlformats.org/officeDocument/2006/relationships" xmlns:p14="http://schemas.microsoft.com/office/powerpoint/2010/main" xmlns:p15="http://schemas.microsoft.com/office/powerpoint/2012/main" xmlns:mc="http://schemas.openxmlformats.org/markup-compatibility/2006">
+  <p:cSld>
+    <p:spTree>
+      <p:nvGrpSpPr>
+        <p:cNvPr id="1" name=""/>
+        <p:cNvGrpSpPr/>
+        <p:nvPr/>
+      </p:nvGrpSpPr>
+      <p:grpSpPr>
+        <a:xfrm>
+          <a:off x="0" y="0"/>
+          <a:ext cx="0" cy="0"/>
+          <a:chOff x="0" y="0"/>
+          <a:chExt cx="0" cy="0"/>
+        </a:xfrm>
+      </p:grpSpPr>
+      <p:pic>
+        <p:nvPicPr>
+          <p:cNvPr id="133" name="" descr=""/>
+          <p:cNvPicPr/>
           <p:nvPr/>
-        </p:nvSpPr>
-        <p:spPr>
-          <a:xfrm>
-            <a:off x="971640" y="1144800"/>
-            <a:ext cx="7713360" cy="5071680"/>
+        </p:nvPicPr>
+        <p:blipFill>
+          <a:blip r:embed="rId1"/>
+          <a:stretch/>
+        </p:blipFill>
+        <p:spPr>
+          <a:xfrm>
+            <a:off x="1737360" y="2161080"/>
+            <a:ext cx="5669280" cy="3871080"/>
+          </a:xfrm>
+          <a:prstGeom prst="rect">
+            <a:avLst/>
+          </a:prstGeom>
+          <a:ln>
+            <a:noFill/>
+          </a:ln>
+        </p:spPr>
+      </p:pic>
+      <p:sp>
+        <p:nvSpPr>
+          <p:cNvPr id="134" name="TextShape 1"/>
+          <p:cNvSpPr txBox="1"/>
+          <p:nvPr/>
+        </p:nvSpPr>
+        <p:spPr>
+          <a:xfrm>
+            <a:off x="2413440" y="6014880"/>
+            <a:ext cx="4937760" cy="840240"/>
           </a:xfrm>
           <a:prstGeom prst="rect">
             <a:avLst/>
@@ -7345,29 +7421,13 @@
             <a:noFill/>
           </a:ln>
         </p:spPr>
-        <p:style>
-          <a:lnRef idx="0"/>
-          <a:fillRef idx="0"/>
-          <a:effectRef idx="0"/>
-          <a:fontRef idx="minor"/>
-        </p:style>
         <p:txBody>
           <a:bodyPr lIns="90000" rIns="90000" tIns="45000" bIns="45000"/>
           <a:p>
-            <a:pPr marL="355680" indent="-353880">
-              <a:lnSpc>
-                <a:spcPct val="100000"/>
-              </a:lnSpc>
-              <a:buClr>
-                <a:srgbClr val="333333"/>
-              </a:buClr>
-              <a:buFont typeface="Wingdings" charset="2"/>
-              <a:buChar char=""/>
-            </a:pPr>
             <a:r>
-              <a:rPr b="0" lang="en-US" sz="2000" spc="-1" strike="noStrike">
-                <a:solidFill>
-                  <a:srgbClr val="333333"/>
+              <a:rPr b="0" lang="en-US" sz="1000" spc="-1" strike="noStrike">
+                <a:solidFill>
+                  <a:srgbClr val="000000"/>
                 </a:solidFill>
                 <a:uFill>
                   <a:solidFill>
@@ -7375,37 +7435,13 @@
                   </a:solidFill>
                 </a:uFill>
                 <a:latin typeface="Arial"/>
-                <a:ea typeface="標楷體"/>
               </a:rPr>
-              <a:t> </a:t>
+              <a:t>From</a:t>
             </a:r>
-            <a:endParaRPr b="0" lang="en-US" sz="1800" spc="-1" strike="noStrike">
-              <a:solidFill>
-                <a:srgbClr val="000000"/>
-              </a:solidFill>
-              <a:uFill>
-                <a:solidFill>
-                  <a:srgbClr val="ffffff"/>
-                </a:solidFill>
-              </a:uFill>
-              <a:latin typeface="Arial"/>
-            </a:endParaRPr>
-          </a:p>
-          <a:p>
-            <a:pPr marL="355680" indent="-353880">
-              <a:lnSpc>
-                <a:spcPct val="100000"/>
-              </a:lnSpc>
-              <a:buClr>
-                <a:srgbClr val="333333"/>
-              </a:buClr>
-              <a:buFont typeface="Wingdings" charset="2"/>
-              <a:buChar char=""/>
-            </a:pPr>
             <a:r>
-              <a:rPr b="0" lang="en-US" sz="2000" spc="-1" strike="noStrike">
-                <a:solidFill>
-                  <a:srgbClr val="333333"/>
+              <a:rPr b="0" lang="en-US" sz="1000" spc="-1" strike="noStrike">
+                <a:solidFill>
+                  <a:srgbClr val="000000"/>
                 </a:solidFill>
                 <a:uFill>
                   <a:solidFill>
@@ -7413,37 +7449,13 @@
                   </a:solidFill>
                 </a:uFill>
                 <a:latin typeface="Arial"/>
-                <a:ea typeface="標楷體"/>
               </a:rPr>
-              <a:t> </a:t>
+              <a:t>：</a:t>
             </a:r>
-            <a:endParaRPr b="0" lang="en-US" sz="1800" spc="-1" strike="noStrike">
-              <a:solidFill>
-                <a:srgbClr val="000000"/>
-              </a:solidFill>
-              <a:uFill>
-                <a:solidFill>
-                  <a:srgbClr val="ffffff"/>
-                </a:solidFill>
-              </a:uFill>
-              <a:latin typeface="Arial"/>
-            </a:endParaRPr>
-          </a:p>
-          <a:p>
-            <a:pPr marL="355680" indent="-353880">
-              <a:lnSpc>
-                <a:spcPct val="100000"/>
-              </a:lnSpc>
-              <a:buClr>
-                <a:srgbClr val="333333"/>
-              </a:buClr>
-              <a:buFont typeface="Wingdings" charset="2"/>
-              <a:buChar char=""/>
-            </a:pPr>
             <a:r>
-              <a:rPr b="0" lang="en-US" sz="2000" spc="-1" strike="noStrike">
-                <a:solidFill>
-                  <a:srgbClr val="333333"/>
+              <a:rPr b="0" lang="en-US" sz="1000" spc="-1" strike="noStrike">
+                <a:solidFill>
+                  <a:srgbClr val="000000"/>
                 </a:solidFill>
                 <a:uFill>
                   <a:solidFill>
@@ -7451,106 +7463,24 @@
                   </a:solidFill>
                 </a:uFill>
                 <a:latin typeface="Arial"/>
-                <a:ea typeface="標楷體"/>
+                <a:hlinkClick r:id="rId2"/>
               </a:rPr>
-              <a:t>Image</a:t>
+              <a:t>http://code.tutsplus.com/tutorials/an-introduction-to-volley--cms-23800</a:t>
             </a:r>
-            <a:endParaRPr b="0" lang="en-US" sz="1800" spc="-1" strike="noStrike">
-              <a:solidFill>
-                <a:srgbClr val="000000"/>
-              </a:solidFill>
-              <a:uFill>
-                <a:solidFill>
-                  <a:srgbClr val="ffffff"/>
-                </a:solidFill>
-              </a:uFill>
-              <a:latin typeface="Arial"/>
-            </a:endParaRPr>
-          </a:p>
-          <a:p>
-            <a:pPr lvl="1" marL="432000" indent="-216000">
-              <a:lnSpc>
-                <a:spcPct val="100000"/>
-              </a:lnSpc>
-              <a:buClr>
-                <a:srgbClr val="000000"/>
-              </a:buClr>
-              <a:buSzPct val="45000"/>
-              <a:buFont typeface="Wingdings" charset="2"/>
-              <a:buChar char=""/>
-            </a:pPr>
-            <a:r>
-              <a:rPr b="0" lang="en-US" sz="2000" spc="-1" strike="noStrike">
-                <a:solidFill>
-                  <a:srgbClr val="333333"/>
-                </a:solidFill>
-                <a:uFill>
-                  <a:solidFill>
-                    <a:srgbClr val="ffffff"/>
-                  </a:solidFill>
-                </a:uFill>
-                <a:latin typeface="Arial"/>
-                <a:ea typeface="標楷體"/>
-              </a:rPr>
-              <a:t>http://stackoverflow.com/questions/13562429/how-many-ways-to-convert-bitmap-to-string-and-vice-versa</a:t>
-            </a:r>
-            <a:endParaRPr b="0" lang="en-US" sz="1800" spc="-1" strike="noStrike">
-              <a:solidFill>
-                <a:srgbClr val="000000"/>
-              </a:solidFill>
-              <a:uFill>
-                <a:solidFill>
-                  <a:srgbClr val="ffffff"/>
-                </a:solidFill>
-              </a:uFill>
-              <a:latin typeface="Arial"/>
-            </a:endParaRPr>
-          </a:p>
-          <a:p>
-            <a:pPr marL="355680" indent="-353880">
-              <a:lnSpc>
-                <a:spcPct val="100000"/>
-              </a:lnSpc>
-              <a:buClr>
-                <a:srgbClr val="333333"/>
-              </a:buClr>
-              <a:buFont typeface="Wingdings" charset="2"/>
-              <a:buChar char=""/>
-            </a:pPr>
-            <a:r>
-              <a:rPr b="0" lang="en-US" sz="2000" spc="-1" strike="noStrike">
-                <a:solidFill>
-                  <a:srgbClr val="333333"/>
-                </a:solidFill>
-                <a:uFill>
-                  <a:solidFill>
-                    <a:srgbClr val="ffffff"/>
-                  </a:solidFill>
-                </a:uFill>
-                <a:latin typeface="Arial"/>
-                <a:ea typeface="標楷體"/>
-              </a:rPr>
-              <a:t> </a:t>
-            </a:r>
-            <a:endParaRPr b="0" lang="en-US" sz="1800" spc="-1" strike="noStrike">
-              <a:solidFill>
-                <a:srgbClr val="000000"/>
-              </a:solidFill>
-              <a:uFill>
-                <a:solidFill>
-                  <a:srgbClr val="ffffff"/>
-                </a:solidFill>
-              </a:uFill>
-              <a:latin typeface="Arial"/>
-            </a:endParaRPr>
-          </a:p>
-          <a:p>
-            <a:pPr>
-              <a:lnSpc>
-                <a:spcPct val="100000"/>
-              </a:lnSpc>
-            </a:pPr>
-            <a:endParaRPr b="0" lang="en-US" sz="1800" spc="-1" strike="noStrike">
+            <a:endParaRPr b="0" lang="en-US" sz="1000" spc="-1" strike="noStrike">
+              <a:solidFill>
+                <a:srgbClr val="000000"/>
+              </a:solidFill>
+              <a:uFill>
+                <a:solidFill>
+                  <a:srgbClr val="ffffff"/>
+                </a:solidFill>
+              </a:uFill>
+              <a:latin typeface="Arial"/>
+            </a:endParaRPr>
+          </a:p>
+          <a:p>
+            <a:endParaRPr b="0" lang="en-US" sz="1000" spc="-1" strike="noStrike">
               <a:solidFill>
                 <a:srgbClr val="000000"/>
               </a:solidFill>
@@ -7599,7 +7529,359 @@
 </p:sld>
 </file>
 
-<file path=ppt/slides/slide4.xml><?xml version="1.0" encoding="utf-8"?>
+<file path=ppt/slides/slide6.xml><?xml version="1.0" encoding="utf-8"?>
+<p:sld xmlns:a="http://schemas.openxmlformats.org/drawingml/2006/main" xmlns:p="http://schemas.openxmlformats.org/presentationml/2006/main" xmlns:r="http://schemas.openxmlformats.org/officeDocument/2006/relationships" xmlns:p14="http://schemas.microsoft.com/office/powerpoint/2010/main" xmlns:p15="http://schemas.microsoft.com/office/powerpoint/2012/main" xmlns:mc="http://schemas.openxmlformats.org/markup-compatibility/2006">
+  <p:cSld>
+    <p:spTree>
+      <p:nvGrpSpPr>
+        <p:cNvPr id="1" name=""/>
+        <p:cNvGrpSpPr/>
+        <p:nvPr/>
+      </p:nvGrpSpPr>
+      <p:grpSpPr>
+        <a:xfrm>
+          <a:off x="0" y="0"/>
+          <a:ext cx="0" cy="0"/>
+          <a:chOff x="0" y="0"/>
+          <a:chExt cx="0" cy="0"/>
+        </a:xfrm>
+      </p:grpSpPr>
+      <p:sp>
+        <p:nvSpPr>
+          <p:cNvPr id="135" name="CustomShape 1"/>
+          <p:cNvSpPr/>
+          <p:nvPr/>
+        </p:nvSpPr>
+        <p:spPr>
+          <a:xfrm>
+            <a:off x="468360" y="346680"/>
+            <a:ext cx="8216280" cy="704160"/>
+          </a:xfrm>
+          <a:prstGeom prst="rect">
+            <a:avLst/>
+          </a:prstGeom>
+          <a:noFill/>
+          <a:ln>
+            <a:noFill/>
+          </a:ln>
+        </p:spPr>
+        <p:style>
+          <a:lnRef idx="0"/>
+          <a:fillRef idx="0"/>
+          <a:effectRef idx="0"/>
+          <a:fontRef idx="minor"/>
+        </p:style>
+        <p:txBody>
+          <a:bodyPr lIns="90000" rIns="90000" tIns="45000" bIns="45000" anchor="ctr"/>
+          <a:p>
+            <a:pPr>
+              <a:lnSpc>
+                <a:spcPct val="100000"/>
+              </a:lnSpc>
+            </a:pPr>
+            <a:r>
+              <a:rPr b="1" lang="en-US" sz="3200" spc="-1" strike="noStrike">
+                <a:solidFill>
+                  <a:srgbClr val="333333"/>
+                </a:solidFill>
+                <a:uFill>
+                  <a:solidFill>
+                    <a:srgbClr val="ffffff"/>
+                  </a:solidFill>
+                </a:uFill>
+                <a:latin typeface="Arial"/>
+                <a:ea typeface="標楷體"/>
+              </a:rPr>
+              <a:t>Reference</a:t>
+            </a:r>
+            <a:endParaRPr b="0" lang="en-US" sz="1800" spc="-1" strike="noStrike">
+              <a:solidFill>
+                <a:srgbClr val="000000"/>
+              </a:solidFill>
+              <a:uFill>
+                <a:solidFill>
+                  <a:srgbClr val="ffffff"/>
+                </a:solidFill>
+              </a:uFill>
+              <a:latin typeface="Arial"/>
+            </a:endParaRPr>
+          </a:p>
+        </p:txBody>
+      </p:sp>
+      <p:sp>
+        <p:nvSpPr>
+          <p:cNvPr id="136" name="CustomShape 2"/>
+          <p:cNvSpPr/>
+          <p:nvPr/>
+        </p:nvSpPr>
+        <p:spPr>
+          <a:xfrm>
+            <a:off x="971640" y="1144800"/>
+            <a:ext cx="7713000" cy="5071320"/>
+          </a:xfrm>
+          <a:prstGeom prst="rect">
+            <a:avLst/>
+          </a:prstGeom>
+          <a:noFill/>
+          <a:ln>
+            <a:noFill/>
+          </a:ln>
+        </p:spPr>
+        <p:style>
+          <a:lnRef idx="0"/>
+          <a:fillRef idx="0"/>
+          <a:effectRef idx="0"/>
+          <a:fontRef idx="minor"/>
+        </p:style>
+        <p:txBody>
+          <a:bodyPr lIns="90000" rIns="90000" tIns="45000" bIns="45000"/>
+          <a:p>
+            <a:pPr marL="355680" indent="-353520">
+              <a:lnSpc>
+                <a:spcPct val="100000"/>
+              </a:lnSpc>
+              <a:buClr>
+                <a:srgbClr val="333333"/>
+              </a:buClr>
+              <a:buFont typeface="Wingdings" charset="2"/>
+              <a:buChar char=""/>
+            </a:pPr>
+            <a:r>
+              <a:rPr b="0" lang="en-US" sz="2000" spc="-1" strike="noStrike">
+                <a:solidFill>
+                  <a:srgbClr val="333333"/>
+                </a:solidFill>
+                <a:uFill>
+                  <a:solidFill>
+                    <a:srgbClr val="ffffff"/>
+                  </a:solidFill>
+                </a:uFill>
+                <a:latin typeface="Arial"/>
+                <a:ea typeface="標楷體"/>
+              </a:rPr>
+              <a:t> </a:t>
+            </a:r>
+            <a:endParaRPr b="0" lang="en-US" sz="1800" spc="-1" strike="noStrike">
+              <a:solidFill>
+                <a:srgbClr val="000000"/>
+              </a:solidFill>
+              <a:uFill>
+                <a:solidFill>
+                  <a:srgbClr val="ffffff"/>
+                </a:solidFill>
+              </a:uFill>
+              <a:latin typeface="Arial"/>
+            </a:endParaRPr>
+          </a:p>
+          <a:p>
+            <a:pPr marL="355680" indent="-353520">
+              <a:lnSpc>
+                <a:spcPct val="100000"/>
+              </a:lnSpc>
+              <a:buClr>
+                <a:srgbClr val="333333"/>
+              </a:buClr>
+              <a:buFont typeface="Wingdings" charset="2"/>
+              <a:buChar char=""/>
+            </a:pPr>
+            <a:r>
+              <a:rPr b="0" lang="en-US" sz="2000" spc="-1" strike="noStrike">
+                <a:solidFill>
+                  <a:srgbClr val="333333"/>
+                </a:solidFill>
+                <a:uFill>
+                  <a:solidFill>
+                    <a:srgbClr val="ffffff"/>
+                  </a:solidFill>
+                </a:uFill>
+                <a:latin typeface="Arial"/>
+                <a:ea typeface="標楷體"/>
+              </a:rPr>
+              <a:t> </a:t>
+            </a:r>
+            <a:endParaRPr b="0" lang="en-US" sz="1800" spc="-1" strike="noStrike">
+              <a:solidFill>
+                <a:srgbClr val="000000"/>
+              </a:solidFill>
+              <a:uFill>
+                <a:solidFill>
+                  <a:srgbClr val="ffffff"/>
+                </a:solidFill>
+              </a:uFill>
+              <a:latin typeface="Arial"/>
+            </a:endParaRPr>
+          </a:p>
+          <a:p>
+            <a:pPr marL="355680" indent="-353520">
+              <a:lnSpc>
+                <a:spcPct val="100000"/>
+              </a:lnSpc>
+              <a:buClr>
+                <a:srgbClr val="333333"/>
+              </a:buClr>
+              <a:buFont typeface="Wingdings" charset="2"/>
+              <a:buChar char=""/>
+            </a:pPr>
+            <a:r>
+              <a:rPr b="0" lang="en-US" sz="2000" spc="-1" strike="noStrike">
+                <a:solidFill>
+                  <a:srgbClr val="333333"/>
+                </a:solidFill>
+                <a:uFill>
+                  <a:solidFill>
+                    <a:srgbClr val="ffffff"/>
+                  </a:solidFill>
+                </a:uFill>
+                <a:latin typeface="Arial"/>
+                <a:ea typeface="標楷體"/>
+              </a:rPr>
+              <a:t>Image</a:t>
+            </a:r>
+            <a:endParaRPr b="0" lang="en-US" sz="1800" spc="-1" strike="noStrike">
+              <a:solidFill>
+                <a:srgbClr val="000000"/>
+              </a:solidFill>
+              <a:uFill>
+                <a:solidFill>
+                  <a:srgbClr val="ffffff"/>
+                </a:solidFill>
+              </a:uFill>
+              <a:latin typeface="Arial"/>
+            </a:endParaRPr>
+          </a:p>
+          <a:p>
+            <a:pPr lvl="1" marL="432000" indent="-215640">
+              <a:lnSpc>
+                <a:spcPct val="100000"/>
+              </a:lnSpc>
+              <a:buClr>
+                <a:srgbClr val="000000"/>
+              </a:buClr>
+              <a:buSzPct val="45000"/>
+              <a:buFont typeface="Wingdings" charset="2"/>
+              <a:buChar char=""/>
+            </a:pPr>
+            <a:r>
+              <a:rPr b="0" lang="en-US" sz="2000" spc="-1" strike="noStrike">
+                <a:solidFill>
+                  <a:srgbClr val="333333"/>
+                </a:solidFill>
+                <a:uFill>
+                  <a:solidFill>
+                    <a:srgbClr val="ffffff"/>
+                  </a:solidFill>
+                </a:uFill>
+                <a:latin typeface="Arial"/>
+                <a:ea typeface="標楷體"/>
+              </a:rPr>
+              <a:t>http://stackoverflow.com/questions/13562429/how-many-ways-to-convert-bitmap-to-string-and-vice-versa</a:t>
+            </a:r>
+            <a:endParaRPr b="0" lang="en-US" sz="1800" spc="-1" strike="noStrike">
+              <a:solidFill>
+                <a:srgbClr val="000000"/>
+              </a:solidFill>
+              <a:uFill>
+                <a:solidFill>
+                  <a:srgbClr val="ffffff"/>
+                </a:solidFill>
+              </a:uFill>
+              <a:latin typeface="Arial"/>
+            </a:endParaRPr>
+          </a:p>
+          <a:p>
+            <a:pPr marL="355680" indent="-353520">
+              <a:lnSpc>
+                <a:spcPct val="100000"/>
+              </a:lnSpc>
+              <a:buClr>
+                <a:srgbClr val="333333"/>
+              </a:buClr>
+              <a:buFont typeface="Wingdings" charset="2"/>
+              <a:buChar char=""/>
+            </a:pPr>
+            <a:r>
+              <a:rPr b="0" lang="en-US" sz="2000" spc="-1" strike="noStrike">
+                <a:solidFill>
+                  <a:srgbClr val="333333"/>
+                </a:solidFill>
+                <a:uFill>
+                  <a:solidFill>
+                    <a:srgbClr val="ffffff"/>
+                  </a:solidFill>
+                </a:uFill>
+                <a:latin typeface="Arial"/>
+                <a:ea typeface="標楷體"/>
+              </a:rPr>
+              <a:t> </a:t>
+            </a:r>
+            <a:endParaRPr b="0" lang="en-US" sz="1800" spc="-1" strike="noStrike">
+              <a:solidFill>
+                <a:srgbClr val="000000"/>
+              </a:solidFill>
+              <a:uFill>
+                <a:solidFill>
+                  <a:srgbClr val="ffffff"/>
+                </a:solidFill>
+              </a:uFill>
+              <a:latin typeface="Arial"/>
+            </a:endParaRPr>
+          </a:p>
+          <a:p>
+            <a:pPr>
+              <a:lnSpc>
+                <a:spcPct val="100000"/>
+              </a:lnSpc>
+            </a:pPr>
+            <a:endParaRPr b="0" lang="en-US" sz="1800" spc="-1" strike="noStrike">
+              <a:solidFill>
+                <a:srgbClr val="000000"/>
+              </a:solidFill>
+              <a:uFill>
+                <a:solidFill>
+                  <a:srgbClr val="ffffff"/>
+                </a:solidFill>
+              </a:uFill>
+              <a:latin typeface="Arial"/>
+            </a:endParaRPr>
+          </a:p>
+        </p:txBody>
+      </p:sp>
+    </p:spTree>
+  </p:cSld>
+  <p:transition spd="slow">
+    <p:fade/>
+  </p:transition>
+  <p:timing>
+    <p:tnLst>
+      <p:par>
+        <p:cTn id="7" dur="indefinite" restart="never" nodeType="tmRoot">
+          <p:childTnLst>
+            <p:seq>
+              <p:cTn id="8" nodeType="mainSeq"/>
+              <p:prevCondLst>
+                <p:cond delay="0" evt="onPrev">
+                  <p:tgtEl>
+                    <p:sldTgt/>
+                  </p:tgtEl>
+                </p:cond>
+              </p:prevCondLst>
+              <p:nextCondLst>
+                <p:cond delay="0" evt="onNext">
+                  <p:tgtEl>
+                    <p:sldTgt/>
+                  </p:tgtEl>
+                </p:cond>
+              </p:nextCondLst>
+            </p:seq>
+          </p:childTnLst>
+        </p:cTn>
+      </p:par>
+    </p:tnLst>
+  </p:timing>
+</p:sld>
+</file>
+
+<file path=ppt/slides/slide7.xml><?xml version="1.0" encoding="utf-8"?>
 <p:sld xmlns:a="http://schemas.openxmlformats.org/drawingml/2006/main" xmlns:p="http://schemas.openxmlformats.org/presentationml/2006/main" xmlns:r="http://schemas.openxmlformats.org/officeDocument/2006/relationships" xmlns:p14="http://schemas.microsoft.com/office/powerpoint/2010/main" xmlns:p15="http://schemas.microsoft.com/office/powerpoint/2012/main" xmlns:mc="http://schemas.openxmlformats.org/markup-compatibility/2006">
   <p:cSld>
     <p:spTree>
@@ -7618,7 +7900,7 @@
       </p:grpSpPr>
       <p:pic>
         <p:nvPicPr>
-          <p:cNvPr id="134" name="Picture 2" descr=""/>
+          <p:cNvPr id="137" name="Picture 2" descr=""/>
           <p:cNvPicPr/>
           <p:nvPr/>
         </p:nvPicPr>
@@ -7630,7 +7912,7 @@
         <p:spPr>
           <a:xfrm>
             <a:off x="0" y="333360"/>
-            <a:ext cx="4570200" cy="6117840"/>
+            <a:ext cx="4569840" cy="6117480"/>
           </a:xfrm>
           <a:prstGeom prst="rect">
             <a:avLst/>
@@ -7642,14 +7924,14 @@
       </p:pic>
       <p:sp>
         <p:nvSpPr>
-          <p:cNvPr id="135" name="CustomShape 1"/>
+          <p:cNvPr id="138" name="CustomShape 1"/>
           <p:cNvSpPr/>
           <p:nvPr/>
         </p:nvSpPr>
         <p:spPr>
           <a:xfrm>
             <a:off x="5792760" y="3141720"/>
-            <a:ext cx="1779480" cy="641160"/>
+            <a:ext cx="1779120" cy="640800"/>
           </a:xfrm>
           <a:prstGeom prst="rect">
             <a:avLst/>
@@ -7710,38 +7992,38 @@
   <p:timing>
     <p:tnLst>
       <p:par>
-        <p:cTn id="7" dur="indefinite" restart="never" nodeType="tmRoot">
+        <p:cTn id="9" dur="indefinite" restart="never" nodeType="tmRoot">
           <p:childTnLst>
             <p:seq>
-              <p:cTn id="8" dur="indefinite" nodeType="mainSeq">
+              <p:cTn id="10" dur="indefinite" nodeType="mainSeq">
                 <p:childTnLst>
                   <p:par>
-                    <p:cTn id="9" nodeType="clickEffect" fill="hold">
+                    <p:cTn id="11" nodeType="clickEffect" fill="hold">
                       <p:stCondLst>
                         <p:cond delay="indefinite"/>
                       </p:stCondLst>
                       <p:childTnLst>
                         <p:par>
-                          <p:cTn id="10" nodeType="withEffect" fill="hold">
+                          <p:cTn id="12" nodeType="withEffect" fill="hold">
                             <p:stCondLst>
                               <p:cond delay="0"/>
                             </p:stCondLst>
                             <p:childTnLst>
                               <p:par>
-                                <p:cTn id="11" nodeType="clickEffect" fill="hold" presetClass="entr" presetID="10">
+                                <p:cTn id="13" nodeType="clickEffect" fill="hold" presetClass="entr" presetID="10">
                                   <p:stCondLst>
                                     <p:cond delay="0"/>
                                   </p:stCondLst>
                                   <p:childTnLst>
                                     <p:set>
                                       <p:cBhvr>
-                                        <p:cTn id="12" dur="1" fill="hold">
+                                        <p:cTn id="14" dur="1" fill="hold">
                                           <p:stCondLst>
                                             <p:cond delay="0"/>
                                           </p:stCondLst>
                                         </p:cTn>
                                         <p:tgtEl>
-                                          <p:spTgt spid="135"/>
+                                          <p:spTgt spid="138"/>
                                         </p:tgtEl>
                                         <p:attrNameLst>
                                           <p:attrName>style.visibility</p:attrName>
@@ -7753,9 +8035,9 @@
                                     </p:set>
                                     <p:animEffect filter="fade" transition="in">
                                       <p:cBhvr additive="repl">
-                                        <p:cTn id="13" dur="2000"/>
+                                        <p:cTn id="15" dur="2000"/>
                                         <p:tgtEl>
-                                          <p:spTgt spid="135"/>
+                                          <p:spTgt spid="138"/>
                                         </p:tgtEl>
                                       </p:cBhvr>
                                     </p:animEffect>

</xml_diff>

<commit_message>
update ppt: special case; update README: permisson
</commit_message>
<xml_diff>
--- a/Android-PHP-from-mysql_Arc.pptx
+++ b/Android-PHP-from-mysql_Arc.pptx
@@ -17,6 +17,11 @@
     <p:sldId id="260" r:id="rId10"/>
     <p:sldId id="261" r:id="rId11"/>
     <p:sldId id="262" r:id="rId12"/>
+    <p:sldId id="263" r:id="rId13"/>
+    <p:sldId id="264" r:id="rId14"/>
+    <p:sldId id="265" r:id="rId15"/>
+    <p:sldId id="266" r:id="rId16"/>
+    <p:sldId id="267" r:id="rId17"/>
   </p:sldIdLst>
   <p:sldSz cx="9144000" cy="6858000"/>
   <p:notesSz cx="6858000" cy="9144000"/>
@@ -124,7 +129,7 @@
                 </a:uFill>
                 <a:latin typeface="Times New Roman"/>
               </a:rPr>
-              <a:t>&lt;header&gt;</a:t>
+              <a:t> </a:t>
             </a:r>
             <a:endParaRPr b="0" lang="en-US" sz="1400" spc="-1" strike="noStrike">
               <a:solidFill>
@@ -175,7 +180,7 @@
                 </a:uFill>
                 <a:latin typeface="Times New Roman"/>
               </a:rPr>
-              <a:t>&lt;date/time&gt;</a:t>
+              <a:t> </a:t>
             </a:r>
             <a:endParaRPr b="0" lang="en-US" sz="1400" spc="-1" strike="noStrike">
               <a:solidFill>
@@ -225,7 +230,7 @@
                 </a:uFill>
                 <a:latin typeface="Times New Roman"/>
               </a:rPr>
-              <a:t>&lt;footer&gt;</a:t>
+              <a:t> </a:t>
             </a:r>
             <a:endParaRPr b="0" lang="en-US" sz="1400" spc="-1" strike="noStrike">
               <a:solidFill>
@@ -264,7 +269,7 @@
           <a:bodyPr lIns="0" rIns="0" tIns="0" bIns="0" anchor="b"/>
           <a:p>
             <a:pPr algn="r"/>
-            <a:fld id="{3F12AD8A-7F23-4540-BEB8-6F59F7788805}" type="slidenum">
+            <a:fld id="{8E26FB7A-7961-4066-A234-D6C296464AEE}" type="slidenum">
               <a:rPr b="0" lang="en-US" sz="1400" spc="-1" strike="noStrike">
                 <a:solidFill>
                   <a:srgbClr val="000000"/>
@@ -276,7 +281,7 @@
                 </a:uFill>
                 <a:latin typeface="Times New Roman"/>
               </a:rPr>
-              <a:t>&lt;number&gt;</a:t>
+              <a:t>1</a:t>
             </a:fld>
             <a:endParaRPr b="0" lang="en-US" sz="1400" spc="-1" strike="noStrike">
               <a:solidFill>
@@ -317,14 +322,14 @@
       </p:grpSpPr>
       <p:sp>
         <p:nvSpPr>
-          <p:cNvPr id="139" name="CustomShape 1"/>
+          <p:cNvPr id="156" name="CustomShape 1"/>
           <p:cNvSpPr/>
           <p:nvPr/>
         </p:nvSpPr>
         <p:spPr>
           <a:xfrm>
             <a:off x="3884760" y="8685360"/>
-            <a:ext cx="2969640" cy="455040"/>
+            <a:ext cx="2968560" cy="453960"/>
           </a:xfrm>
           <a:prstGeom prst="rect">
             <a:avLst/>
@@ -340,46 +345,10 @@
           <a:effectRef idx="0"/>
           <a:fontRef idx="minor"/>
         </p:style>
-        <p:txBody>
-          <a:bodyPr lIns="90000" rIns="90000" tIns="45000" bIns="45000" anchor="b"/>
-          <a:p>
-            <a:pPr algn="r">
-              <a:lnSpc>
-                <a:spcPct val="100000"/>
-              </a:lnSpc>
-            </a:pPr>
-            <a:fld id="{10D8E558-5702-4051-9853-521AA4B14503}" type="slidenum">
-              <a:rPr b="0" lang="en-US" sz="1200" spc="-1" strike="noStrike">
-                <a:solidFill>
-                  <a:srgbClr val="000000"/>
-                </a:solidFill>
-                <a:uFill>
-                  <a:solidFill>
-                    <a:srgbClr val="ffffff"/>
-                  </a:solidFill>
-                </a:uFill>
-                <a:latin typeface="Arial"/>
-                <a:ea typeface="新細明體"/>
-              </a:rPr>
-              <a:t>&lt;number&gt;</a:t>
-            </a:fld>
-            <a:endParaRPr b="0" lang="en-US" sz="1800" spc="-1" strike="noStrike">
-              <a:solidFill>
-                <a:srgbClr val="000000"/>
-              </a:solidFill>
-              <a:uFill>
-                <a:solidFill>
-                  <a:srgbClr val="ffffff"/>
-                </a:solidFill>
-              </a:uFill>
-              <a:latin typeface="Arial"/>
-            </a:endParaRPr>
-          </a:p>
-        </p:txBody>
-      </p:sp>
-      <p:sp>
-        <p:nvSpPr>
-          <p:cNvPr id="140" name="PlaceHolder 2"/>
+      </p:sp>
+      <p:sp>
+        <p:nvSpPr>
+          <p:cNvPr id="157" name="PlaceHolder 2"/>
           <p:cNvSpPr>
             <a:spLocks noGrp="1"/>
           </p:cNvSpPr>
@@ -390,7 +359,7 @@
         <p:spPr>
           <a:xfrm>
             <a:off x="685800" y="4343400"/>
-            <a:ext cx="5484240" cy="4112640"/>
+            <a:ext cx="5483160" cy="4111560"/>
           </a:xfrm>
           <a:prstGeom prst="rect">
             <a:avLst/>
@@ -418,7 +387,7 @@
 </p:notes>
 </file>
 
-<file path=ppt/notesSlides/notesSlide7.xml><?xml version="1.0" encoding="utf-8"?>
+<file path=ppt/notesSlides/notesSlide12.xml><?xml version="1.0" encoding="utf-8"?>
 <p:notes xmlns:a="http://schemas.openxmlformats.org/drawingml/2006/main" xmlns:p="http://schemas.openxmlformats.org/presentationml/2006/main" xmlns:r="http://schemas.openxmlformats.org/officeDocument/2006/relationships" xmlns:p14="http://schemas.microsoft.com/office/powerpoint/2010/main" xmlns:p15="http://schemas.microsoft.com/office/powerpoint/2012/main" xmlns:mc="http://schemas.openxmlformats.org/markup-compatibility/2006">
   <p:cSld>
     <p:spTree>
@@ -437,14 +406,14 @@
       </p:grpSpPr>
       <p:sp>
         <p:nvSpPr>
-          <p:cNvPr id="141" name="CustomShape 1"/>
+          <p:cNvPr id="158" name="CustomShape 1"/>
           <p:cNvSpPr/>
           <p:nvPr/>
         </p:nvSpPr>
         <p:spPr>
           <a:xfrm>
             <a:off x="3884760" y="8685360"/>
-            <a:ext cx="2969640" cy="455040"/>
+            <a:ext cx="2968560" cy="453960"/>
           </a:xfrm>
           <a:prstGeom prst="rect">
             <a:avLst/>
@@ -460,53 +429,17 @@
           <a:effectRef idx="0"/>
           <a:fontRef idx="minor"/>
         </p:style>
-        <p:txBody>
-          <a:bodyPr lIns="90000" rIns="90000" tIns="45000" bIns="45000" anchor="b"/>
-          <a:p>
-            <a:pPr algn="r">
-              <a:lnSpc>
-                <a:spcPct val="100000"/>
-              </a:lnSpc>
-            </a:pPr>
-            <a:fld id="{B0886A33-C9BC-422A-B78D-73FED29548B7}" type="slidenum">
-              <a:rPr b="0" lang="en-US" sz="1200" spc="-1" strike="noStrike">
-                <a:solidFill>
-                  <a:srgbClr val="000000"/>
-                </a:solidFill>
-                <a:uFill>
-                  <a:solidFill>
-                    <a:srgbClr val="ffffff"/>
-                  </a:solidFill>
-                </a:uFill>
-                <a:latin typeface="Arial"/>
-                <a:ea typeface="新細明體"/>
-              </a:rPr>
-              <a:t>&lt;number&gt;</a:t>
-            </a:fld>
-            <a:endParaRPr b="0" lang="en-US" sz="1800" spc="-1" strike="noStrike">
-              <a:solidFill>
-                <a:srgbClr val="000000"/>
-              </a:solidFill>
-              <a:uFill>
-                <a:solidFill>
-                  <a:srgbClr val="ffffff"/>
-                </a:solidFill>
-              </a:uFill>
-              <a:latin typeface="Arial"/>
-            </a:endParaRPr>
-          </a:p>
-        </p:txBody>
-      </p:sp>
-      <p:sp>
-        <p:nvSpPr>
-          <p:cNvPr id="142" name="CustomShape 2"/>
+      </p:sp>
+      <p:sp>
+        <p:nvSpPr>
+          <p:cNvPr id="159" name="CustomShape 2"/>
           <p:cNvSpPr/>
           <p:nvPr/>
         </p:nvSpPr>
         <p:spPr>
           <a:xfrm>
             <a:off x="3884760" y="8685360"/>
-            <a:ext cx="2969640" cy="455040"/>
+            <a:ext cx="2968560" cy="453960"/>
           </a:xfrm>
           <a:prstGeom prst="rect">
             <a:avLst/>
@@ -522,53 +455,17 @@
           <a:effectRef idx="0"/>
           <a:fontRef idx="minor"/>
         </p:style>
-        <p:txBody>
-          <a:bodyPr lIns="90000" rIns="90000" tIns="46800" bIns="46800" anchor="b"/>
-          <a:p>
-            <a:pPr algn="r">
-              <a:lnSpc>
-                <a:spcPct val="100000"/>
-              </a:lnSpc>
-            </a:pPr>
-            <a:fld id="{4A379712-47B9-418E-AB6D-23811613F239}" type="slidenum">
-              <a:rPr b="0" lang="en-US" sz="1200" spc="-1" strike="noStrike">
-                <a:solidFill>
-                  <a:srgbClr val="000000"/>
-                </a:solidFill>
-                <a:uFill>
-                  <a:solidFill>
-                    <a:srgbClr val="ffffff"/>
-                  </a:solidFill>
-                </a:uFill>
-                <a:latin typeface="Arial"/>
-                <a:ea typeface="新細明體"/>
-              </a:rPr>
-              <a:t>&lt;number&gt;</a:t>
-            </a:fld>
-            <a:endParaRPr b="0" lang="en-US" sz="1800" spc="-1" strike="noStrike">
-              <a:solidFill>
-                <a:srgbClr val="000000"/>
-              </a:solidFill>
-              <a:uFill>
-                <a:solidFill>
-                  <a:srgbClr val="ffffff"/>
-                </a:solidFill>
-              </a:uFill>
-              <a:latin typeface="Arial"/>
-            </a:endParaRPr>
-          </a:p>
-        </p:txBody>
-      </p:sp>
-      <p:sp>
-        <p:nvSpPr>
-          <p:cNvPr id="143" name="CustomShape 3"/>
+      </p:sp>
+      <p:sp>
+        <p:nvSpPr>
+          <p:cNvPr id="160" name="CustomShape 3"/>
           <p:cNvSpPr/>
           <p:nvPr/>
         </p:nvSpPr>
         <p:spPr>
           <a:xfrm>
             <a:off x="1143000" y="685800"/>
-            <a:ext cx="4569840" cy="3426840"/>
+            <a:ext cx="4568760" cy="3425760"/>
           </a:xfrm>
           <a:prstGeom prst="rect">
             <a:avLst/>
@@ -590,7 +487,7 @@
       </p:sp>
       <p:sp>
         <p:nvSpPr>
-          <p:cNvPr id="144" name="PlaceHolder 4"/>
+          <p:cNvPr id="161" name="PlaceHolder 4"/>
           <p:cNvSpPr>
             <a:spLocks noGrp="1"/>
           </p:cNvSpPr>
@@ -601,7 +498,7 @@
         <p:spPr>
           <a:xfrm>
             <a:off x="685800" y="4343400"/>
-            <a:ext cx="5484240" cy="4206240"/>
+            <a:ext cx="5483160" cy="4205160"/>
           </a:xfrm>
           <a:prstGeom prst="rect">
             <a:avLst/>
@@ -5088,7 +4985,7 @@
         <p:spPr>
           <a:xfrm>
             <a:off x="0" y="333360"/>
-            <a:ext cx="9141840" cy="6117480"/>
+            <a:ext cx="9140760" cy="6116400"/>
           </a:xfrm>
           <a:prstGeom prst="rect">
             <a:avLst/>
@@ -5107,7 +5004,7 @@
         <p:spPr>
           <a:xfrm>
             <a:off x="0" y="907920"/>
-            <a:ext cx="9141840" cy="5947920"/>
+            <a:ext cx="9140760" cy="5946840"/>
           </a:xfrm>
           <a:prstGeom prst="rect">
             <a:avLst/>
@@ -5142,7 +5039,7 @@
         <p:spPr>
           <a:xfrm>
             <a:off x="0" y="0"/>
-            <a:ext cx="9141840" cy="331200"/>
+            <a:ext cx="9140760" cy="330120"/>
           </a:xfrm>
           <a:prstGeom prst="rect">
             <a:avLst/>
@@ -5166,7 +5063,7 @@
         <p:spPr>
           <a:xfrm>
             <a:off x="0" y="6453360"/>
-            <a:ext cx="9141840" cy="429480"/>
+            <a:ext cx="9140760" cy="428400"/>
           </a:xfrm>
           <a:prstGeom prst="rect">
             <a:avLst/>
@@ -5189,7 +5086,7 @@
         <p:spPr>
           <a:xfrm>
             <a:off x="0" y="333360"/>
-            <a:ext cx="9141840" cy="6117480"/>
+            <a:ext cx="9140760" cy="6116400"/>
           </a:xfrm>
           <a:prstGeom prst="rect">
             <a:avLst/>
@@ -5213,7 +5110,7 @@
         <p:spPr>
           <a:xfrm>
             <a:off x="0" y="0"/>
-            <a:ext cx="9141840" cy="331200"/>
+            <a:ext cx="9140760" cy="330120"/>
           </a:xfrm>
           <a:prstGeom prst="rect">
             <a:avLst/>
@@ -5237,7 +5134,7 @@
         <p:spPr>
           <a:xfrm>
             <a:off x="0" y="6453360"/>
-            <a:ext cx="9141840" cy="429480"/>
+            <a:ext cx="9140760" cy="428400"/>
           </a:xfrm>
           <a:prstGeom prst="rect">
             <a:avLst/>
@@ -5623,7 +5520,7 @@
         <p:spPr>
           <a:xfrm>
             <a:off x="0" y="333360"/>
-            <a:ext cx="9141840" cy="6117480"/>
+            <a:ext cx="9140760" cy="6116400"/>
           </a:xfrm>
           <a:prstGeom prst="rect">
             <a:avLst/>
@@ -5642,7 +5539,7 @@
         <p:spPr>
           <a:xfrm>
             <a:off x="0" y="907920"/>
-            <a:ext cx="9141840" cy="5947920"/>
+            <a:ext cx="9140760" cy="5946840"/>
           </a:xfrm>
           <a:prstGeom prst="rect">
             <a:avLst/>
@@ -5677,7 +5574,7 @@
         <p:spPr>
           <a:xfrm>
             <a:off x="0" y="0"/>
-            <a:ext cx="9141840" cy="331200"/>
+            <a:ext cx="9140760" cy="330120"/>
           </a:xfrm>
           <a:prstGeom prst="rect">
             <a:avLst/>
@@ -5701,7 +5598,7 @@
         <p:spPr>
           <a:xfrm>
             <a:off x="0" y="6453360"/>
-            <a:ext cx="9141840" cy="429480"/>
+            <a:ext cx="9140760" cy="428400"/>
           </a:xfrm>
           <a:prstGeom prst="rect">
             <a:avLst/>
@@ -6087,7 +5984,7 @@
         <p:spPr>
           <a:xfrm>
             <a:off x="0" y="333360"/>
-            <a:ext cx="9141840" cy="6117480"/>
+            <a:ext cx="9140760" cy="6116400"/>
           </a:xfrm>
           <a:prstGeom prst="rect">
             <a:avLst/>
@@ -6106,7 +6003,7 @@
         <p:spPr>
           <a:xfrm>
             <a:off x="0" y="907920"/>
-            <a:ext cx="9141840" cy="5947920"/>
+            <a:ext cx="9140760" cy="5946840"/>
           </a:xfrm>
           <a:prstGeom prst="rect">
             <a:avLst/>
@@ -6141,7 +6038,7 @@
         <p:spPr>
           <a:xfrm>
             <a:off x="0" y="0"/>
-            <a:ext cx="9141840" cy="331200"/>
+            <a:ext cx="9140760" cy="330120"/>
           </a:xfrm>
           <a:prstGeom prst="rect">
             <a:avLst/>
@@ -6165,7 +6062,7 @@
         <p:spPr>
           <a:xfrm>
             <a:off x="0" y="6453360"/>
-            <a:ext cx="9141840" cy="429480"/>
+            <a:ext cx="9140760" cy="428400"/>
           </a:xfrm>
           <a:prstGeom prst="rect">
             <a:avLst/>
@@ -6210,7 +6107,21 @@
                 </a:uFill>
                 <a:latin typeface="Arial"/>
               </a:rPr>
-              <a:t>Click to edit the title text format</a:t>
+              <a:t>Click to edit the title text </a:t>
+            </a:r>
+            <a:r>
+              <a:rPr b="0" lang="en-US" sz="4400" spc="-1" strike="noStrike">
+                <a:solidFill>
+                  <a:srgbClr val="000000"/>
+                </a:solidFill>
+                <a:uFill>
+                  <a:solidFill>
+                    <a:srgbClr val="ffffff"/>
+                  </a:solidFill>
+                </a:uFill>
+                <a:latin typeface="Arial"/>
+              </a:rPr>
+              <a:t>format</a:t>
             </a:r>
             <a:endParaRPr b="0" lang="en-US" sz="4400" spc="-1" strike="noStrike">
               <a:solidFill>
@@ -6540,7 +6451,7 @@
         <p:spPr>
           <a:xfrm>
             <a:off x="1116000" y="2349360"/>
-            <a:ext cx="7557480" cy="1467720"/>
+            <a:ext cx="7556400" cy="1466640"/>
           </a:xfrm>
           <a:prstGeom prst="rect">
             <a:avLst/>
@@ -6602,7 +6513,7 @@
         <p:spPr>
           <a:xfrm>
             <a:off x="7574040" y="5734080"/>
-            <a:ext cx="1192680" cy="575280"/>
+            <a:ext cx="1191600" cy="574200"/>
           </a:xfrm>
           <a:prstGeom prst="rect">
             <a:avLst/>
@@ -6700,6 +6611,834 @@
           <p:childTnLst>
             <p:seq>
               <p:cTn id="2" nodeType="mainSeq"/>
+              <p:prevCondLst>
+                <p:cond delay="0" evt="onPrev">
+                  <p:tgtEl>
+                    <p:sldTgt/>
+                  </p:tgtEl>
+                </p:cond>
+              </p:prevCondLst>
+              <p:nextCondLst>
+                <p:cond delay="0" evt="onNext">
+                  <p:tgtEl>
+                    <p:sldTgt/>
+                  </p:tgtEl>
+                </p:cond>
+              </p:nextCondLst>
+            </p:seq>
+          </p:childTnLst>
+        </p:cTn>
+      </p:par>
+    </p:tnLst>
+  </p:timing>
+</p:sld>
+</file>
+
+<file path=ppt/slides/slide10.xml><?xml version="1.0" encoding="utf-8"?>
+<p:sld xmlns:a="http://schemas.openxmlformats.org/drawingml/2006/main" xmlns:p="http://schemas.openxmlformats.org/presentationml/2006/main" xmlns:r="http://schemas.openxmlformats.org/officeDocument/2006/relationships" xmlns:p14="http://schemas.microsoft.com/office/powerpoint/2010/main" xmlns:p15="http://schemas.microsoft.com/office/powerpoint/2012/main" xmlns:mc="http://schemas.openxmlformats.org/markup-compatibility/2006">
+  <p:cSld>
+    <p:spTree>
+      <p:nvGrpSpPr>
+        <p:cNvPr id="1" name=""/>
+        <p:cNvGrpSpPr/>
+        <p:nvPr/>
+      </p:nvGrpSpPr>
+      <p:grpSpPr>
+        <a:xfrm>
+          <a:off x="0" y="0"/>
+          <a:ext cx="0" cy="0"/>
+          <a:chOff x="0" y="0"/>
+          <a:chExt cx="0" cy="0"/>
+        </a:xfrm>
+      </p:grpSpPr>
+      <p:sp>
+        <p:nvSpPr>
+          <p:cNvPr id="148" name="CustomShape 1"/>
+          <p:cNvSpPr/>
+          <p:nvPr/>
+        </p:nvSpPr>
+        <p:spPr>
+          <a:xfrm>
+            <a:off x="468360" y="346680"/>
+            <a:ext cx="8215200" cy="703080"/>
+          </a:xfrm>
+          <a:prstGeom prst="rect">
+            <a:avLst/>
+          </a:prstGeom>
+          <a:noFill/>
+          <a:ln>
+            <a:noFill/>
+          </a:ln>
+        </p:spPr>
+        <p:style>
+          <a:lnRef idx="0"/>
+          <a:fillRef idx="0"/>
+          <a:effectRef idx="0"/>
+          <a:fontRef idx="minor"/>
+        </p:style>
+        <p:txBody>
+          <a:bodyPr lIns="90000" rIns="90000" tIns="45000" bIns="45000" anchor="ctr"/>
+          <a:p>
+            <a:pPr>
+              <a:lnSpc>
+                <a:spcPct val="100000"/>
+              </a:lnSpc>
+            </a:pPr>
+            <a:r>
+              <a:rPr b="1" lang="en-US" sz="3200" spc="-1" strike="noStrike">
+                <a:solidFill>
+                  <a:srgbClr val="333333"/>
+                </a:solidFill>
+                <a:uFill>
+                  <a:solidFill>
+                    <a:srgbClr val="ffffff"/>
+                  </a:solidFill>
+                </a:uFill>
+                <a:latin typeface="Arial"/>
+                <a:ea typeface="標楷體"/>
+              </a:rPr>
+              <a:t>Example</a:t>
+            </a:r>
+            <a:endParaRPr b="0" lang="en-US" sz="1800" spc="-1" strike="noStrike">
+              <a:solidFill>
+                <a:srgbClr val="000000"/>
+              </a:solidFill>
+              <a:uFill>
+                <a:solidFill>
+                  <a:srgbClr val="ffffff"/>
+                </a:solidFill>
+              </a:uFill>
+              <a:latin typeface="Arial"/>
+            </a:endParaRPr>
+          </a:p>
+        </p:txBody>
+      </p:sp>
+      <p:sp>
+        <p:nvSpPr>
+          <p:cNvPr id="149" name="CustomShape 2"/>
+          <p:cNvSpPr/>
+          <p:nvPr/>
+        </p:nvSpPr>
+        <p:spPr>
+          <a:xfrm>
+            <a:off x="971640" y="1144800"/>
+            <a:ext cx="7711920" cy="5070240"/>
+          </a:xfrm>
+          <a:prstGeom prst="rect">
+            <a:avLst/>
+          </a:prstGeom>
+          <a:noFill/>
+          <a:ln>
+            <a:noFill/>
+          </a:ln>
+        </p:spPr>
+        <p:style>
+          <a:lnRef idx="0"/>
+          <a:fillRef idx="0"/>
+          <a:effectRef idx="0"/>
+          <a:fontRef idx="minor"/>
+        </p:style>
+        <p:txBody>
+          <a:bodyPr lIns="90000" rIns="90000" tIns="45000" bIns="45000"/>
+          <a:p>
+            <a:pPr>
+              <a:lnSpc>
+                <a:spcPct val="100000"/>
+              </a:lnSpc>
+            </a:pPr>
+            <a:r>
+              <a:rPr b="0" lang="en-US" sz="2000" spc="-1" strike="noStrike">
+                <a:solidFill>
+                  <a:srgbClr val="333333"/>
+                </a:solidFill>
+                <a:uFill>
+                  <a:solidFill>
+                    <a:srgbClr val="ffffff"/>
+                  </a:solidFill>
+                </a:uFill>
+                <a:latin typeface="Arial"/>
+                <a:ea typeface="標楷體"/>
+              </a:rPr>
+              <a:t> </a:t>
+            </a:r>
+            <a:r>
+              <a:rPr b="0" lang="en-US" sz="2000" spc="-1" strike="noStrike">
+                <a:solidFill>
+                  <a:srgbClr val="333333"/>
+                </a:solidFill>
+                <a:uFill>
+                  <a:solidFill>
+                    <a:srgbClr val="ffffff"/>
+                  </a:solidFill>
+                </a:uFill>
+                <a:latin typeface="Arial"/>
+                <a:ea typeface="標楷體"/>
+              </a:rPr>
+              <a:t>GO to my GitHub and git clone the folder </a:t>
+            </a:r>
+            <a:endParaRPr b="0" lang="en-US" sz="1800" spc="-1" strike="noStrike">
+              <a:solidFill>
+                <a:srgbClr val="000000"/>
+              </a:solidFill>
+              <a:uFill>
+                <a:solidFill>
+                  <a:srgbClr val="ffffff"/>
+                </a:solidFill>
+              </a:uFill>
+              <a:latin typeface="Arial"/>
+            </a:endParaRPr>
+          </a:p>
+          <a:p>
+            <a:pPr>
+              <a:lnSpc>
+                <a:spcPct val="100000"/>
+              </a:lnSpc>
+            </a:pPr>
+            <a:endParaRPr b="0" lang="en-US" sz="1800" spc="-1" strike="noStrike">
+              <a:solidFill>
+                <a:srgbClr val="000000"/>
+              </a:solidFill>
+              <a:uFill>
+                <a:solidFill>
+                  <a:srgbClr val="ffffff"/>
+                </a:solidFill>
+              </a:uFill>
+              <a:latin typeface="Arial"/>
+            </a:endParaRPr>
+          </a:p>
+        </p:txBody>
+      </p:sp>
+      <p:sp>
+        <p:nvSpPr>
+          <p:cNvPr id="150" name="TextShape 3"/>
+          <p:cNvSpPr txBox="1"/>
+          <p:nvPr/>
+        </p:nvSpPr>
+        <p:spPr>
+          <a:xfrm>
+            <a:off x="1980360" y="4404600"/>
+            <a:ext cx="5883480" cy="346680"/>
+          </a:xfrm>
+          <a:prstGeom prst="rect">
+            <a:avLst/>
+          </a:prstGeom>
+          <a:noFill/>
+          <a:ln>
+            <a:noFill/>
+          </a:ln>
+        </p:spPr>
+        <p:txBody>
+          <a:bodyPr lIns="90000" rIns="90000" tIns="45000" bIns="45000"/>
+          <a:p>
+            <a:r>
+              <a:rPr b="0" lang="en-US" sz="1800" spc="-1" strike="noStrike">
+                <a:solidFill>
+                  <a:srgbClr val="000000"/>
+                </a:solidFill>
+                <a:uFill>
+                  <a:solidFill>
+                    <a:srgbClr val="ffffff"/>
+                  </a:solidFill>
+                </a:uFill>
+                <a:latin typeface="Arial"/>
+              </a:rPr>
+              <a:t>https://github.com/arcprince1236/Android_Volley_tutorial</a:t>
+            </a:r>
+            <a:endParaRPr b="0" lang="en-US" sz="1800" spc="-1" strike="noStrike">
+              <a:solidFill>
+                <a:srgbClr val="000000"/>
+              </a:solidFill>
+              <a:uFill>
+                <a:solidFill>
+                  <a:srgbClr val="ffffff"/>
+                </a:solidFill>
+              </a:uFill>
+              <a:latin typeface="Arial"/>
+            </a:endParaRPr>
+          </a:p>
+        </p:txBody>
+      </p:sp>
+      <p:pic>
+        <p:nvPicPr>
+          <p:cNvPr id="151" name="" descr=""/>
+          <p:cNvPicPr/>
+          <p:nvPr/>
+        </p:nvPicPr>
+        <p:blipFill>
+          <a:blip r:embed="rId1"/>
+          <a:stretch/>
+        </p:blipFill>
+        <p:spPr>
+          <a:xfrm>
+            <a:off x="1223280" y="2004120"/>
+            <a:ext cx="7175160" cy="2659320"/>
+          </a:xfrm>
+          <a:prstGeom prst="rect">
+            <a:avLst/>
+          </a:prstGeom>
+          <a:ln>
+            <a:noFill/>
+          </a:ln>
+        </p:spPr>
+      </p:pic>
+    </p:spTree>
+  </p:cSld>
+  <p:transition spd="slow">
+    <p:fade/>
+  </p:transition>
+  <p:timing>
+    <p:tnLst>
+      <p:par>
+        <p:cTn id="19" dur="indefinite" restart="never" nodeType="tmRoot">
+          <p:childTnLst>
+            <p:seq>
+              <p:cTn id="20" nodeType="mainSeq"/>
+              <p:prevCondLst>
+                <p:cond delay="0" evt="onPrev">
+                  <p:tgtEl>
+                    <p:sldTgt/>
+                  </p:tgtEl>
+                </p:cond>
+              </p:prevCondLst>
+              <p:nextCondLst>
+                <p:cond delay="0" evt="onNext">
+                  <p:tgtEl>
+                    <p:sldTgt/>
+                  </p:tgtEl>
+                </p:cond>
+              </p:nextCondLst>
+            </p:seq>
+          </p:childTnLst>
+        </p:cTn>
+      </p:par>
+    </p:tnLst>
+  </p:timing>
+</p:sld>
+</file>
+
+<file path=ppt/slides/slide11.xml><?xml version="1.0" encoding="utf-8"?>
+<p:sld xmlns:a="http://schemas.openxmlformats.org/drawingml/2006/main" xmlns:p="http://schemas.openxmlformats.org/presentationml/2006/main" xmlns:r="http://schemas.openxmlformats.org/officeDocument/2006/relationships" xmlns:p14="http://schemas.microsoft.com/office/powerpoint/2010/main" xmlns:p15="http://schemas.microsoft.com/office/powerpoint/2012/main" xmlns:mc="http://schemas.openxmlformats.org/markup-compatibility/2006">
+  <p:cSld>
+    <p:spTree>
+      <p:nvGrpSpPr>
+        <p:cNvPr id="1" name=""/>
+        <p:cNvGrpSpPr/>
+        <p:nvPr/>
+      </p:nvGrpSpPr>
+      <p:grpSpPr>
+        <a:xfrm>
+          <a:off x="0" y="0"/>
+          <a:ext cx="0" cy="0"/>
+          <a:chOff x="0" y="0"/>
+          <a:chExt cx="0" cy="0"/>
+        </a:xfrm>
+      </p:grpSpPr>
+      <p:sp>
+        <p:nvSpPr>
+          <p:cNvPr id="152" name="CustomShape 1"/>
+          <p:cNvSpPr/>
+          <p:nvPr/>
+        </p:nvSpPr>
+        <p:spPr>
+          <a:xfrm>
+            <a:off x="468360" y="346680"/>
+            <a:ext cx="8215200" cy="703080"/>
+          </a:xfrm>
+          <a:prstGeom prst="rect">
+            <a:avLst/>
+          </a:prstGeom>
+          <a:noFill/>
+          <a:ln>
+            <a:noFill/>
+          </a:ln>
+        </p:spPr>
+        <p:style>
+          <a:lnRef idx="0"/>
+          <a:fillRef idx="0"/>
+          <a:effectRef idx="0"/>
+          <a:fontRef idx="minor"/>
+        </p:style>
+        <p:txBody>
+          <a:bodyPr lIns="90000" rIns="90000" tIns="45000" bIns="45000" anchor="ctr"/>
+          <a:p>
+            <a:pPr>
+              <a:lnSpc>
+                <a:spcPct val="100000"/>
+              </a:lnSpc>
+            </a:pPr>
+            <a:r>
+              <a:rPr b="1" lang="en-US" sz="3200" spc="-1" strike="noStrike">
+                <a:solidFill>
+                  <a:srgbClr val="333333"/>
+                </a:solidFill>
+                <a:uFill>
+                  <a:solidFill>
+                    <a:srgbClr val="ffffff"/>
+                  </a:solidFill>
+                </a:uFill>
+                <a:latin typeface="Arial"/>
+                <a:ea typeface="標楷體"/>
+              </a:rPr>
+              <a:t>Reference</a:t>
+            </a:r>
+            <a:endParaRPr b="0" lang="en-US" sz="1800" spc="-1" strike="noStrike">
+              <a:solidFill>
+                <a:srgbClr val="000000"/>
+              </a:solidFill>
+              <a:uFill>
+                <a:solidFill>
+                  <a:srgbClr val="ffffff"/>
+                </a:solidFill>
+              </a:uFill>
+              <a:latin typeface="Arial"/>
+            </a:endParaRPr>
+          </a:p>
+        </p:txBody>
+      </p:sp>
+      <p:sp>
+        <p:nvSpPr>
+          <p:cNvPr id="153" name="CustomShape 2"/>
+          <p:cNvSpPr/>
+          <p:nvPr/>
+        </p:nvSpPr>
+        <p:spPr>
+          <a:xfrm>
+            <a:off x="971640" y="1144800"/>
+            <a:ext cx="7711920" cy="5070240"/>
+          </a:xfrm>
+          <a:prstGeom prst="rect">
+            <a:avLst/>
+          </a:prstGeom>
+          <a:noFill/>
+          <a:ln>
+            <a:noFill/>
+          </a:ln>
+        </p:spPr>
+        <p:style>
+          <a:lnRef idx="0"/>
+          <a:fillRef idx="0"/>
+          <a:effectRef idx="0"/>
+          <a:fontRef idx="minor"/>
+        </p:style>
+        <p:txBody>
+          <a:bodyPr lIns="90000" rIns="90000" tIns="45000" bIns="45000"/>
+          <a:p>
+            <a:pPr marL="355680" indent="-352440">
+              <a:lnSpc>
+                <a:spcPct val="100000"/>
+              </a:lnSpc>
+              <a:buClr>
+                <a:srgbClr val="333333"/>
+              </a:buClr>
+              <a:buFont typeface="Wingdings" charset="2"/>
+              <a:buChar char=""/>
+            </a:pPr>
+            <a:r>
+              <a:rPr b="0" lang="en-US" sz="2000" spc="-1" strike="noStrike">
+                <a:solidFill>
+                  <a:srgbClr val="333333"/>
+                </a:solidFill>
+                <a:uFill>
+                  <a:solidFill>
+                    <a:srgbClr val="ffffff"/>
+                  </a:solidFill>
+                </a:uFill>
+                <a:latin typeface="Arial"/>
+                <a:ea typeface="標楷體"/>
+              </a:rPr>
+              <a:t> </a:t>
+            </a:r>
+            <a:endParaRPr b="0" lang="en-US" sz="1800" spc="-1" strike="noStrike">
+              <a:solidFill>
+                <a:srgbClr val="000000"/>
+              </a:solidFill>
+              <a:uFill>
+                <a:solidFill>
+                  <a:srgbClr val="ffffff"/>
+                </a:solidFill>
+              </a:uFill>
+              <a:latin typeface="Arial"/>
+            </a:endParaRPr>
+          </a:p>
+          <a:p>
+            <a:pPr marL="355680" indent="-352440">
+              <a:lnSpc>
+                <a:spcPct val="100000"/>
+              </a:lnSpc>
+              <a:buClr>
+                <a:srgbClr val="333333"/>
+              </a:buClr>
+              <a:buFont typeface="Wingdings" charset="2"/>
+              <a:buChar char=""/>
+            </a:pPr>
+            <a:r>
+              <a:rPr b="0" lang="en-US" sz="2000" spc="-1" strike="noStrike">
+                <a:solidFill>
+                  <a:srgbClr val="333333"/>
+                </a:solidFill>
+                <a:uFill>
+                  <a:solidFill>
+                    <a:srgbClr val="ffffff"/>
+                  </a:solidFill>
+                </a:uFill>
+                <a:latin typeface="Arial"/>
+                <a:ea typeface="標楷體"/>
+              </a:rPr>
+              <a:t> </a:t>
+            </a:r>
+            <a:endParaRPr b="0" lang="en-US" sz="1800" spc="-1" strike="noStrike">
+              <a:solidFill>
+                <a:srgbClr val="000000"/>
+              </a:solidFill>
+              <a:uFill>
+                <a:solidFill>
+                  <a:srgbClr val="ffffff"/>
+                </a:solidFill>
+              </a:uFill>
+              <a:latin typeface="Arial"/>
+            </a:endParaRPr>
+          </a:p>
+          <a:p>
+            <a:pPr marL="355680" indent="-352440">
+              <a:lnSpc>
+                <a:spcPct val="100000"/>
+              </a:lnSpc>
+              <a:buClr>
+                <a:srgbClr val="333333"/>
+              </a:buClr>
+              <a:buFont typeface="Wingdings" charset="2"/>
+              <a:buChar char=""/>
+            </a:pPr>
+            <a:r>
+              <a:rPr b="0" lang="en-US" sz="2000" spc="-1" strike="noStrike">
+                <a:solidFill>
+                  <a:srgbClr val="333333"/>
+                </a:solidFill>
+                <a:uFill>
+                  <a:solidFill>
+                    <a:srgbClr val="ffffff"/>
+                  </a:solidFill>
+                </a:uFill>
+                <a:latin typeface="Arial"/>
+                <a:ea typeface="標楷體"/>
+              </a:rPr>
+              <a:t>Image</a:t>
+            </a:r>
+            <a:endParaRPr b="0" lang="en-US" sz="1800" spc="-1" strike="noStrike">
+              <a:solidFill>
+                <a:srgbClr val="000000"/>
+              </a:solidFill>
+              <a:uFill>
+                <a:solidFill>
+                  <a:srgbClr val="ffffff"/>
+                </a:solidFill>
+              </a:uFill>
+              <a:latin typeface="Arial"/>
+            </a:endParaRPr>
+          </a:p>
+          <a:p>
+            <a:pPr lvl="1" marL="432000" indent="-214560">
+              <a:lnSpc>
+                <a:spcPct val="100000"/>
+              </a:lnSpc>
+              <a:buClr>
+                <a:srgbClr val="000000"/>
+              </a:buClr>
+              <a:buSzPct val="45000"/>
+              <a:buFont typeface="Wingdings" charset="2"/>
+              <a:buChar char=""/>
+            </a:pPr>
+            <a:r>
+              <a:rPr b="0" lang="en-US" sz="2000" spc="-1" strike="noStrike">
+                <a:solidFill>
+                  <a:srgbClr val="333333"/>
+                </a:solidFill>
+                <a:uFill>
+                  <a:solidFill>
+                    <a:srgbClr val="ffffff"/>
+                  </a:solidFill>
+                </a:uFill>
+                <a:latin typeface="Arial"/>
+                <a:ea typeface="標楷體"/>
+              </a:rPr>
+              <a:t>http://stackoverflow.com/questions/13562429/how-many-ways-to-convert-bitmap-to-string-and-vice-versa</a:t>
+            </a:r>
+            <a:endParaRPr b="0" lang="en-US" sz="1800" spc="-1" strike="noStrike">
+              <a:solidFill>
+                <a:srgbClr val="000000"/>
+              </a:solidFill>
+              <a:uFill>
+                <a:solidFill>
+                  <a:srgbClr val="ffffff"/>
+                </a:solidFill>
+              </a:uFill>
+              <a:latin typeface="Arial"/>
+            </a:endParaRPr>
+          </a:p>
+          <a:p>
+            <a:pPr marL="355680" indent="-352440">
+              <a:lnSpc>
+                <a:spcPct val="100000"/>
+              </a:lnSpc>
+              <a:buClr>
+                <a:srgbClr val="333333"/>
+              </a:buClr>
+              <a:buFont typeface="Wingdings" charset="2"/>
+              <a:buChar char=""/>
+            </a:pPr>
+            <a:r>
+              <a:rPr b="0" lang="en-US" sz="2000" spc="-1" strike="noStrike">
+                <a:solidFill>
+                  <a:srgbClr val="333333"/>
+                </a:solidFill>
+                <a:uFill>
+                  <a:solidFill>
+                    <a:srgbClr val="ffffff"/>
+                  </a:solidFill>
+                </a:uFill>
+                <a:latin typeface="Arial"/>
+                <a:ea typeface="標楷體"/>
+              </a:rPr>
+              <a:t> </a:t>
+            </a:r>
+            <a:endParaRPr b="0" lang="en-US" sz="1800" spc="-1" strike="noStrike">
+              <a:solidFill>
+                <a:srgbClr val="000000"/>
+              </a:solidFill>
+              <a:uFill>
+                <a:solidFill>
+                  <a:srgbClr val="ffffff"/>
+                </a:solidFill>
+              </a:uFill>
+              <a:latin typeface="Arial"/>
+            </a:endParaRPr>
+          </a:p>
+          <a:p>
+            <a:pPr>
+              <a:lnSpc>
+                <a:spcPct val="100000"/>
+              </a:lnSpc>
+            </a:pPr>
+            <a:endParaRPr b="0" lang="en-US" sz="1800" spc="-1" strike="noStrike">
+              <a:solidFill>
+                <a:srgbClr val="000000"/>
+              </a:solidFill>
+              <a:uFill>
+                <a:solidFill>
+                  <a:srgbClr val="ffffff"/>
+                </a:solidFill>
+              </a:uFill>
+              <a:latin typeface="Arial"/>
+            </a:endParaRPr>
+          </a:p>
+        </p:txBody>
+      </p:sp>
+    </p:spTree>
+  </p:cSld>
+  <p:transition spd="slow">
+    <p:fade/>
+  </p:transition>
+  <p:timing>
+    <p:tnLst>
+      <p:par>
+        <p:cTn id="21" dur="indefinite" restart="never" nodeType="tmRoot">
+          <p:childTnLst>
+            <p:seq>
+              <p:cTn id="22" nodeType="mainSeq"/>
+              <p:prevCondLst>
+                <p:cond delay="0" evt="onPrev">
+                  <p:tgtEl>
+                    <p:sldTgt/>
+                  </p:tgtEl>
+                </p:cond>
+              </p:prevCondLst>
+              <p:nextCondLst>
+                <p:cond delay="0" evt="onNext">
+                  <p:tgtEl>
+                    <p:sldTgt/>
+                  </p:tgtEl>
+                </p:cond>
+              </p:nextCondLst>
+            </p:seq>
+          </p:childTnLst>
+        </p:cTn>
+      </p:par>
+    </p:tnLst>
+  </p:timing>
+</p:sld>
+</file>
+
+<file path=ppt/slides/slide12.xml><?xml version="1.0" encoding="utf-8"?>
+<p:sld xmlns:a="http://schemas.openxmlformats.org/drawingml/2006/main" xmlns:p="http://schemas.openxmlformats.org/presentationml/2006/main" xmlns:r="http://schemas.openxmlformats.org/officeDocument/2006/relationships" xmlns:p14="http://schemas.microsoft.com/office/powerpoint/2010/main" xmlns:p15="http://schemas.microsoft.com/office/powerpoint/2012/main" xmlns:mc="http://schemas.openxmlformats.org/markup-compatibility/2006">
+  <p:cSld>
+    <p:spTree>
+      <p:nvGrpSpPr>
+        <p:cNvPr id="1" name=""/>
+        <p:cNvGrpSpPr/>
+        <p:nvPr/>
+      </p:nvGrpSpPr>
+      <p:grpSpPr>
+        <a:xfrm>
+          <a:off x="0" y="0"/>
+          <a:ext cx="0" cy="0"/>
+          <a:chOff x="0" y="0"/>
+          <a:chExt cx="0" cy="0"/>
+        </a:xfrm>
+      </p:grpSpPr>
+      <p:pic>
+        <p:nvPicPr>
+          <p:cNvPr id="154" name="Picture 2" descr=""/>
+          <p:cNvPicPr/>
+          <p:nvPr/>
+        </p:nvPicPr>
+        <p:blipFill>
+          <a:blip r:embed="rId1"/>
+          <a:srcRect l="0" t="0" r="50004" b="0"/>
+          <a:stretch/>
+        </p:blipFill>
+        <p:spPr>
+          <a:xfrm>
+            <a:off x="0" y="333360"/>
+            <a:ext cx="4568760" cy="6116400"/>
+          </a:xfrm>
+          <a:prstGeom prst="rect">
+            <a:avLst/>
+          </a:prstGeom>
+          <a:ln>
+            <a:noFill/>
+          </a:ln>
+        </p:spPr>
+      </p:pic>
+      <p:sp>
+        <p:nvSpPr>
+          <p:cNvPr id="155" name="CustomShape 1"/>
+          <p:cNvSpPr/>
+          <p:nvPr/>
+        </p:nvSpPr>
+        <p:spPr>
+          <a:xfrm>
+            <a:off x="5792760" y="3141720"/>
+            <a:ext cx="1778040" cy="639720"/>
+          </a:xfrm>
+          <a:prstGeom prst="rect">
+            <a:avLst/>
+          </a:prstGeom>
+          <a:noFill/>
+          <a:ln w="9360">
+            <a:noFill/>
+          </a:ln>
+        </p:spPr>
+        <p:style>
+          <a:lnRef idx="0"/>
+          <a:fillRef idx="0"/>
+          <a:effectRef idx="0"/>
+          <a:fontRef idx="minor"/>
+        </p:style>
+        <p:txBody>
+          <a:bodyPr wrap="none" lIns="90000" rIns="90000" tIns="46800" bIns="46800"/>
+          <a:p>
+            <a:pPr>
+              <a:lnSpc>
+                <a:spcPct val="100000"/>
+              </a:lnSpc>
+            </a:pPr>
+            <a:r>
+              <a:rPr b="1" lang="en-US" sz="3600" spc="-1" strike="noStrike">
+                <a:solidFill>
+                  <a:srgbClr val="000000"/>
+                </a:solidFill>
+                <a:uFill>
+                  <a:solidFill>
+                    <a:srgbClr val="ffffff"/>
+                  </a:solidFill>
+                </a:uFill>
+                <a:latin typeface="Arial"/>
+                <a:ea typeface="新細明體"/>
+              </a:rPr>
+              <a:t>Thanks</a:t>
+            </a:r>
+            <a:endParaRPr b="0" lang="en-US" sz="1800" spc="-1" strike="noStrike">
+              <a:solidFill>
+                <a:srgbClr val="000000"/>
+              </a:solidFill>
+              <a:uFill>
+                <a:solidFill>
+                  <a:srgbClr val="ffffff"/>
+                </a:solidFill>
+              </a:uFill>
+              <a:latin typeface="Arial"/>
+            </a:endParaRPr>
+          </a:p>
+        </p:txBody>
+      </p:sp>
+    </p:spTree>
+  </p:cSld>
+  <p:transition spd="slow">
+    <p:fade/>
+  </p:transition>
+  <p:timing>
+    <p:tnLst>
+      <p:par>
+        <p:cTn id="23" dur="indefinite" restart="never" nodeType="tmRoot">
+          <p:childTnLst>
+            <p:seq>
+              <p:cTn id="24" dur="indefinite" nodeType="mainSeq">
+                <p:childTnLst>
+                  <p:par>
+                    <p:cTn id="25" nodeType="clickEffect" fill="hold">
+                      <p:stCondLst>
+                        <p:cond delay="indefinite"/>
+                      </p:stCondLst>
+                      <p:childTnLst>
+                        <p:par>
+                          <p:cTn id="26" nodeType="withEffect" fill="hold">
+                            <p:stCondLst>
+                              <p:cond delay="0"/>
+                            </p:stCondLst>
+                            <p:childTnLst>
+                              <p:par>
+                                <p:cTn id="27" nodeType="clickEffect" fill="hold" presetClass="entr" presetID="10">
+                                  <p:stCondLst>
+                                    <p:cond delay="0"/>
+                                  </p:stCondLst>
+                                  <p:childTnLst>
+                                    <p:set>
+                                      <p:cBhvr>
+                                        <p:cTn id="28" dur="1" fill="hold">
+                                          <p:stCondLst>
+                                            <p:cond delay="0"/>
+                                          </p:stCondLst>
+                                        </p:cTn>
+                                        <p:tgtEl>
+                                          <p:spTgt spid="155"/>
+                                        </p:tgtEl>
+                                        <p:attrNameLst>
+                                          <p:attrName>style.visibility</p:attrName>
+                                        </p:attrNameLst>
+                                      </p:cBhvr>
+                                      <p:to>
+                                        <p:strVal val="visible"/>
+                                      </p:to>
+                                    </p:set>
+                                    <p:animEffect filter="fade" transition="in">
+                                      <p:cBhvr additive="repl">
+                                        <p:cTn id="29" dur="2000"/>
+                                        <p:tgtEl>
+                                          <p:spTgt spid="155"/>
+                                        </p:tgtEl>
+                                      </p:cBhvr>
+                                    </p:animEffect>
+                                  </p:childTnLst>
+                                </p:cTn>
+                              </p:par>
+                            </p:childTnLst>
+                          </p:cTn>
+                        </p:par>
+                      </p:childTnLst>
+                    </p:cTn>
+                  </p:par>
+                </p:childTnLst>
+              </p:cTn>
               <p:prevCondLst>
                 <p:cond delay="0" evt="onPrev">
                   <p:tgtEl>
@@ -6749,7 +7488,7 @@
         <p:spPr>
           <a:xfrm>
             <a:off x="468360" y="346680"/>
-            <a:ext cx="8216280" cy="704160"/>
+            <a:ext cx="8215200" cy="703080"/>
           </a:xfrm>
           <a:prstGeom prst="rect">
             <a:avLst/>
@@ -6811,7 +7550,7 @@
         <p:spPr>
           <a:xfrm>
             <a:off x="971640" y="1144800"/>
-            <a:ext cx="7713000" cy="5071320"/>
+            <a:ext cx="7711920" cy="5070240"/>
           </a:xfrm>
           <a:prstGeom prst="rect">
             <a:avLst/>
@@ -6830,7 +7569,7 @@
         <p:txBody>
           <a:bodyPr lIns="90000" rIns="90000" tIns="45000" bIns="45000"/>
           <a:p>
-            <a:pPr marL="355680" indent="-353520">
+            <a:pPr marL="355680" indent="-352440">
               <a:lnSpc>
                 <a:spcPct val="100000"/>
               </a:lnSpc>
@@ -6868,7 +7607,7 @@
             </a:endParaRPr>
           </a:p>
           <a:p>
-            <a:pPr marL="355680" indent="-353520">
+            <a:pPr marL="355680" indent="-352440">
               <a:lnSpc>
                 <a:spcPct val="100000"/>
               </a:lnSpc>
@@ -6906,7 +7645,7 @@
             </a:endParaRPr>
           </a:p>
           <a:p>
-            <a:pPr marL="355680" indent="-353520">
+            <a:pPr marL="355680" indent="-352440">
               <a:lnSpc>
                 <a:spcPct val="100000"/>
               </a:lnSpc>
@@ -6944,7 +7683,7 @@
             </a:endParaRPr>
           </a:p>
           <a:p>
-            <a:pPr lvl="1" marL="432000" indent="-215640">
+            <a:pPr lvl="1" marL="432000" indent="-214560">
               <a:lnSpc>
                 <a:spcPct val="100000"/>
               </a:lnSpc>
@@ -6983,7 +7722,7 @@
             </a:endParaRPr>
           </a:p>
           <a:p>
-            <a:pPr lvl="1" marL="432000" indent="-215640">
+            <a:pPr lvl="1" marL="432000" indent="-214560">
               <a:lnSpc>
                 <a:spcPct val="100000"/>
               </a:lnSpc>
@@ -7022,7 +7761,7 @@
             </a:endParaRPr>
           </a:p>
           <a:p>
-            <a:pPr lvl="1" marL="432000" indent="-215640">
+            <a:pPr lvl="1" marL="432000" indent="-214560">
               <a:lnSpc>
                 <a:spcPct val="100000"/>
               </a:lnSpc>
@@ -7061,7 +7800,7 @@
             </a:endParaRPr>
           </a:p>
           <a:p>
-            <a:pPr lvl="1" marL="432000" indent="-215640">
+            <a:pPr lvl="1" marL="432000" indent="-214560">
               <a:lnSpc>
                 <a:spcPct val="100000"/>
               </a:lnSpc>
@@ -7100,7 +7839,7 @@
             </a:endParaRPr>
           </a:p>
           <a:p>
-            <a:pPr marL="355680" indent="-353520">
+            <a:pPr marL="355680" indent="-352440">
               <a:lnSpc>
                 <a:spcPct val="100000"/>
               </a:lnSpc>
@@ -7123,7 +7862,7 @@
                 <a:latin typeface="Arial"/>
                 <a:ea typeface="標楷體"/>
               </a:rPr>
-              <a:t> </a:t>
+              <a:t>Special case</a:t>
             </a:r>
             <a:endParaRPr b="0" lang="en-US" sz="1800" spc="-1" strike="noStrike">
               <a:solidFill>
@@ -7138,7 +7877,85 @@
             </a:endParaRPr>
           </a:p>
           <a:p>
-            <a:pPr marL="355680" indent="-353520">
+            <a:pPr lvl="1" marL="432000" indent="-214560">
+              <a:lnSpc>
+                <a:spcPct val="100000"/>
+              </a:lnSpc>
+              <a:buClr>
+                <a:srgbClr val="000000"/>
+              </a:buClr>
+              <a:buSzPct val="45000"/>
+              <a:buFont typeface="Wingdings" charset="2"/>
+              <a:buChar char=""/>
+            </a:pPr>
+            <a:r>
+              <a:rPr b="0" lang="en-US" sz="2000" spc="-1" strike="noStrike">
+                <a:solidFill>
+                  <a:srgbClr val="333333"/>
+                </a:solidFill>
+                <a:uFill>
+                  <a:solidFill>
+                    <a:srgbClr val="ffffff"/>
+                  </a:solidFill>
+                </a:uFill>
+                <a:latin typeface="Arial"/>
+                <a:ea typeface="標楷體"/>
+              </a:rPr>
+              <a:t>Image</a:t>
+            </a:r>
+            <a:endParaRPr b="0" lang="en-US" sz="1800" spc="-1" strike="noStrike">
+              <a:solidFill>
+                <a:srgbClr val="000000"/>
+              </a:solidFill>
+              <a:uFill>
+                <a:solidFill>
+                  <a:srgbClr val="ffffff"/>
+                </a:solidFill>
+              </a:uFill>
+              <a:latin typeface="Arial"/>
+            </a:endParaRPr>
+          </a:p>
+          <a:p>
+            <a:pPr lvl="1" marL="432000" indent="-214560">
+              <a:lnSpc>
+                <a:spcPct val="100000"/>
+              </a:lnSpc>
+              <a:buClr>
+                <a:srgbClr val="000000"/>
+              </a:buClr>
+              <a:buSzPct val="45000"/>
+              <a:buFont typeface="Wingdings" charset="2"/>
+              <a:buChar char=""/>
+            </a:pPr>
+            <a:r>
+              <a:rPr b="0" lang="en-US" sz="2000" spc="-1" strike="noStrike">
+                <a:solidFill>
+                  <a:srgbClr val="333333"/>
+                </a:solidFill>
+                <a:uFill>
+                  <a:solidFill>
+                    <a:srgbClr val="ffffff"/>
+                  </a:solidFill>
+                </a:uFill>
+                <a:latin typeface="Arial"/>
+                <a:ea typeface="標楷體"/>
+              </a:rPr>
+              <a:t>Array</a:t>
+            </a:r>
+            <a:endParaRPr b="0" lang="en-US" sz="1800" spc="-1" strike="noStrike">
+              <a:solidFill>
+                <a:srgbClr val="000000"/>
+              </a:solidFill>
+              <a:uFill>
+                <a:solidFill>
+                  <a:srgbClr val="ffffff"/>
+                </a:solidFill>
+              </a:uFill>
+              <a:latin typeface="Arial"/>
+            </a:endParaRPr>
+          </a:p>
+          <a:p>
+            <a:pPr marL="355680" indent="-352440">
               <a:lnSpc>
                 <a:spcPct val="100000"/>
               </a:lnSpc>
@@ -7161,7 +7978,7 @@
                 <a:latin typeface="Arial"/>
                 <a:ea typeface="標楷體"/>
               </a:rPr>
-              <a:t> </a:t>
+              <a:t>Example</a:t>
             </a:r>
             <a:endParaRPr b="0" lang="en-US" sz="1800" spc="-1" strike="noStrike">
               <a:solidFill>
@@ -7176,7 +7993,7 @@
             </a:endParaRPr>
           </a:p>
           <a:p>
-            <a:pPr marL="355680" indent="-353520">
+            <a:pPr marL="355680" indent="-352440">
               <a:lnSpc>
                 <a:spcPct val="100000"/>
               </a:lnSpc>
@@ -7272,6 +8089,33 @@
   <p:transition spd="slow">
     <p:fade/>
   </p:transition>
+  <p:timing>
+    <p:tnLst>
+      <p:par>
+        <p:cTn id="5" dur="indefinite" restart="never" nodeType="tmRoot">
+          <p:childTnLst>
+            <p:seq>
+              <p:cTn id="6" nodeType="mainSeq"/>
+              <p:prevCondLst>
+                <p:cond delay="0" evt="onPrev">
+                  <p:tgtEl>
+                    <p:sldTgt/>
+                  </p:tgtEl>
+                </p:cond>
+              </p:prevCondLst>
+              <p:nextCondLst>
+                <p:cond delay="0" evt="onNext">
+                  <p:tgtEl>
+                    <p:sldTgt/>
+                  </p:tgtEl>
+                </p:cond>
+              </p:nextCondLst>
+            </p:seq>
+          </p:childTnLst>
+        </p:cTn>
+      </p:par>
+    </p:tnLst>
+  </p:timing>
 </p:sld>
 </file>
 
@@ -7301,7 +8145,7 @@
         <p:spPr>
           <a:xfrm>
             <a:off x="468360" y="346680"/>
-            <a:ext cx="8216280" cy="704160"/>
+            <a:ext cx="8215200" cy="703080"/>
           </a:xfrm>
           <a:prstGeom prst="rect">
             <a:avLst/>
@@ -7359,6 +8203,33 @@
   <p:transition spd="slow">
     <p:fade/>
   </p:transition>
+  <p:timing>
+    <p:tnLst>
+      <p:par>
+        <p:cTn id="7" dur="indefinite" restart="never" nodeType="tmRoot">
+          <p:childTnLst>
+            <p:seq>
+              <p:cTn id="8" nodeType="mainSeq"/>
+              <p:prevCondLst>
+                <p:cond delay="0" evt="onPrev">
+                  <p:tgtEl>
+                    <p:sldTgt/>
+                  </p:tgtEl>
+                </p:cond>
+              </p:prevCondLst>
+              <p:nextCondLst>
+                <p:cond delay="0" evt="onNext">
+                  <p:tgtEl>
+                    <p:sldTgt/>
+                  </p:tgtEl>
+                </p:cond>
+              </p:nextCondLst>
+            </p:seq>
+          </p:childTnLst>
+        </p:cTn>
+      </p:par>
+    </p:tnLst>
+  </p:timing>
 </p:sld>
 </file>
 
@@ -7392,7 +8263,7 @@
         <p:spPr>
           <a:xfrm>
             <a:off x="1737360" y="2161080"/>
-            <a:ext cx="5669280" cy="3871080"/>
+            <a:ext cx="5668200" cy="3870000"/>
           </a:xfrm>
           <a:prstGeom prst="rect">
             <a:avLst/>
@@ -7404,14 +8275,14 @@
       </p:pic>
       <p:sp>
         <p:nvSpPr>
-          <p:cNvPr id="134" name="TextShape 1"/>
-          <p:cNvSpPr txBox="1"/>
+          <p:cNvPr id="134" name="CustomShape 1"/>
+          <p:cNvSpPr/>
           <p:nvPr/>
         </p:nvSpPr>
         <p:spPr>
           <a:xfrm>
             <a:off x="2413440" y="6014880"/>
-            <a:ext cx="4937760" cy="840240"/>
+            <a:ext cx="4936680" cy="839160"/>
           </a:xfrm>
           <a:prstGeom prst="rect">
             <a:avLst/>
@@ -7421,6 +8292,12 @@
             <a:noFill/>
           </a:ln>
         </p:spPr>
+        <p:style>
+          <a:lnRef idx="0"/>
+          <a:fillRef idx="0"/>
+          <a:effectRef idx="0"/>
+          <a:fontRef idx="minor"/>
+        </p:style>
         <p:txBody>
           <a:bodyPr lIns="90000" rIns="90000" tIns="45000" bIns="45000"/>
           <a:p>
@@ -7435,6 +8312,7 @@
                   </a:solidFill>
                 </a:uFill>
                 <a:latin typeface="Arial"/>
+                <a:ea typeface="DejaVu Sans"/>
               </a:rPr>
               <a:t>From</a:t>
             </a:r>
@@ -7449,13 +8327,14 @@
                   </a:solidFill>
                 </a:uFill>
                 <a:latin typeface="Arial"/>
+                <a:ea typeface="DejaVu Sans"/>
               </a:rPr>
               <a:t>：</a:t>
             </a:r>
             <a:r>
-              <a:rPr b="0" lang="en-US" sz="1000" spc="-1" strike="noStrike">
-                <a:solidFill>
-                  <a:srgbClr val="000000"/>
+              <a:rPr b="0" lang="en-US" sz="1000" spc="-1" strike="noStrike" u="sng">
+                <a:solidFill>
+                  <a:srgbClr val="0000ff"/>
                 </a:solidFill>
                 <a:uFill>
                   <a:solidFill>
@@ -7463,24 +8342,25 @@
                   </a:solidFill>
                 </a:uFill>
                 <a:latin typeface="Arial"/>
+                <a:ea typeface="DejaVu Sans"/>
                 <a:hlinkClick r:id="rId2"/>
               </a:rPr>
               <a:t>http://code.tutsplus.com/tutorials/an-introduction-to-volley--cms-23800</a:t>
             </a:r>
-            <a:endParaRPr b="0" lang="en-US" sz="1000" spc="-1" strike="noStrike">
-              <a:solidFill>
-                <a:srgbClr val="000000"/>
-              </a:solidFill>
-              <a:uFill>
-                <a:solidFill>
-                  <a:srgbClr val="ffffff"/>
-                </a:solidFill>
-              </a:uFill>
-              <a:latin typeface="Arial"/>
-            </a:endParaRPr>
-          </a:p>
-          <a:p>
-            <a:endParaRPr b="0" lang="en-US" sz="1000" spc="-1" strike="noStrike">
+            <a:endParaRPr b="0" lang="en-US" sz="1800" spc="-1" strike="noStrike">
+              <a:solidFill>
+                <a:srgbClr val="000000"/>
+              </a:solidFill>
+              <a:uFill>
+                <a:solidFill>
+                  <a:srgbClr val="ffffff"/>
+                </a:solidFill>
+              </a:uFill>
+              <a:latin typeface="Arial"/>
+            </a:endParaRPr>
+          </a:p>
+          <a:p>
+            <a:endParaRPr b="0" lang="en-US" sz="1800" spc="-1" strike="noStrike">
               <a:solidFill>
                 <a:srgbClr val="000000"/>
               </a:solidFill>
@@ -7502,10 +8382,10 @@
   <p:timing>
     <p:tnLst>
       <p:par>
-        <p:cTn id="5" dur="indefinite" restart="never" nodeType="tmRoot">
+        <p:cTn id="9" dur="indefinite" restart="never" nodeType="tmRoot">
           <p:childTnLst>
             <p:seq>
-              <p:cTn id="6" nodeType="mainSeq"/>
+              <p:cTn id="10" nodeType="mainSeq"/>
               <p:prevCondLst>
                 <p:cond delay="0" evt="onPrev">
                   <p:tgtEl>
@@ -7555,7 +8435,7 @@
         <p:spPr>
           <a:xfrm>
             <a:off x="468360" y="346680"/>
-            <a:ext cx="8216280" cy="704160"/>
+            <a:ext cx="8215200" cy="703080"/>
           </a:xfrm>
           <a:prstGeom prst="rect">
             <a:avLst/>
@@ -7592,7 +8472,7 @@
                 <a:latin typeface="Arial"/>
                 <a:ea typeface="標楷體"/>
               </a:rPr>
-              <a:t>Reference</a:t>
+              <a:t>Implement</a:t>
             </a:r>
             <a:endParaRPr b="0" lang="en-US" sz="1800" spc="-1" strike="noStrike">
               <a:solidFill>
@@ -7617,7 +8497,7 @@
         <p:spPr>
           <a:xfrm>
             <a:off x="971640" y="1144800"/>
-            <a:ext cx="7713000" cy="5071320"/>
+            <a:ext cx="7711920" cy="5070240"/>
           </a:xfrm>
           <a:prstGeom prst="rect">
             <a:avLst/>
@@ -7636,7 +8516,7 @@
         <p:txBody>
           <a:bodyPr lIns="90000" rIns="90000" tIns="45000" bIns="45000"/>
           <a:p>
-            <a:pPr marL="355680" indent="-353520">
+            <a:pPr marL="355680" indent="-352440">
               <a:lnSpc>
                 <a:spcPct val="100000"/>
               </a:lnSpc>
@@ -7674,7 +8554,7 @@
             </a:endParaRPr>
           </a:p>
           <a:p>
-            <a:pPr marL="355680" indent="-353520">
+            <a:pPr marL="355680" indent="-352440">
               <a:lnSpc>
                 <a:spcPct val="100000"/>
               </a:lnSpc>
@@ -7712,121 +8592,6 @@
             </a:endParaRPr>
           </a:p>
           <a:p>
-            <a:pPr marL="355680" indent="-353520">
-              <a:lnSpc>
-                <a:spcPct val="100000"/>
-              </a:lnSpc>
-              <a:buClr>
-                <a:srgbClr val="333333"/>
-              </a:buClr>
-              <a:buFont typeface="Wingdings" charset="2"/>
-              <a:buChar char=""/>
-            </a:pPr>
-            <a:r>
-              <a:rPr b="0" lang="en-US" sz="2000" spc="-1" strike="noStrike">
-                <a:solidFill>
-                  <a:srgbClr val="333333"/>
-                </a:solidFill>
-                <a:uFill>
-                  <a:solidFill>
-                    <a:srgbClr val="ffffff"/>
-                  </a:solidFill>
-                </a:uFill>
-                <a:latin typeface="Arial"/>
-                <a:ea typeface="標楷體"/>
-              </a:rPr>
-              <a:t>Image</a:t>
-            </a:r>
-            <a:endParaRPr b="0" lang="en-US" sz="1800" spc="-1" strike="noStrike">
-              <a:solidFill>
-                <a:srgbClr val="000000"/>
-              </a:solidFill>
-              <a:uFill>
-                <a:solidFill>
-                  <a:srgbClr val="ffffff"/>
-                </a:solidFill>
-              </a:uFill>
-              <a:latin typeface="Arial"/>
-            </a:endParaRPr>
-          </a:p>
-          <a:p>
-            <a:pPr lvl="1" marL="432000" indent="-215640">
-              <a:lnSpc>
-                <a:spcPct val="100000"/>
-              </a:lnSpc>
-              <a:buClr>
-                <a:srgbClr val="000000"/>
-              </a:buClr>
-              <a:buSzPct val="45000"/>
-              <a:buFont typeface="Wingdings" charset="2"/>
-              <a:buChar char=""/>
-            </a:pPr>
-            <a:r>
-              <a:rPr b="0" lang="en-US" sz="2000" spc="-1" strike="noStrike">
-                <a:solidFill>
-                  <a:srgbClr val="333333"/>
-                </a:solidFill>
-                <a:uFill>
-                  <a:solidFill>
-                    <a:srgbClr val="ffffff"/>
-                  </a:solidFill>
-                </a:uFill>
-                <a:latin typeface="Arial"/>
-                <a:ea typeface="標楷體"/>
-              </a:rPr>
-              <a:t>http://stackoverflow.com/questions/13562429/how-many-ways-to-convert-bitmap-to-string-and-vice-versa</a:t>
-            </a:r>
-            <a:endParaRPr b="0" lang="en-US" sz="1800" spc="-1" strike="noStrike">
-              <a:solidFill>
-                <a:srgbClr val="000000"/>
-              </a:solidFill>
-              <a:uFill>
-                <a:solidFill>
-                  <a:srgbClr val="ffffff"/>
-                </a:solidFill>
-              </a:uFill>
-              <a:latin typeface="Arial"/>
-            </a:endParaRPr>
-          </a:p>
-          <a:p>
-            <a:pPr marL="355680" indent="-353520">
-              <a:lnSpc>
-                <a:spcPct val="100000"/>
-              </a:lnSpc>
-              <a:buClr>
-                <a:srgbClr val="333333"/>
-              </a:buClr>
-              <a:buFont typeface="Wingdings" charset="2"/>
-              <a:buChar char=""/>
-            </a:pPr>
-            <a:r>
-              <a:rPr b="0" lang="en-US" sz="2000" spc="-1" strike="noStrike">
-                <a:solidFill>
-                  <a:srgbClr val="333333"/>
-                </a:solidFill>
-                <a:uFill>
-                  <a:solidFill>
-                    <a:srgbClr val="ffffff"/>
-                  </a:solidFill>
-                </a:uFill>
-                <a:latin typeface="Arial"/>
-                <a:ea typeface="標楷體"/>
-              </a:rPr>
-              <a:t> </a:t>
-            </a:r>
-            <a:endParaRPr b="0" lang="en-US" sz="1800" spc="-1" strike="noStrike">
-              <a:solidFill>
-                <a:srgbClr val="000000"/>
-              </a:solidFill>
-              <a:uFill>
-                <a:solidFill>
-                  <a:srgbClr val="ffffff"/>
-                </a:solidFill>
-              </a:uFill>
-              <a:latin typeface="Arial"/>
-            </a:endParaRPr>
-          </a:p>
-          <a:p>
             <a:pPr>
               <a:lnSpc>
                 <a:spcPct val="100000"/>
@@ -7854,10 +8619,10 @@
   <p:timing>
     <p:tnLst>
       <p:par>
-        <p:cTn id="7" dur="indefinite" restart="never" nodeType="tmRoot">
+        <p:cTn id="11" dur="indefinite" restart="never" nodeType="tmRoot">
           <p:childTnLst>
             <p:seq>
-              <p:cTn id="8" nodeType="mainSeq"/>
+              <p:cTn id="12" nodeType="mainSeq"/>
               <p:prevCondLst>
                 <p:cond delay="0" evt="onPrev">
                   <p:tgtEl>
@@ -7898,46 +8663,22 @@
           <a:chExt cx="0" cy="0"/>
         </a:xfrm>
       </p:grpSpPr>
-      <p:pic>
-        <p:nvPicPr>
-          <p:cNvPr id="137" name="Picture 2" descr=""/>
-          <p:cNvPicPr/>
-          <p:nvPr/>
-        </p:nvPicPr>
-        <p:blipFill>
-          <a:blip r:embed="rId1"/>
-          <a:srcRect l="0" t="0" r="50004" b="0"/>
-          <a:stretch/>
-        </p:blipFill>
-        <p:spPr>
-          <a:xfrm>
-            <a:off x="0" y="333360"/>
-            <a:ext cx="4569840" cy="6117480"/>
-          </a:xfrm>
-          <a:prstGeom prst="rect">
-            <a:avLst/>
-          </a:prstGeom>
-          <a:ln>
-            <a:noFill/>
-          </a:ln>
-        </p:spPr>
-      </p:pic>
-      <p:sp>
-        <p:nvSpPr>
-          <p:cNvPr id="138" name="CustomShape 1"/>
+      <p:sp>
+        <p:nvSpPr>
+          <p:cNvPr id="137" name="CustomShape 1"/>
           <p:cNvSpPr/>
           <p:nvPr/>
         </p:nvSpPr>
         <p:spPr>
           <a:xfrm>
-            <a:off x="5792760" y="3141720"/>
-            <a:ext cx="1779120" cy="640800"/>
+            <a:off x="468360" y="346680"/>
+            <a:ext cx="8215200" cy="703080"/>
           </a:xfrm>
           <a:prstGeom prst="rect">
             <a:avLst/>
           </a:prstGeom>
           <a:noFill/>
-          <a:ln w="9360">
+          <a:ln>
             <a:noFill/>
           </a:ln>
         </p:spPr>
@@ -7948,7 +8689,7 @@
           <a:fontRef idx="minor"/>
         </p:style>
         <p:txBody>
-          <a:bodyPr wrap="none" lIns="90000" rIns="90000" tIns="46800" bIns="46800"/>
+          <a:bodyPr lIns="90000" rIns="90000" tIns="45000" bIns="45000" anchor="ctr"/>
           <a:p>
             <a:pPr>
               <a:lnSpc>
@@ -7956,9 +8697,9 @@
               </a:lnSpc>
             </a:pPr>
             <a:r>
-              <a:rPr b="1" lang="en-US" sz="3600" spc="-1" strike="noStrike">
-                <a:solidFill>
-                  <a:srgbClr val="000000"/>
+              <a:rPr b="1" lang="en-US" sz="3200" spc="-1" strike="noStrike">
+                <a:solidFill>
+                  <a:srgbClr val="333333"/>
                 </a:solidFill>
                 <a:uFill>
                   <a:solidFill>
@@ -7966,9 +8707,9 @@
                   </a:solidFill>
                 </a:uFill>
                 <a:latin typeface="Arial"/>
-                <a:ea typeface="新細明體"/>
+                <a:ea typeface="標楷體"/>
               </a:rPr>
-              <a:t>Thanks</a:t>
+              <a:t>Special case</a:t>
             </a:r>
             <a:endParaRPr b="0" lang="en-US" sz="1800" spc="-1" strike="noStrike">
               <a:solidFill>
@@ -7984,6 +8725,497 @@
           </a:p>
         </p:txBody>
       </p:sp>
+      <p:sp>
+        <p:nvSpPr>
+          <p:cNvPr id="138" name="CustomShape 2"/>
+          <p:cNvSpPr/>
+          <p:nvPr/>
+        </p:nvSpPr>
+        <p:spPr>
+          <a:xfrm>
+            <a:off x="971640" y="1144800"/>
+            <a:ext cx="7711920" cy="5070240"/>
+          </a:xfrm>
+          <a:prstGeom prst="rect">
+            <a:avLst/>
+          </a:prstGeom>
+          <a:noFill/>
+          <a:ln>
+            <a:noFill/>
+          </a:ln>
+        </p:spPr>
+        <p:style>
+          <a:lnRef idx="0"/>
+          <a:fillRef idx="0"/>
+          <a:effectRef idx="0"/>
+          <a:fontRef idx="minor"/>
+        </p:style>
+        <p:txBody>
+          <a:bodyPr lIns="90000" rIns="90000" tIns="45000" bIns="45000"/>
+          <a:p>
+            <a:pPr marL="355680" indent="-352440">
+              <a:lnSpc>
+                <a:spcPct val="100000"/>
+              </a:lnSpc>
+              <a:buClr>
+                <a:srgbClr val="333333"/>
+              </a:buClr>
+              <a:buFont typeface="Wingdings" charset="2"/>
+              <a:buChar char=""/>
+            </a:pPr>
+            <a:r>
+              <a:rPr b="0" lang="en-US" sz="2000" spc="-1" strike="noStrike">
+                <a:solidFill>
+                  <a:srgbClr val="333333"/>
+                </a:solidFill>
+                <a:uFill>
+                  <a:solidFill>
+                    <a:srgbClr val="ffffff"/>
+                  </a:solidFill>
+                </a:uFill>
+                <a:latin typeface="Arial"/>
+                <a:ea typeface="標楷體"/>
+              </a:rPr>
+              <a:t>We can use JsonObjectRequest to upload JSON format data to our database</a:t>
+            </a:r>
+            <a:endParaRPr b="0" lang="en-US" sz="1800" spc="-1" strike="noStrike">
+              <a:solidFill>
+                <a:srgbClr val="000000"/>
+              </a:solidFill>
+              <a:uFill>
+                <a:solidFill>
+                  <a:srgbClr val="ffffff"/>
+                </a:solidFill>
+              </a:uFill>
+              <a:latin typeface="Arial"/>
+            </a:endParaRPr>
+          </a:p>
+          <a:p>
+            <a:pPr marL="355680" indent="-352440">
+              <a:lnSpc>
+                <a:spcPct val="100000"/>
+              </a:lnSpc>
+              <a:buClr>
+                <a:srgbClr val="333333"/>
+              </a:buClr>
+              <a:buFont typeface="Wingdings" charset="2"/>
+              <a:buChar char=""/>
+            </a:pPr>
+            <a:r>
+              <a:rPr b="0" lang="en-US" sz="2000" spc="-1" strike="noStrike">
+                <a:solidFill>
+                  <a:srgbClr val="333333"/>
+                </a:solidFill>
+                <a:uFill>
+                  <a:solidFill>
+                    <a:srgbClr val="ffffff"/>
+                  </a:solidFill>
+                </a:uFill>
+                <a:latin typeface="Arial"/>
+                <a:ea typeface="標楷體"/>
+              </a:rPr>
+              <a:t>However,  cause we need to connect the database through POST request</a:t>
+            </a:r>
+            <a:endParaRPr b="0" lang="en-US" sz="1800" spc="-1" strike="noStrike">
+              <a:solidFill>
+                <a:srgbClr val="000000"/>
+              </a:solidFill>
+              <a:uFill>
+                <a:solidFill>
+                  <a:srgbClr val="ffffff"/>
+                </a:solidFill>
+              </a:uFill>
+              <a:latin typeface="Arial"/>
+            </a:endParaRPr>
+          </a:p>
+          <a:p>
+            <a:pPr lvl="1" marL="432000" indent="-216000">
+              <a:lnSpc>
+                <a:spcPct val="100000"/>
+              </a:lnSpc>
+              <a:buClr>
+                <a:srgbClr val="000000"/>
+              </a:buClr>
+              <a:buSzPct val="45000"/>
+              <a:buFont typeface="Wingdings" charset="2"/>
+              <a:buChar char=""/>
+            </a:pPr>
+            <a:r>
+              <a:rPr b="0" lang="en-US" sz="2000" spc="-1" strike="noStrike">
+                <a:solidFill>
+                  <a:srgbClr val="333333"/>
+                </a:solidFill>
+                <a:uFill>
+                  <a:solidFill>
+                    <a:srgbClr val="ffffff"/>
+                  </a:solidFill>
+                </a:uFill>
+                <a:latin typeface="Arial"/>
+                <a:ea typeface="標楷體"/>
+              </a:rPr>
+              <a:t>Volley provides getParams() method to implement</a:t>
+            </a:r>
+            <a:endParaRPr b="0" lang="en-US" sz="1800" spc="-1" strike="noStrike">
+              <a:solidFill>
+                <a:srgbClr val="000000"/>
+              </a:solidFill>
+              <a:uFill>
+                <a:solidFill>
+                  <a:srgbClr val="ffffff"/>
+                </a:solidFill>
+              </a:uFill>
+              <a:latin typeface="Arial"/>
+            </a:endParaRPr>
+          </a:p>
+          <a:p>
+            <a:pPr lvl="1" marL="432000" indent="-216000">
+              <a:lnSpc>
+                <a:spcPct val="100000"/>
+              </a:lnSpc>
+              <a:buClr>
+                <a:srgbClr val="000000"/>
+              </a:buClr>
+              <a:buSzPct val="45000"/>
+              <a:buFont typeface="Wingdings" charset="2"/>
+              <a:buChar char=""/>
+            </a:pPr>
+            <a:r>
+              <a:rPr b="0" lang="en-US" sz="2000" spc="-1" strike="noStrike">
+                <a:solidFill>
+                  <a:srgbClr val="333333"/>
+                </a:solidFill>
+                <a:uFill>
+                  <a:solidFill>
+                    <a:srgbClr val="ffffff"/>
+                  </a:solidFill>
+                </a:uFill>
+                <a:latin typeface="Arial"/>
+                <a:ea typeface="標楷體"/>
+              </a:rPr>
+              <a:t>And the type is String only</a:t>
+            </a:r>
+            <a:endParaRPr b="0" lang="en-US" sz="1800" spc="-1" strike="noStrike">
+              <a:solidFill>
+                <a:srgbClr val="000000"/>
+              </a:solidFill>
+              <a:uFill>
+                <a:solidFill>
+                  <a:srgbClr val="ffffff"/>
+                </a:solidFill>
+              </a:uFill>
+              <a:latin typeface="Arial"/>
+            </a:endParaRPr>
+          </a:p>
+          <a:p>
+            <a:pPr marL="355680" indent="-352440">
+              <a:lnSpc>
+                <a:spcPct val="100000"/>
+              </a:lnSpc>
+              <a:buClr>
+                <a:srgbClr val="333333"/>
+              </a:buClr>
+              <a:buFont typeface="Wingdings" charset="2"/>
+              <a:buChar char=""/>
+            </a:pPr>
+            <a:r>
+              <a:rPr b="0" lang="en-US" sz="2000" spc="-1" strike="noStrike">
+                <a:solidFill>
+                  <a:srgbClr val="333333"/>
+                </a:solidFill>
+                <a:uFill>
+                  <a:solidFill>
+                    <a:srgbClr val="ffffff"/>
+                  </a:solidFill>
+                </a:uFill>
+                <a:latin typeface="Arial"/>
+                <a:ea typeface="標楷體"/>
+              </a:rPr>
+              <a:t> </a:t>
+            </a:r>
+            <a:endParaRPr b="0" lang="en-US" sz="1800" spc="-1" strike="noStrike">
+              <a:solidFill>
+                <a:srgbClr val="000000"/>
+              </a:solidFill>
+              <a:uFill>
+                <a:solidFill>
+                  <a:srgbClr val="ffffff"/>
+                </a:solidFill>
+              </a:uFill>
+              <a:latin typeface="Arial"/>
+            </a:endParaRPr>
+          </a:p>
+          <a:p>
+            <a:pPr marL="355680" indent="-352440">
+              <a:lnSpc>
+                <a:spcPct val="100000"/>
+              </a:lnSpc>
+              <a:buClr>
+                <a:srgbClr val="333333"/>
+              </a:buClr>
+              <a:buFont typeface="Wingdings" charset="2"/>
+              <a:buChar char=""/>
+            </a:pPr>
+            <a:r>
+              <a:rPr b="0" lang="en-US" sz="2000" spc="-1" strike="noStrike">
+                <a:solidFill>
+                  <a:srgbClr val="333333"/>
+                </a:solidFill>
+                <a:uFill>
+                  <a:solidFill>
+                    <a:srgbClr val="ffffff"/>
+                  </a:solidFill>
+                </a:uFill>
+                <a:latin typeface="Arial"/>
+                <a:ea typeface="標楷體"/>
+              </a:rPr>
+              <a:t> </a:t>
+            </a:r>
+            <a:endParaRPr b="0" lang="en-US" sz="1800" spc="-1" strike="noStrike">
+              <a:solidFill>
+                <a:srgbClr val="000000"/>
+              </a:solidFill>
+              <a:uFill>
+                <a:solidFill>
+                  <a:srgbClr val="ffffff"/>
+                </a:solidFill>
+              </a:uFill>
+              <a:latin typeface="Arial"/>
+            </a:endParaRPr>
+          </a:p>
+          <a:p>
+            <a:pPr marL="355680" indent="-352440">
+              <a:lnSpc>
+                <a:spcPct val="100000"/>
+              </a:lnSpc>
+              <a:buClr>
+                <a:srgbClr val="333333"/>
+              </a:buClr>
+              <a:buFont typeface="Wingdings" charset="2"/>
+              <a:buChar char=""/>
+            </a:pPr>
+            <a:r>
+              <a:rPr b="0" lang="en-US" sz="2000" spc="-1" strike="noStrike">
+                <a:solidFill>
+                  <a:srgbClr val="333333"/>
+                </a:solidFill>
+                <a:uFill>
+                  <a:solidFill>
+                    <a:srgbClr val="ffffff"/>
+                  </a:solidFill>
+                </a:uFill>
+                <a:latin typeface="Arial"/>
+                <a:ea typeface="標楷體"/>
+              </a:rPr>
+              <a:t> </a:t>
+            </a:r>
+            <a:endParaRPr b="0" lang="en-US" sz="1800" spc="-1" strike="noStrike">
+              <a:solidFill>
+                <a:srgbClr val="000000"/>
+              </a:solidFill>
+              <a:uFill>
+                <a:solidFill>
+                  <a:srgbClr val="ffffff"/>
+                </a:solidFill>
+              </a:uFill>
+              <a:latin typeface="Arial"/>
+            </a:endParaRPr>
+          </a:p>
+          <a:p>
+            <a:pPr marL="355680" indent="-352440">
+              <a:lnSpc>
+                <a:spcPct val="100000"/>
+              </a:lnSpc>
+              <a:buClr>
+                <a:srgbClr val="333333"/>
+              </a:buClr>
+              <a:buFont typeface="Wingdings" charset="2"/>
+              <a:buChar char=""/>
+            </a:pPr>
+            <a:r>
+              <a:rPr b="0" lang="en-US" sz="2000" spc="-1" strike="noStrike">
+                <a:solidFill>
+                  <a:srgbClr val="333333"/>
+                </a:solidFill>
+                <a:uFill>
+                  <a:solidFill>
+                    <a:srgbClr val="ffffff"/>
+                  </a:solidFill>
+                </a:uFill>
+                <a:latin typeface="Arial"/>
+                <a:ea typeface="標楷體"/>
+              </a:rPr>
+              <a:t> </a:t>
+            </a:r>
+            <a:endParaRPr b="0" lang="en-US" sz="1800" spc="-1" strike="noStrike">
+              <a:solidFill>
+                <a:srgbClr val="000000"/>
+              </a:solidFill>
+              <a:uFill>
+                <a:solidFill>
+                  <a:srgbClr val="ffffff"/>
+                </a:solidFill>
+              </a:uFill>
+              <a:latin typeface="Arial"/>
+            </a:endParaRPr>
+          </a:p>
+          <a:p>
+            <a:pPr marL="355680" indent="-352440">
+              <a:lnSpc>
+                <a:spcPct val="100000"/>
+              </a:lnSpc>
+              <a:buClr>
+                <a:srgbClr val="333333"/>
+              </a:buClr>
+              <a:buFont typeface="Wingdings" charset="2"/>
+              <a:buChar char=""/>
+            </a:pPr>
+            <a:r>
+              <a:rPr b="0" lang="en-US" sz="2000" spc="-1" strike="noStrike">
+                <a:solidFill>
+                  <a:srgbClr val="333333"/>
+                </a:solidFill>
+                <a:uFill>
+                  <a:solidFill>
+                    <a:srgbClr val="ffffff"/>
+                  </a:solidFill>
+                </a:uFill>
+                <a:latin typeface="Arial"/>
+                <a:ea typeface="標楷體"/>
+              </a:rPr>
+              <a:t> </a:t>
+            </a:r>
+            <a:endParaRPr b="0" lang="en-US" sz="1800" spc="-1" strike="noStrike">
+              <a:solidFill>
+                <a:srgbClr val="000000"/>
+              </a:solidFill>
+              <a:uFill>
+                <a:solidFill>
+                  <a:srgbClr val="ffffff"/>
+                </a:solidFill>
+              </a:uFill>
+              <a:latin typeface="Arial"/>
+            </a:endParaRPr>
+          </a:p>
+          <a:p>
+            <a:pPr marL="355680" indent="-352440">
+              <a:lnSpc>
+                <a:spcPct val="100000"/>
+              </a:lnSpc>
+              <a:buClr>
+                <a:srgbClr val="333333"/>
+              </a:buClr>
+              <a:buFont typeface="Wingdings" charset="2"/>
+              <a:buChar char=""/>
+            </a:pPr>
+            <a:r>
+              <a:rPr b="0" lang="en-US" sz="2000" spc="-1" strike="noStrike">
+                <a:solidFill>
+                  <a:srgbClr val="333333"/>
+                </a:solidFill>
+                <a:uFill>
+                  <a:solidFill>
+                    <a:srgbClr val="ffffff"/>
+                  </a:solidFill>
+                </a:uFill>
+                <a:latin typeface="Arial"/>
+                <a:ea typeface="標楷體"/>
+              </a:rPr>
+              <a:t> </a:t>
+            </a:r>
+            <a:endParaRPr b="0" lang="en-US" sz="1800" spc="-1" strike="noStrike">
+              <a:solidFill>
+                <a:srgbClr val="000000"/>
+              </a:solidFill>
+              <a:uFill>
+                <a:solidFill>
+                  <a:srgbClr val="ffffff"/>
+                </a:solidFill>
+              </a:uFill>
+              <a:latin typeface="Arial"/>
+            </a:endParaRPr>
+          </a:p>
+          <a:p>
+            <a:pPr marL="355680" indent="-352440">
+              <a:lnSpc>
+                <a:spcPct val="100000"/>
+              </a:lnSpc>
+              <a:buClr>
+                <a:srgbClr val="333333"/>
+              </a:buClr>
+              <a:buFont typeface="Wingdings" charset="2"/>
+              <a:buChar char=""/>
+            </a:pPr>
+            <a:r>
+              <a:rPr b="0" lang="en-US" sz="2000" spc="-1" strike="noStrike">
+                <a:solidFill>
+                  <a:srgbClr val="333333"/>
+                </a:solidFill>
+                <a:uFill>
+                  <a:solidFill>
+                    <a:srgbClr val="ffffff"/>
+                  </a:solidFill>
+                </a:uFill>
+                <a:latin typeface="Arial"/>
+                <a:ea typeface="標楷體"/>
+              </a:rPr>
+              <a:t>Thus, we must change any type of data into “String”</a:t>
+            </a:r>
+            <a:endParaRPr b="0" lang="en-US" sz="1800" spc="-1" strike="noStrike">
+              <a:solidFill>
+                <a:srgbClr val="000000"/>
+              </a:solidFill>
+              <a:uFill>
+                <a:solidFill>
+                  <a:srgbClr val="ffffff"/>
+                </a:solidFill>
+              </a:uFill>
+              <a:latin typeface="Arial"/>
+            </a:endParaRPr>
+          </a:p>
+          <a:p>
+            <a:pPr>
+              <a:lnSpc>
+                <a:spcPct val="100000"/>
+              </a:lnSpc>
+            </a:pPr>
+            <a:endParaRPr b="0" lang="en-US" sz="1800" spc="-1" strike="noStrike">
+              <a:solidFill>
+                <a:srgbClr val="000000"/>
+              </a:solidFill>
+              <a:uFill>
+                <a:solidFill>
+                  <a:srgbClr val="ffffff"/>
+                </a:solidFill>
+              </a:uFill>
+              <a:latin typeface="Arial"/>
+            </a:endParaRPr>
+          </a:p>
+        </p:txBody>
+      </p:sp>
+      <p:pic>
+        <p:nvPicPr>
+          <p:cNvPr id="139" name="" descr=""/>
+          <p:cNvPicPr/>
+          <p:nvPr/>
+        </p:nvPicPr>
+        <p:blipFill>
+          <a:blip r:embed="rId1"/>
+          <a:srcRect l="38526" t="30960" r="13472" b="47687"/>
+          <a:stretch/>
+        </p:blipFill>
+        <p:spPr>
+          <a:xfrm>
+            <a:off x="1370160" y="3088800"/>
+            <a:ext cx="6950880" cy="1737360"/>
+          </a:xfrm>
+          <a:prstGeom prst="rect">
+            <a:avLst/>
+          </a:prstGeom>
+          <a:ln>
+            <a:noFill/>
+          </a:ln>
+        </p:spPr>
+      </p:pic>
     </p:spTree>
   </p:cSld>
   <p:transition spd="slow">
@@ -7992,66 +9224,1206 @@
   <p:timing>
     <p:tnLst>
       <p:par>
-        <p:cTn id="9" dur="indefinite" restart="never" nodeType="tmRoot">
+        <p:cTn id="13" dur="indefinite" restart="never" nodeType="tmRoot">
           <p:childTnLst>
             <p:seq>
-              <p:cTn id="10" dur="indefinite" nodeType="mainSeq">
-                <p:childTnLst>
-                  <p:par>
-                    <p:cTn id="11" nodeType="clickEffect" fill="hold">
-                      <p:stCondLst>
-                        <p:cond delay="indefinite"/>
-                      </p:stCondLst>
-                      <p:childTnLst>
-                        <p:par>
-                          <p:cTn id="12" nodeType="withEffect" fill="hold">
-                            <p:stCondLst>
-                              <p:cond delay="0"/>
-                            </p:stCondLst>
-                            <p:childTnLst>
-                              <p:par>
-                                <p:cTn id="13" nodeType="clickEffect" fill="hold" presetClass="entr" presetID="10">
-                                  <p:stCondLst>
-                                    <p:cond delay="0"/>
-                                  </p:stCondLst>
-                                  <p:childTnLst>
-                                    <p:set>
-                                      <p:cBhvr>
-                                        <p:cTn id="14" dur="1" fill="hold">
-                                          <p:stCondLst>
-                                            <p:cond delay="0"/>
-                                          </p:stCondLst>
-                                        </p:cTn>
-                                        <p:tgtEl>
-                                          <p:spTgt spid="138"/>
-                                        </p:tgtEl>
-                                        <p:attrNameLst>
-                                          <p:attrName>style.visibility</p:attrName>
-                                        </p:attrNameLst>
-                                      </p:cBhvr>
-                                      <p:to>
-                                        <p:strVal val="visible"/>
-                                      </p:to>
-                                    </p:set>
-                                    <p:animEffect filter="fade" transition="in">
-                                      <p:cBhvr additive="repl">
-                                        <p:cTn id="15" dur="2000"/>
-                                        <p:tgtEl>
-                                          <p:spTgt spid="138"/>
-                                        </p:tgtEl>
-                                      </p:cBhvr>
-                                    </p:animEffect>
-                                  </p:childTnLst>
-                                </p:cTn>
-                              </p:par>
-                            </p:childTnLst>
-                          </p:cTn>
-                        </p:par>
-                      </p:childTnLst>
-                    </p:cTn>
-                  </p:par>
-                </p:childTnLst>
-              </p:cTn>
+              <p:cTn id="14" nodeType="mainSeq"/>
+              <p:prevCondLst>
+                <p:cond delay="0" evt="onPrev">
+                  <p:tgtEl>
+                    <p:sldTgt/>
+                  </p:tgtEl>
+                </p:cond>
+              </p:prevCondLst>
+              <p:nextCondLst>
+                <p:cond delay="0" evt="onNext">
+                  <p:tgtEl>
+                    <p:sldTgt/>
+                  </p:tgtEl>
+                </p:cond>
+              </p:nextCondLst>
+            </p:seq>
+          </p:childTnLst>
+        </p:cTn>
+      </p:par>
+    </p:tnLst>
+  </p:timing>
+</p:sld>
+</file>
+
+<file path=ppt/slides/slide8.xml><?xml version="1.0" encoding="utf-8"?>
+<p:sld xmlns:a="http://schemas.openxmlformats.org/drawingml/2006/main" xmlns:p="http://schemas.openxmlformats.org/presentationml/2006/main" xmlns:r="http://schemas.openxmlformats.org/officeDocument/2006/relationships" xmlns:p14="http://schemas.microsoft.com/office/powerpoint/2010/main" xmlns:p15="http://schemas.microsoft.com/office/powerpoint/2012/main" xmlns:mc="http://schemas.openxmlformats.org/markup-compatibility/2006">
+  <p:cSld>
+    <p:spTree>
+      <p:nvGrpSpPr>
+        <p:cNvPr id="1" name=""/>
+        <p:cNvGrpSpPr/>
+        <p:nvPr/>
+      </p:nvGrpSpPr>
+      <p:grpSpPr>
+        <a:xfrm>
+          <a:off x="0" y="0"/>
+          <a:ext cx="0" cy="0"/>
+          <a:chOff x="0" y="0"/>
+          <a:chExt cx="0" cy="0"/>
+        </a:xfrm>
+      </p:grpSpPr>
+      <p:sp>
+        <p:nvSpPr>
+          <p:cNvPr id="140" name="CustomShape 1"/>
+          <p:cNvSpPr/>
+          <p:nvPr/>
+        </p:nvSpPr>
+        <p:spPr>
+          <a:xfrm>
+            <a:off x="468360" y="346680"/>
+            <a:ext cx="8215200" cy="703080"/>
+          </a:xfrm>
+          <a:prstGeom prst="rect">
+            <a:avLst/>
+          </a:prstGeom>
+          <a:noFill/>
+          <a:ln>
+            <a:noFill/>
+          </a:ln>
+        </p:spPr>
+        <p:style>
+          <a:lnRef idx="0"/>
+          <a:fillRef idx="0"/>
+          <a:effectRef idx="0"/>
+          <a:fontRef idx="minor"/>
+        </p:style>
+        <p:txBody>
+          <a:bodyPr lIns="90000" rIns="90000" tIns="45000" bIns="45000" anchor="ctr"/>
+          <a:p>
+            <a:pPr>
+              <a:lnSpc>
+                <a:spcPct val="100000"/>
+              </a:lnSpc>
+            </a:pPr>
+            <a:r>
+              <a:rPr b="1" lang="en-US" sz="3200" spc="-1" strike="noStrike">
+                <a:solidFill>
+                  <a:srgbClr val="333333"/>
+                </a:solidFill>
+                <a:uFill>
+                  <a:solidFill>
+                    <a:srgbClr val="ffffff"/>
+                  </a:solidFill>
+                </a:uFill>
+                <a:latin typeface="Arial"/>
+                <a:ea typeface="標楷體"/>
+              </a:rPr>
+              <a:t>Special case – Image</a:t>
+            </a:r>
+            <a:endParaRPr b="0" lang="en-US" sz="1800" spc="-1" strike="noStrike">
+              <a:solidFill>
+                <a:srgbClr val="000000"/>
+              </a:solidFill>
+              <a:uFill>
+                <a:solidFill>
+                  <a:srgbClr val="ffffff"/>
+                </a:solidFill>
+              </a:uFill>
+              <a:latin typeface="Arial"/>
+            </a:endParaRPr>
+          </a:p>
+        </p:txBody>
+      </p:sp>
+      <p:sp>
+        <p:nvSpPr>
+          <p:cNvPr id="141" name="CustomShape 2"/>
+          <p:cNvSpPr/>
+          <p:nvPr/>
+        </p:nvSpPr>
+        <p:spPr>
+          <a:xfrm>
+            <a:off x="971640" y="1144800"/>
+            <a:ext cx="7711920" cy="5070240"/>
+          </a:xfrm>
+          <a:prstGeom prst="rect">
+            <a:avLst/>
+          </a:prstGeom>
+          <a:noFill/>
+          <a:ln>
+            <a:noFill/>
+          </a:ln>
+        </p:spPr>
+        <p:style>
+          <a:lnRef idx="0"/>
+          <a:fillRef idx="0"/>
+          <a:effectRef idx="0"/>
+          <a:fontRef idx="minor"/>
+        </p:style>
+        <p:txBody>
+          <a:bodyPr lIns="90000" rIns="90000" tIns="45000" bIns="45000"/>
+          <a:p>
+            <a:pPr marL="355680" indent="-352440">
+              <a:lnSpc>
+                <a:spcPct val="100000"/>
+              </a:lnSpc>
+              <a:buClr>
+                <a:srgbClr val="333333"/>
+              </a:buClr>
+              <a:buFont typeface="Wingdings" charset="2"/>
+              <a:buChar char=""/>
+            </a:pPr>
+            <a:r>
+              <a:rPr b="0" lang="en-US" sz="2000" spc="-1" strike="noStrike">
+                <a:solidFill>
+                  <a:srgbClr val="333333"/>
+                </a:solidFill>
+                <a:uFill>
+                  <a:solidFill>
+                    <a:srgbClr val="ffffff"/>
+                  </a:solidFill>
+                </a:uFill>
+                <a:latin typeface="Arial"/>
+                <a:ea typeface="標楷體"/>
+              </a:rPr>
+              <a:t>For Bitmap to String</a:t>
+            </a:r>
+            <a:endParaRPr b="0" lang="en-US" sz="1800" spc="-1" strike="noStrike">
+              <a:solidFill>
+                <a:srgbClr val="000000"/>
+              </a:solidFill>
+              <a:uFill>
+                <a:solidFill>
+                  <a:srgbClr val="ffffff"/>
+                </a:solidFill>
+              </a:uFill>
+              <a:latin typeface="Arial"/>
+            </a:endParaRPr>
+          </a:p>
+          <a:p>
+            <a:pPr lvl="2" marL="648000" indent="-216000">
+              <a:lnSpc>
+                <a:spcPct val="100000"/>
+              </a:lnSpc>
+              <a:buClr>
+                <a:srgbClr val="000000"/>
+              </a:buClr>
+              <a:buSzPct val="45000"/>
+              <a:buFont typeface="Wingdings" charset="2"/>
+              <a:buChar char=""/>
+            </a:pPr>
+            <a:r>
+              <a:rPr b="0" lang="en-US" sz="2000" spc="-1" strike="noStrike">
+                <a:solidFill>
+                  <a:srgbClr val="333333"/>
+                </a:solidFill>
+                <a:uFill>
+                  <a:solidFill>
+                    <a:srgbClr val="ffffff"/>
+                  </a:solidFill>
+                </a:uFill>
+                <a:latin typeface="Arial"/>
+                <a:ea typeface="標楷體"/>
+              </a:rPr>
+              <a:t>Compress bitmap first and then change into byte[ ]</a:t>
+            </a:r>
+            <a:endParaRPr b="0" lang="en-US" sz="1800" spc="-1" strike="noStrike">
+              <a:solidFill>
+                <a:srgbClr val="000000"/>
+              </a:solidFill>
+              <a:uFill>
+                <a:solidFill>
+                  <a:srgbClr val="ffffff"/>
+                </a:solidFill>
+              </a:uFill>
+              <a:latin typeface="Arial"/>
+            </a:endParaRPr>
+          </a:p>
+          <a:p>
+            <a:pPr lvl="2" marL="648000" indent="-216000">
+              <a:lnSpc>
+                <a:spcPct val="100000"/>
+              </a:lnSpc>
+              <a:buClr>
+                <a:srgbClr val="000000"/>
+              </a:buClr>
+              <a:buSzPct val="45000"/>
+              <a:buFont typeface="Wingdings" charset="2"/>
+              <a:buChar char=""/>
+            </a:pPr>
+            <a:r>
+              <a:rPr b="0" lang="en-US" sz="2000" spc="-1" strike="noStrike">
+                <a:solidFill>
+                  <a:srgbClr val="333333"/>
+                </a:solidFill>
+                <a:uFill>
+                  <a:solidFill>
+                    <a:srgbClr val="ffffff"/>
+                  </a:solidFill>
+                </a:uFill>
+                <a:latin typeface="Arial"/>
+                <a:ea typeface="標楷體"/>
+              </a:rPr>
+              <a:t>Use Base64 to encode the byte[ ] to String</a:t>
+            </a:r>
+            <a:endParaRPr b="0" lang="en-US" sz="1800" spc="-1" strike="noStrike">
+              <a:solidFill>
+                <a:srgbClr val="000000"/>
+              </a:solidFill>
+              <a:uFill>
+                <a:solidFill>
+                  <a:srgbClr val="ffffff"/>
+                </a:solidFill>
+              </a:uFill>
+              <a:latin typeface="Arial"/>
+            </a:endParaRPr>
+          </a:p>
+          <a:p>
+            <a:pPr marL="355680" indent="-352440">
+              <a:lnSpc>
+                <a:spcPct val="100000"/>
+              </a:lnSpc>
+              <a:buClr>
+                <a:srgbClr val="333333"/>
+              </a:buClr>
+              <a:buFont typeface="Wingdings" charset="2"/>
+              <a:buChar char=""/>
+            </a:pPr>
+            <a:r>
+              <a:rPr b="0" lang="en-US" sz="2000" spc="-1" strike="noStrike">
+                <a:solidFill>
+                  <a:srgbClr val="333333"/>
+                </a:solidFill>
+                <a:uFill>
+                  <a:solidFill>
+                    <a:srgbClr val="ffffff"/>
+                  </a:solidFill>
+                </a:uFill>
+                <a:latin typeface="Arial"/>
+                <a:ea typeface="標楷體"/>
+              </a:rPr>
+              <a:t> </a:t>
+            </a:r>
+            <a:endParaRPr b="0" lang="en-US" sz="1800" spc="-1" strike="noStrike">
+              <a:solidFill>
+                <a:srgbClr val="000000"/>
+              </a:solidFill>
+              <a:uFill>
+                <a:solidFill>
+                  <a:srgbClr val="ffffff"/>
+                </a:solidFill>
+              </a:uFill>
+              <a:latin typeface="Arial"/>
+            </a:endParaRPr>
+          </a:p>
+          <a:p>
+            <a:pPr marL="355680" indent="-352440">
+              <a:lnSpc>
+                <a:spcPct val="100000"/>
+              </a:lnSpc>
+              <a:buClr>
+                <a:srgbClr val="333333"/>
+              </a:buClr>
+              <a:buFont typeface="Wingdings" charset="2"/>
+              <a:buChar char=""/>
+            </a:pPr>
+            <a:r>
+              <a:rPr b="0" lang="en-US" sz="2000" spc="-1" strike="noStrike">
+                <a:solidFill>
+                  <a:srgbClr val="333333"/>
+                </a:solidFill>
+                <a:uFill>
+                  <a:solidFill>
+                    <a:srgbClr val="ffffff"/>
+                  </a:solidFill>
+                </a:uFill>
+                <a:latin typeface="Arial"/>
+                <a:ea typeface="標楷體"/>
+              </a:rPr>
+              <a:t> </a:t>
+            </a:r>
+            <a:endParaRPr b="0" lang="en-US" sz="1800" spc="-1" strike="noStrike">
+              <a:solidFill>
+                <a:srgbClr val="000000"/>
+              </a:solidFill>
+              <a:uFill>
+                <a:solidFill>
+                  <a:srgbClr val="ffffff"/>
+                </a:solidFill>
+              </a:uFill>
+              <a:latin typeface="Arial"/>
+            </a:endParaRPr>
+          </a:p>
+          <a:p>
+            <a:pPr marL="355680" indent="-352440">
+              <a:lnSpc>
+                <a:spcPct val="100000"/>
+              </a:lnSpc>
+              <a:buClr>
+                <a:srgbClr val="333333"/>
+              </a:buClr>
+              <a:buFont typeface="Wingdings" charset="2"/>
+              <a:buChar char=""/>
+            </a:pPr>
+            <a:r>
+              <a:rPr b="0" lang="en-US" sz="2000" spc="-1" strike="noStrike">
+                <a:solidFill>
+                  <a:srgbClr val="333333"/>
+                </a:solidFill>
+                <a:uFill>
+                  <a:solidFill>
+                    <a:srgbClr val="ffffff"/>
+                  </a:solidFill>
+                </a:uFill>
+                <a:latin typeface="Arial"/>
+                <a:ea typeface="標楷體"/>
+              </a:rPr>
+              <a:t> </a:t>
+            </a:r>
+            <a:endParaRPr b="0" lang="en-US" sz="1800" spc="-1" strike="noStrike">
+              <a:solidFill>
+                <a:srgbClr val="000000"/>
+              </a:solidFill>
+              <a:uFill>
+                <a:solidFill>
+                  <a:srgbClr val="ffffff"/>
+                </a:solidFill>
+              </a:uFill>
+              <a:latin typeface="Arial"/>
+            </a:endParaRPr>
+          </a:p>
+          <a:p>
+            <a:pPr marL="355680" indent="-352440">
+              <a:lnSpc>
+                <a:spcPct val="100000"/>
+              </a:lnSpc>
+              <a:buClr>
+                <a:srgbClr val="333333"/>
+              </a:buClr>
+              <a:buFont typeface="Wingdings" charset="2"/>
+              <a:buChar char=""/>
+            </a:pPr>
+            <a:r>
+              <a:rPr b="0" lang="en-US" sz="2000" spc="-1" strike="noStrike">
+                <a:solidFill>
+                  <a:srgbClr val="333333"/>
+                </a:solidFill>
+                <a:uFill>
+                  <a:solidFill>
+                    <a:srgbClr val="ffffff"/>
+                  </a:solidFill>
+                </a:uFill>
+                <a:latin typeface="Arial"/>
+                <a:ea typeface="標楷體"/>
+              </a:rPr>
+              <a:t> </a:t>
+            </a:r>
+            <a:endParaRPr b="0" lang="en-US" sz="1800" spc="-1" strike="noStrike">
+              <a:solidFill>
+                <a:srgbClr val="000000"/>
+              </a:solidFill>
+              <a:uFill>
+                <a:solidFill>
+                  <a:srgbClr val="ffffff"/>
+                </a:solidFill>
+              </a:uFill>
+              <a:latin typeface="Arial"/>
+            </a:endParaRPr>
+          </a:p>
+          <a:p>
+            <a:pPr marL="355680" indent="-352440">
+              <a:lnSpc>
+                <a:spcPct val="100000"/>
+              </a:lnSpc>
+              <a:buClr>
+                <a:srgbClr val="333333"/>
+              </a:buClr>
+              <a:buFont typeface="Wingdings" charset="2"/>
+              <a:buChar char=""/>
+            </a:pPr>
+            <a:r>
+              <a:rPr b="0" lang="en-US" sz="2000" spc="-1" strike="noStrike">
+                <a:solidFill>
+                  <a:srgbClr val="333333"/>
+                </a:solidFill>
+                <a:uFill>
+                  <a:solidFill>
+                    <a:srgbClr val="ffffff"/>
+                  </a:solidFill>
+                </a:uFill>
+                <a:latin typeface="Arial"/>
+                <a:ea typeface="標楷體"/>
+              </a:rPr>
+              <a:t> </a:t>
+            </a:r>
+            <a:endParaRPr b="0" lang="en-US" sz="1800" spc="-1" strike="noStrike">
+              <a:solidFill>
+                <a:srgbClr val="000000"/>
+              </a:solidFill>
+              <a:uFill>
+                <a:solidFill>
+                  <a:srgbClr val="ffffff"/>
+                </a:solidFill>
+              </a:uFill>
+              <a:latin typeface="Arial"/>
+            </a:endParaRPr>
+          </a:p>
+          <a:p>
+            <a:pPr marL="355680" indent="-352440">
+              <a:lnSpc>
+                <a:spcPct val="100000"/>
+              </a:lnSpc>
+              <a:buClr>
+                <a:srgbClr val="333333"/>
+              </a:buClr>
+              <a:buFont typeface="Wingdings" charset="2"/>
+              <a:buChar char=""/>
+            </a:pPr>
+            <a:r>
+              <a:rPr b="0" lang="en-US" sz="2000" spc="-1" strike="noStrike">
+                <a:solidFill>
+                  <a:srgbClr val="333333"/>
+                </a:solidFill>
+                <a:uFill>
+                  <a:solidFill>
+                    <a:srgbClr val="ffffff"/>
+                  </a:solidFill>
+                </a:uFill>
+                <a:latin typeface="Arial"/>
+                <a:ea typeface="標楷體"/>
+              </a:rPr>
+              <a:t>For String to Bitmap</a:t>
+            </a:r>
+            <a:endParaRPr b="0" lang="en-US" sz="1800" spc="-1" strike="noStrike">
+              <a:solidFill>
+                <a:srgbClr val="000000"/>
+              </a:solidFill>
+              <a:uFill>
+                <a:solidFill>
+                  <a:srgbClr val="ffffff"/>
+                </a:solidFill>
+              </a:uFill>
+              <a:latin typeface="Arial"/>
+            </a:endParaRPr>
+          </a:p>
+          <a:p>
+            <a:pPr lvl="2" marL="648000" indent="-216000">
+              <a:lnSpc>
+                <a:spcPct val="100000"/>
+              </a:lnSpc>
+              <a:buClr>
+                <a:srgbClr val="000000"/>
+              </a:buClr>
+              <a:buSzPct val="45000"/>
+              <a:buFont typeface="Wingdings" charset="2"/>
+              <a:buChar char=""/>
+            </a:pPr>
+            <a:r>
+              <a:rPr b="0" lang="en-US" sz="2000" spc="-1" strike="noStrike">
+                <a:solidFill>
+                  <a:srgbClr val="333333"/>
+                </a:solidFill>
+                <a:uFill>
+                  <a:solidFill>
+                    <a:srgbClr val="ffffff"/>
+                  </a:solidFill>
+                </a:uFill>
+                <a:latin typeface="Arial"/>
+                <a:ea typeface="標楷體"/>
+              </a:rPr>
+              <a:t>vice versa </a:t>
+            </a:r>
+            <a:endParaRPr b="0" lang="en-US" sz="1800" spc="-1" strike="noStrike">
+              <a:solidFill>
+                <a:srgbClr val="000000"/>
+              </a:solidFill>
+              <a:uFill>
+                <a:solidFill>
+                  <a:srgbClr val="ffffff"/>
+                </a:solidFill>
+              </a:uFill>
+              <a:latin typeface="Arial"/>
+            </a:endParaRPr>
+          </a:p>
+          <a:p>
+            <a:pPr>
+              <a:lnSpc>
+                <a:spcPct val="100000"/>
+              </a:lnSpc>
+            </a:pPr>
+            <a:endParaRPr b="0" lang="en-US" sz="1800" spc="-1" strike="noStrike">
+              <a:solidFill>
+                <a:srgbClr val="000000"/>
+              </a:solidFill>
+              <a:uFill>
+                <a:solidFill>
+                  <a:srgbClr val="ffffff"/>
+                </a:solidFill>
+              </a:uFill>
+              <a:latin typeface="Arial"/>
+            </a:endParaRPr>
+          </a:p>
+        </p:txBody>
+      </p:sp>
+      <p:pic>
+        <p:nvPicPr>
+          <p:cNvPr id="142" name="" descr=""/>
+          <p:cNvPicPr/>
+          <p:nvPr/>
+        </p:nvPicPr>
+        <p:blipFill>
+          <a:blip r:embed="rId1"/>
+          <a:srcRect l="14853" t="30960" r="27231" b="49469"/>
+          <a:stretch/>
+        </p:blipFill>
+        <p:spPr>
+          <a:xfrm>
+            <a:off x="1463040" y="2172240"/>
+            <a:ext cx="7220160" cy="1370520"/>
+          </a:xfrm>
+          <a:prstGeom prst="rect">
+            <a:avLst/>
+          </a:prstGeom>
+          <a:ln>
+            <a:noFill/>
+          </a:ln>
+        </p:spPr>
+      </p:pic>
+      <p:pic>
+        <p:nvPicPr>
+          <p:cNvPr id="143" name="" descr=""/>
+          <p:cNvPicPr/>
+          <p:nvPr/>
+        </p:nvPicPr>
+        <p:blipFill>
+          <a:blip r:embed="rId2"/>
+          <a:srcRect l="12401" t="34518" r="24592" b="38794"/>
+          <a:stretch/>
+        </p:blipFill>
+        <p:spPr>
+          <a:xfrm>
+            <a:off x="1463040" y="4344840"/>
+            <a:ext cx="7220520" cy="1719000"/>
+          </a:xfrm>
+          <a:prstGeom prst="rect">
+            <a:avLst/>
+          </a:prstGeom>
+          <a:ln>
+            <a:noFill/>
+          </a:ln>
+        </p:spPr>
+      </p:pic>
+    </p:spTree>
+  </p:cSld>
+  <p:transition spd="slow">
+    <p:fade/>
+  </p:transition>
+  <p:timing>
+    <p:tnLst>
+      <p:par>
+        <p:cTn id="15" dur="indefinite" restart="never" nodeType="tmRoot">
+          <p:childTnLst>
+            <p:seq>
+              <p:cTn id="16" nodeType="mainSeq"/>
+              <p:prevCondLst>
+                <p:cond delay="0" evt="onPrev">
+                  <p:tgtEl>
+                    <p:sldTgt/>
+                  </p:tgtEl>
+                </p:cond>
+              </p:prevCondLst>
+              <p:nextCondLst>
+                <p:cond delay="0" evt="onNext">
+                  <p:tgtEl>
+                    <p:sldTgt/>
+                  </p:tgtEl>
+                </p:cond>
+              </p:nextCondLst>
+            </p:seq>
+          </p:childTnLst>
+        </p:cTn>
+      </p:par>
+    </p:tnLst>
+  </p:timing>
+</p:sld>
+</file>
+
+<file path=ppt/slides/slide9.xml><?xml version="1.0" encoding="utf-8"?>
+<p:sld xmlns:a="http://schemas.openxmlformats.org/drawingml/2006/main" xmlns:p="http://schemas.openxmlformats.org/presentationml/2006/main" xmlns:r="http://schemas.openxmlformats.org/officeDocument/2006/relationships" xmlns:p14="http://schemas.microsoft.com/office/powerpoint/2010/main" xmlns:p15="http://schemas.microsoft.com/office/powerpoint/2012/main" xmlns:mc="http://schemas.openxmlformats.org/markup-compatibility/2006">
+  <p:cSld>
+    <p:spTree>
+      <p:nvGrpSpPr>
+        <p:cNvPr id="1" name=""/>
+        <p:cNvGrpSpPr/>
+        <p:nvPr/>
+      </p:nvGrpSpPr>
+      <p:grpSpPr>
+        <a:xfrm>
+          <a:off x="0" y="0"/>
+          <a:ext cx="0" cy="0"/>
+          <a:chOff x="0" y="0"/>
+          <a:chExt cx="0" cy="0"/>
+        </a:xfrm>
+      </p:grpSpPr>
+      <p:sp>
+        <p:nvSpPr>
+          <p:cNvPr id="144" name="CustomShape 1"/>
+          <p:cNvSpPr/>
+          <p:nvPr/>
+        </p:nvSpPr>
+        <p:spPr>
+          <a:xfrm>
+            <a:off x="468360" y="346680"/>
+            <a:ext cx="8215200" cy="703080"/>
+          </a:xfrm>
+          <a:prstGeom prst="rect">
+            <a:avLst/>
+          </a:prstGeom>
+          <a:noFill/>
+          <a:ln>
+            <a:noFill/>
+          </a:ln>
+        </p:spPr>
+        <p:style>
+          <a:lnRef idx="0"/>
+          <a:fillRef idx="0"/>
+          <a:effectRef idx="0"/>
+          <a:fontRef idx="minor"/>
+        </p:style>
+        <p:txBody>
+          <a:bodyPr lIns="90000" rIns="90000" tIns="45000" bIns="45000" anchor="ctr"/>
+          <a:p>
+            <a:pPr>
+              <a:lnSpc>
+                <a:spcPct val="100000"/>
+              </a:lnSpc>
+            </a:pPr>
+            <a:r>
+              <a:rPr b="1" lang="en-US" sz="3200" spc="-1" strike="noStrike">
+                <a:solidFill>
+                  <a:srgbClr val="333333"/>
+                </a:solidFill>
+                <a:uFill>
+                  <a:solidFill>
+                    <a:srgbClr val="ffffff"/>
+                  </a:solidFill>
+                </a:uFill>
+                <a:latin typeface="Arial"/>
+                <a:ea typeface="標楷體"/>
+              </a:rPr>
+              <a:t>Special case – Array</a:t>
+            </a:r>
+            <a:endParaRPr b="0" lang="en-US" sz="1800" spc="-1" strike="noStrike">
+              <a:solidFill>
+                <a:srgbClr val="000000"/>
+              </a:solidFill>
+              <a:uFill>
+                <a:solidFill>
+                  <a:srgbClr val="ffffff"/>
+                </a:solidFill>
+              </a:uFill>
+              <a:latin typeface="Arial"/>
+            </a:endParaRPr>
+          </a:p>
+        </p:txBody>
+      </p:sp>
+      <p:pic>
+        <p:nvPicPr>
+          <p:cNvPr id="145" name="" descr=""/>
+          <p:cNvPicPr/>
+          <p:nvPr/>
+        </p:nvPicPr>
+        <p:blipFill>
+          <a:blip r:embed="rId1"/>
+          <a:srcRect l="15525" t="50531" r="42471" b="24562"/>
+          <a:stretch/>
+        </p:blipFill>
+        <p:spPr>
+          <a:xfrm>
+            <a:off x="1427040" y="4040280"/>
+            <a:ext cx="5485680" cy="1827720"/>
+          </a:xfrm>
+          <a:prstGeom prst="rect">
+            <a:avLst/>
+          </a:prstGeom>
+          <a:ln>
+            <a:noFill/>
+          </a:ln>
+        </p:spPr>
+      </p:pic>
+      <p:sp>
+        <p:nvSpPr>
+          <p:cNvPr id="146" name="CustomShape 2"/>
+          <p:cNvSpPr/>
+          <p:nvPr/>
+        </p:nvSpPr>
+        <p:spPr>
+          <a:xfrm>
+            <a:off x="971640" y="1144800"/>
+            <a:ext cx="7711920" cy="5070240"/>
+          </a:xfrm>
+          <a:prstGeom prst="rect">
+            <a:avLst/>
+          </a:prstGeom>
+          <a:noFill/>
+          <a:ln>
+            <a:noFill/>
+          </a:ln>
+        </p:spPr>
+        <p:style>
+          <a:lnRef idx="0"/>
+          <a:fillRef idx="0"/>
+          <a:effectRef idx="0"/>
+          <a:fontRef idx="minor"/>
+        </p:style>
+        <p:txBody>
+          <a:bodyPr lIns="90000" rIns="90000" tIns="45000" bIns="45000"/>
+          <a:p>
+            <a:pPr marL="355680" indent="-352440">
+              <a:lnSpc>
+                <a:spcPct val="100000"/>
+              </a:lnSpc>
+              <a:buClr>
+                <a:srgbClr val="333333"/>
+              </a:buClr>
+              <a:buFont typeface="Wingdings" charset="2"/>
+              <a:buChar char=""/>
+            </a:pPr>
+            <a:r>
+              <a:rPr b="0" lang="en-US" sz="2000" spc="-1" strike="noStrike">
+                <a:solidFill>
+                  <a:srgbClr val="333333"/>
+                </a:solidFill>
+                <a:uFill>
+                  <a:solidFill>
+                    <a:srgbClr val="ffffff"/>
+                  </a:solidFill>
+                </a:uFill>
+                <a:latin typeface="Arial"/>
+                <a:ea typeface="標楷體"/>
+              </a:rPr>
+              <a:t>For array to String</a:t>
+            </a:r>
+            <a:endParaRPr b="0" lang="en-US" sz="1800" spc="-1" strike="noStrike">
+              <a:solidFill>
+                <a:srgbClr val="000000"/>
+              </a:solidFill>
+              <a:uFill>
+                <a:solidFill>
+                  <a:srgbClr val="ffffff"/>
+                </a:solidFill>
+              </a:uFill>
+              <a:latin typeface="Arial"/>
+            </a:endParaRPr>
+          </a:p>
+          <a:p>
+            <a:pPr marL="355680" indent="-352440">
+              <a:lnSpc>
+                <a:spcPct val="100000"/>
+              </a:lnSpc>
+              <a:buClr>
+                <a:srgbClr val="333333"/>
+              </a:buClr>
+              <a:buFont typeface="Wingdings" charset="2"/>
+              <a:buChar char=""/>
+            </a:pPr>
+            <a:r>
+              <a:rPr b="0" lang="en-US" sz="2000" spc="-1" strike="noStrike">
+                <a:solidFill>
+                  <a:srgbClr val="333333"/>
+                </a:solidFill>
+                <a:uFill>
+                  <a:solidFill>
+                    <a:srgbClr val="ffffff"/>
+                  </a:solidFill>
+                </a:uFill>
+                <a:latin typeface="Arial"/>
+                <a:ea typeface="標楷體"/>
+              </a:rPr>
+              <a:t> </a:t>
+            </a:r>
+            <a:endParaRPr b="0" lang="en-US" sz="1800" spc="-1" strike="noStrike">
+              <a:solidFill>
+                <a:srgbClr val="000000"/>
+              </a:solidFill>
+              <a:uFill>
+                <a:solidFill>
+                  <a:srgbClr val="ffffff"/>
+                </a:solidFill>
+              </a:uFill>
+              <a:latin typeface="Arial"/>
+            </a:endParaRPr>
+          </a:p>
+          <a:p>
+            <a:pPr marL="355680" indent="-352440">
+              <a:lnSpc>
+                <a:spcPct val="100000"/>
+              </a:lnSpc>
+              <a:buClr>
+                <a:srgbClr val="333333"/>
+              </a:buClr>
+              <a:buFont typeface="Wingdings" charset="2"/>
+              <a:buChar char=""/>
+            </a:pPr>
+            <a:r>
+              <a:rPr b="0" lang="en-US" sz="2000" spc="-1" strike="noStrike">
+                <a:solidFill>
+                  <a:srgbClr val="333333"/>
+                </a:solidFill>
+                <a:uFill>
+                  <a:solidFill>
+                    <a:srgbClr val="ffffff"/>
+                  </a:solidFill>
+                </a:uFill>
+                <a:latin typeface="Arial"/>
+                <a:ea typeface="標楷體"/>
+              </a:rPr>
+              <a:t> </a:t>
+            </a:r>
+            <a:endParaRPr b="0" lang="en-US" sz="1800" spc="-1" strike="noStrike">
+              <a:solidFill>
+                <a:srgbClr val="000000"/>
+              </a:solidFill>
+              <a:uFill>
+                <a:solidFill>
+                  <a:srgbClr val="ffffff"/>
+                </a:solidFill>
+              </a:uFill>
+              <a:latin typeface="Arial"/>
+            </a:endParaRPr>
+          </a:p>
+          <a:p>
+            <a:pPr lvl="1" marL="432000" indent="-215280">
+              <a:lnSpc>
+                <a:spcPct val="100000"/>
+              </a:lnSpc>
+              <a:buClr>
+                <a:srgbClr val="000000"/>
+              </a:buClr>
+              <a:buSzPct val="45000"/>
+              <a:buFont typeface="Wingdings" charset="2"/>
+              <a:buChar char=""/>
+            </a:pPr>
+            <a:r>
+              <a:rPr b="0" lang="en-US" sz="2000" spc="-1" strike="noStrike">
+                <a:solidFill>
+                  <a:srgbClr val="333333"/>
+                </a:solidFill>
+                <a:uFill>
+                  <a:solidFill>
+                    <a:srgbClr val="ffffff"/>
+                  </a:solidFill>
+                </a:uFill>
+                <a:latin typeface="Arial"/>
+                <a:ea typeface="標楷體"/>
+              </a:rPr>
+              <a:t>If float[] mPredictFaceData = {4.8, 5.2, 0, 6.5};</a:t>
+            </a:r>
+            <a:endParaRPr b="0" lang="en-US" sz="1800" spc="-1" strike="noStrike">
+              <a:solidFill>
+                <a:srgbClr val="000000"/>
+              </a:solidFill>
+              <a:uFill>
+                <a:solidFill>
+                  <a:srgbClr val="ffffff"/>
+                </a:solidFill>
+              </a:uFill>
+              <a:latin typeface="Arial"/>
+            </a:endParaRPr>
+          </a:p>
+          <a:p>
+            <a:pPr lvl="1" marL="432000" indent="-215280">
+              <a:lnSpc>
+                <a:spcPct val="100000"/>
+              </a:lnSpc>
+              <a:buClr>
+                <a:srgbClr val="000000"/>
+              </a:buClr>
+              <a:buSzPct val="45000"/>
+              <a:buFont typeface="Wingdings" charset="2"/>
+              <a:buChar char=""/>
+            </a:pPr>
+            <a:r>
+              <a:rPr b="0" lang="en-US" sz="2000" spc="-1" strike="noStrike">
+                <a:solidFill>
+                  <a:srgbClr val="333333"/>
+                </a:solidFill>
+                <a:uFill>
+                  <a:solidFill>
+                    <a:srgbClr val="ffffff"/>
+                  </a:solidFill>
+                </a:uFill>
+                <a:latin typeface="Arial"/>
+                <a:ea typeface="標楷體"/>
+              </a:rPr>
+              <a:t>We will get String ans = </a:t>
+            </a:r>
+            <a:r>
+              <a:rPr b="1" lang="en-US" sz="2000" spc="-1" strike="noStrike">
+                <a:solidFill>
+                  <a:srgbClr val="333333"/>
+                </a:solidFill>
+                <a:uFill>
+                  <a:solidFill>
+                    <a:srgbClr val="ffffff"/>
+                  </a:solidFill>
+                </a:uFill>
+                <a:latin typeface="Arial"/>
+                <a:ea typeface="標楷體"/>
+              </a:rPr>
+              <a:t>[4.8, 5.2, 0, 6.5]</a:t>
+            </a:r>
+            <a:r>
+              <a:rPr b="0" lang="en-US" sz="2000" spc="-1" strike="noStrike">
+                <a:solidFill>
+                  <a:srgbClr val="333333"/>
+                </a:solidFill>
+                <a:uFill>
+                  <a:solidFill>
+                    <a:srgbClr val="ffffff"/>
+                  </a:solidFill>
+                </a:uFill>
+                <a:latin typeface="Arial"/>
+                <a:ea typeface="標楷體"/>
+              </a:rPr>
+              <a:t>;</a:t>
+            </a:r>
+            <a:endParaRPr b="0" lang="en-US" sz="1800" spc="-1" strike="noStrike">
+              <a:solidFill>
+                <a:srgbClr val="000000"/>
+              </a:solidFill>
+              <a:uFill>
+                <a:solidFill>
+                  <a:srgbClr val="ffffff"/>
+                </a:solidFill>
+              </a:uFill>
+              <a:latin typeface="Arial"/>
+            </a:endParaRPr>
+          </a:p>
+          <a:p>
+            <a:pPr lvl="1" marL="432000" indent="-215280">
+              <a:lnSpc>
+                <a:spcPct val="100000"/>
+              </a:lnSpc>
+              <a:buClr>
+                <a:srgbClr val="000000"/>
+              </a:buClr>
+              <a:buSzPct val="45000"/>
+              <a:buFont typeface="Wingdings" charset="2"/>
+              <a:buChar char=""/>
+            </a:pPr>
+            <a:r>
+              <a:rPr b="0" lang="en-US" sz="2000" spc="-1" strike="noStrike">
+                <a:solidFill>
+                  <a:srgbClr val="333333"/>
+                </a:solidFill>
+                <a:uFill>
+                  <a:solidFill>
+                    <a:srgbClr val="ffffff"/>
+                  </a:solidFill>
+                </a:uFill>
+                <a:latin typeface="Arial"/>
+                <a:ea typeface="標楷體"/>
+              </a:rPr>
+              <a:t> </a:t>
+            </a:r>
+            <a:endParaRPr b="0" lang="en-US" sz="1800" spc="-1" strike="noStrike">
+              <a:solidFill>
+                <a:srgbClr val="000000"/>
+              </a:solidFill>
+              <a:uFill>
+                <a:solidFill>
+                  <a:srgbClr val="ffffff"/>
+                </a:solidFill>
+              </a:uFill>
+              <a:latin typeface="Arial"/>
+            </a:endParaRPr>
+          </a:p>
+          <a:p>
+            <a:pPr marL="355680" indent="-352440">
+              <a:lnSpc>
+                <a:spcPct val="100000"/>
+              </a:lnSpc>
+              <a:buClr>
+                <a:srgbClr val="333333"/>
+              </a:buClr>
+              <a:buFont typeface="Wingdings" charset="2"/>
+              <a:buChar char=""/>
+            </a:pPr>
+            <a:r>
+              <a:rPr b="0" lang="en-US" sz="2000" spc="-1" strike="noStrike">
+                <a:solidFill>
+                  <a:srgbClr val="333333"/>
+                </a:solidFill>
+                <a:uFill>
+                  <a:solidFill>
+                    <a:srgbClr val="ffffff"/>
+                  </a:solidFill>
+                </a:uFill>
+                <a:latin typeface="Arial"/>
+                <a:ea typeface="標楷體"/>
+              </a:rPr>
+              <a:t>For String to array</a:t>
+            </a:r>
+            <a:endParaRPr b="0" lang="en-US" sz="1800" spc="-1" strike="noStrike">
+              <a:solidFill>
+                <a:srgbClr val="000000"/>
+              </a:solidFill>
+              <a:uFill>
+                <a:solidFill>
+                  <a:srgbClr val="ffffff"/>
+                </a:solidFill>
+              </a:uFill>
+              <a:latin typeface="Arial"/>
+            </a:endParaRPr>
+          </a:p>
+          <a:p>
+            <a:pPr lvl="1" marL="432000" indent="-215280">
+              <a:lnSpc>
+                <a:spcPct val="100000"/>
+              </a:lnSpc>
+              <a:buClr>
+                <a:srgbClr val="000000"/>
+              </a:buClr>
+              <a:buSzPct val="45000"/>
+              <a:buFont typeface="Wingdings" charset="2"/>
+              <a:buChar char=""/>
+            </a:pPr>
+            <a:r>
+              <a:rPr b="0" lang="en-US" sz="2000" spc="-1" strike="noStrike">
+                <a:solidFill>
+                  <a:srgbClr val="333333"/>
+                </a:solidFill>
+                <a:uFill>
+                  <a:solidFill>
+                    <a:srgbClr val="ffffff"/>
+                  </a:solidFill>
+                </a:uFill>
+                <a:latin typeface="Arial"/>
+                <a:ea typeface="標楷體"/>
+              </a:rPr>
+              <a:t>Split the String first</a:t>
+            </a:r>
+            <a:endParaRPr b="0" lang="en-US" sz="1800" spc="-1" strike="noStrike">
+              <a:solidFill>
+                <a:srgbClr val="000000"/>
+              </a:solidFill>
+              <a:uFill>
+                <a:solidFill>
+                  <a:srgbClr val="ffffff"/>
+                </a:solidFill>
+              </a:uFill>
+              <a:latin typeface="Arial"/>
+            </a:endParaRPr>
+          </a:p>
+          <a:p>
+            <a:pPr lvl="1" marL="432000" indent="-215280">
+              <a:lnSpc>
+                <a:spcPct val="100000"/>
+              </a:lnSpc>
+              <a:buClr>
+                <a:srgbClr val="000000"/>
+              </a:buClr>
+              <a:buSzPct val="45000"/>
+              <a:buFont typeface="Wingdings" charset="2"/>
+              <a:buChar char=""/>
+            </a:pPr>
+            <a:r>
+              <a:rPr b="0" lang="en-US" sz="2000" spc="-1" strike="noStrike">
+                <a:solidFill>
+                  <a:srgbClr val="333333"/>
+                </a:solidFill>
+                <a:uFill>
+                  <a:solidFill>
+                    <a:srgbClr val="ffffff"/>
+                  </a:solidFill>
+                </a:uFill>
+                <a:latin typeface="Arial"/>
+                <a:ea typeface="標楷體"/>
+              </a:rPr>
+              <a:t>Then use parse to change type of data one by one</a:t>
+            </a:r>
+            <a:endParaRPr b="0" lang="en-US" sz="1800" spc="-1" strike="noStrike">
+              <a:solidFill>
+                <a:srgbClr val="000000"/>
+              </a:solidFill>
+              <a:uFill>
+                <a:solidFill>
+                  <a:srgbClr val="ffffff"/>
+                </a:solidFill>
+              </a:uFill>
+              <a:latin typeface="Arial"/>
+            </a:endParaRPr>
+          </a:p>
+          <a:p>
+            <a:pPr>
+              <a:lnSpc>
+                <a:spcPct val="100000"/>
+              </a:lnSpc>
+            </a:pPr>
+            <a:endParaRPr b="0" lang="en-US" sz="1800" spc="-1" strike="noStrike">
+              <a:solidFill>
+                <a:srgbClr val="000000"/>
+              </a:solidFill>
+              <a:uFill>
+                <a:solidFill>
+                  <a:srgbClr val="ffffff"/>
+                </a:solidFill>
+              </a:uFill>
+              <a:latin typeface="Arial"/>
+            </a:endParaRPr>
+          </a:p>
+          <a:p>
+            <a:pPr>
+              <a:lnSpc>
+                <a:spcPct val="100000"/>
+              </a:lnSpc>
+            </a:pPr>
+            <a:endParaRPr b="0" lang="en-US" sz="1800" spc="-1" strike="noStrike">
+              <a:solidFill>
+                <a:srgbClr val="000000"/>
+              </a:solidFill>
+              <a:uFill>
+                <a:solidFill>
+                  <a:srgbClr val="ffffff"/>
+                </a:solidFill>
+              </a:uFill>
+              <a:latin typeface="Arial"/>
+            </a:endParaRPr>
+          </a:p>
+        </p:txBody>
+      </p:sp>
+      <p:pic>
+        <p:nvPicPr>
+          <p:cNvPr id="147" name="" descr=""/>
+          <p:cNvPicPr/>
+          <p:nvPr/>
+        </p:nvPicPr>
+        <p:blipFill>
+          <a:blip r:embed="rId2"/>
+          <a:srcRect l="38518" t="36299" r="34472" b="58356"/>
+          <a:stretch/>
+        </p:blipFill>
+        <p:spPr>
+          <a:xfrm>
+            <a:off x="1425600" y="1626840"/>
+            <a:ext cx="3292560" cy="364680"/>
+          </a:xfrm>
+          <a:prstGeom prst="rect">
+            <a:avLst/>
+          </a:prstGeom>
+          <a:ln>
+            <a:noFill/>
+          </a:ln>
+        </p:spPr>
+      </p:pic>
+    </p:spTree>
+  </p:cSld>
+  <p:transition spd="slow">
+    <p:fade/>
+  </p:transition>
+  <p:timing>
+    <p:tnLst>
+      <p:par>
+        <p:cTn id="17" dur="indefinite" restart="never" nodeType="tmRoot">
+          <p:childTnLst>
+            <p:seq>
+              <p:cTn id="18" nodeType="mainSeq"/>
               <p:prevCondLst>
                 <p:cond delay="0" evt="onPrev">
                   <p:tgtEl>

</xml_diff>